<commit_message>
Ajout de la diapositive 1 erreur 1 solution
</commit_message>
<xml_diff>
--- a/GIT-moi-tout.pptx
+++ b/GIT-moi-tout.pptx
@@ -85,7 +85,7 @@
           </a:bodyPr>
           <a:p>
             <a:pPr algn="ctr"/>
-            <a:endParaRPr b="0" lang="fr-FR" sz="4400" spc="-1" strike="noStrike">
+            <a:endParaRPr b="0" lang="en-US" sz="4400" spc="-1" strike="noStrike">
               <a:latin typeface="Arial"/>
             </a:endParaRPr>
           </a:p>
@@ -115,7 +115,7 @@
             <a:normAutofit/>
           </a:bodyPr>
           <a:p>
-            <a:endParaRPr b="0" lang="fr-FR" sz="3200" spc="-1" strike="noStrike">
+            <a:endParaRPr b="0" lang="en-US" sz="3200" spc="-1" strike="noStrike">
               <a:latin typeface="Arial"/>
             </a:endParaRPr>
           </a:p>
@@ -145,7 +145,7 @@
             <a:normAutofit/>
           </a:bodyPr>
           <a:p>
-            <a:endParaRPr b="0" lang="fr-FR" sz="3200" spc="-1" strike="noStrike">
+            <a:endParaRPr b="0" lang="en-US" sz="3200" spc="-1" strike="noStrike">
               <a:latin typeface="Arial"/>
             </a:endParaRPr>
           </a:p>
@@ -198,7 +198,7 @@
           </a:bodyPr>
           <a:p>
             <a:pPr algn="ctr"/>
-            <a:endParaRPr b="0" lang="fr-FR" sz="4400" spc="-1" strike="noStrike">
+            <a:endParaRPr b="0" lang="en-US" sz="4400" spc="-1" strike="noStrike">
               <a:latin typeface="Arial"/>
             </a:endParaRPr>
           </a:p>
@@ -228,7 +228,7 @@
             <a:normAutofit/>
           </a:bodyPr>
           <a:p>
-            <a:endParaRPr b="0" lang="fr-FR" sz="3200" spc="-1" strike="noStrike">
+            <a:endParaRPr b="0" lang="en-US" sz="3200" spc="-1" strike="noStrike">
               <a:latin typeface="Arial"/>
             </a:endParaRPr>
           </a:p>
@@ -258,7 +258,7 @@
             <a:normAutofit/>
           </a:bodyPr>
           <a:p>
-            <a:endParaRPr b="0" lang="fr-FR" sz="3200" spc="-1" strike="noStrike">
+            <a:endParaRPr b="0" lang="en-US" sz="3200" spc="-1" strike="noStrike">
               <a:latin typeface="Arial"/>
             </a:endParaRPr>
           </a:p>
@@ -288,7 +288,7 @@
             <a:normAutofit/>
           </a:bodyPr>
           <a:p>
-            <a:endParaRPr b="0" lang="fr-FR" sz="3200" spc="-1" strike="noStrike">
+            <a:endParaRPr b="0" lang="en-US" sz="3200" spc="-1" strike="noStrike">
               <a:latin typeface="Arial"/>
             </a:endParaRPr>
           </a:p>
@@ -318,7 +318,7 @@
             <a:normAutofit/>
           </a:bodyPr>
           <a:p>
-            <a:endParaRPr b="0" lang="fr-FR" sz="3200" spc="-1" strike="noStrike">
+            <a:endParaRPr b="0" lang="en-US" sz="3200" spc="-1" strike="noStrike">
               <a:latin typeface="Arial"/>
             </a:endParaRPr>
           </a:p>
@@ -371,7 +371,7 @@
           </a:bodyPr>
           <a:p>
             <a:pPr algn="ctr"/>
-            <a:endParaRPr b="0" lang="fr-FR" sz="4400" spc="-1" strike="noStrike">
+            <a:endParaRPr b="0" lang="en-US" sz="4400" spc="-1" strike="noStrike">
               <a:latin typeface="Arial"/>
             </a:endParaRPr>
           </a:p>
@@ -401,7 +401,7 @@
             <a:normAutofit/>
           </a:bodyPr>
           <a:p>
-            <a:endParaRPr b="0" lang="fr-FR" sz="3200" spc="-1" strike="noStrike">
+            <a:endParaRPr b="0" lang="en-US" sz="3200" spc="-1" strike="noStrike">
               <a:latin typeface="Arial"/>
             </a:endParaRPr>
           </a:p>
@@ -431,7 +431,7 @@
             <a:normAutofit/>
           </a:bodyPr>
           <a:p>
-            <a:endParaRPr b="0" lang="fr-FR" sz="3200" spc="-1" strike="noStrike">
+            <a:endParaRPr b="0" lang="en-US" sz="3200" spc="-1" strike="noStrike">
               <a:latin typeface="Arial"/>
             </a:endParaRPr>
           </a:p>
@@ -461,7 +461,7 @@
             <a:normAutofit/>
           </a:bodyPr>
           <a:p>
-            <a:endParaRPr b="0" lang="fr-FR" sz="3200" spc="-1" strike="noStrike">
+            <a:endParaRPr b="0" lang="en-US" sz="3200" spc="-1" strike="noStrike">
               <a:latin typeface="Arial"/>
             </a:endParaRPr>
           </a:p>
@@ -491,7 +491,7 @@
             <a:normAutofit/>
           </a:bodyPr>
           <a:p>
-            <a:endParaRPr b="0" lang="fr-FR" sz="3200" spc="-1" strike="noStrike">
+            <a:endParaRPr b="0" lang="en-US" sz="3200" spc="-1" strike="noStrike">
               <a:latin typeface="Arial"/>
             </a:endParaRPr>
           </a:p>
@@ -521,7 +521,7 @@
             <a:normAutofit/>
           </a:bodyPr>
           <a:p>
-            <a:endParaRPr b="0" lang="fr-FR" sz="3200" spc="-1" strike="noStrike">
+            <a:endParaRPr b="0" lang="en-US" sz="3200" spc="-1" strike="noStrike">
               <a:latin typeface="Arial"/>
             </a:endParaRPr>
           </a:p>
@@ -551,7 +551,7 @@
             <a:normAutofit/>
           </a:bodyPr>
           <a:p>
-            <a:endParaRPr b="0" lang="fr-FR" sz="3200" spc="-1" strike="noStrike">
+            <a:endParaRPr b="0" lang="en-US" sz="3200" spc="-1" strike="noStrike">
               <a:latin typeface="Arial"/>
             </a:endParaRPr>
           </a:p>
@@ -626,7 +626,7 @@
           </a:bodyPr>
           <a:p>
             <a:pPr algn="ctr"/>
-            <a:endParaRPr b="0" lang="fr-FR" sz="4400" spc="-1" strike="noStrike">
+            <a:endParaRPr b="0" lang="en-US" sz="4400" spc="-1" strike="noStrike">
               <a:latin typeface="Arial"/>
             </a:endParaRPr>
           </a:p>
@@ -657,7 +657,7 @@
           </a:bodyPr>
           <a:p>
             <a:pPr algn="ctr"/>
-            <a:endParaRPr b="0" lang="fr-FR" sz="3200" spc="-1" strike="noStrike">
+            <a:endParaRPr b="0" lang="en-US" sz="3200" spc="-1" strike="noStrike">
               <a:latin typeface="Arial"/>
             </a:endParaRPr>
           </a:p>
@@ -710,7 +710,7 @@
           </a:bodyPr>
           <a:p>
             <a:pPr algn="ctr"/>
-            <a:endParaRPr b="0" lang="fr-FR" sz="4400" spc="-1" strike="noStrike">
+            <a:endParaRPr b="0" lang="en-US" sz="4400" spc="-1" strike="noStrike">
               <a:latin typeface="Arial"/>
             </a:endParaRPr>
           </a:p>
@@ -740,7 +740,7 @@
             <a:normAutofit/>
           </a:bodyPr>
           <a:p>
-            <a:endParaRPr b="0" lang="fr-FR" sz="3200" spc="-1" strike="noStrike">
+            <a:endParaRPr b="0" lang="en-US" sz="3200" spc="-1" strike="noStrike">
               <a:latin typeface="Arial"/>
             </a:endParaRPr>
           </a:p>
@@ -793,7 +793,7 @@
           </a:bodyPr>
           <a:p>
             <a:pPr algn="ctr"/>
-            <a:endParaRPr b="0" lang="fr-FR" sz="4400" spc="-1" strike="noStrike">
+            <a:endParaRPr b="0" lang="en-US" sz="4400" spc="-1" strike="noStrike">
               <a:latin typeface="Arial"/>
             </a:endParaRPr>
           </a:p>
@@ -823,7 +823,7 @@
             <a:normAutofit/>
           </a:bodyPr>
           <a:p>
-            <a:endParaRPr b="0" lang="fr-FR" sz="3200" spc="-1" strike="noStrike">
+            <a:endParaRPr b="0" lang="en-US" sz="3200" spc="-1" strike="noStrike">
               <a:latin typeface="Arial"/>
             </a:endParaRPr>
           </a:p>
@@ -853,7 +853,7 @@
             <a:normAutofit/>
           </a:bodyPr>
           <a:p>
-            <a:endParaRPr b="0" lang="fr-FR" sz="3200" spc="-1" strike="noStrike">
+            <a:endParaRPr b="0" lang="en-US" sz="3200" spc="-1" strike="noStrike">
               <a:latin typeface="Arial"/>
             </a:endParaRPr>
           </a:p>
@@ -906,7 +906,7 @@
           </a:bodyPr>
           <a:p>
             <a:pPr algn="ctr"/>
-            <a:endParaRPr b="0" lang="fr-FR" sz="4400" spc="-1" strike="noStrike">
+            <a:endParaRPr b="0" lang="en-US" sz="4400" spc="-1" strike="noStrike">
               <a:latin typeface="Arial"/>
             </a:endParaRPr>
           </a:p>
@@ -959,7 +959,7 @@
           </a:bodyPr>
           <a:p>
             <a:pPr algn="ctr"/>
-            <a:endParaRPr b="0" lang="fr-FR" sz="3200" spc="-1" strike="noStrike">
+            <a:endParaRPr b="0" lang="en-US" sz="3200" spc="-1" strike="noStrike">
               <a:latin typeface="Arial"/>
             </a:endParaRPr>
           </a:p>
@@ -1012,7 +1012,7 @@
           </a:bodyPr>
           <a:p>
             <a:pPr algn="ctr"/>
-            <a:endParaRPr b="0" lang="fr-FR" sz="4400" spc="-1" strike="noStrike">
+            <a:endParaRPr b="0" lang="en-US" sz="4400" spc="-1" strike="noStrike">
               <a:latin typeface="Arial"/>
             </a:endParaRPr>
           </a:p>
@@ -1042,7 +1042,7 @@
             <a:normAutofit/>
           </a:bodyPr>
           <a:p>
-            <a:endParaRPr b="0" lang="fr-FR" sz="3200" spc="-1" strike="noStrike">
+            <a:endParaRPr b="0" lang="en-US" sz="3200" spc="-1" strike="noStrike">
               <a:latin typeface="Arial"/>
             </a:endParaRPr>
           </a:p>
@@ -1072,7 +1072,7 @@
             <a:normAutofit/>
           </a:bodyPr>
           <a:p>
-            <a:endParaRPr b="0" lang="fr-FR" sz="3200" spc="-1" strike="noStrike">
+            <a:endParaRPr b="0" lang="en-US" sz="3200" spc="-1" strike="noStrike">
               <a:latin typeface="Arial"/>
             </a:endParaRPr>
           </a:p>
@@ -1102,7 +1102,7 @@
             <a:normAutofit/>
           </a:bodyPr>
           <a:p>
-            <a:endParaRPr b="0" lang="fr-FR" sz="3200" spc="-1" strike="noStrike">
+            <a:endParaRPr b="0" lang="en-US" sz="3200" spc="-1" strike="noStrike">
               <a:latin typeface="Arial"/>
             </a:endParaRPr>
           </a:p>
@@ -1155,7 +1155,7 @@
           </a:bodyPr>
           <a:p>
             <a:pPr algn="ctr"/>
-            <a:endParaRPr b="0" lang="fr-FR" sz="4400" spc="-1" strike="noStrike">
+            <a:endParaRPr b="0" lang="en-US" sz="4400" spc="-1" strike="noStrike">
               <a:latin typeface="Arial"/>
             </a:endParaRPr>
           </a:p>
@@ -1186,7 +1186,7 @@
           </a:bodyPr>
           <a:p>
             <a:pPr algn="ctr"/>
-            <a:endParaRPr b="0" lang="fr-FR" sz="3200" spc="-1" strike="noStrike">
+            <a:endParaRPr b="0" lang="en-US" sz="3200" spc="-1" strike="noStrike">
               <a:latin typeface="Arial"/>
             </a:endParaRPr>
           </a:p>
@@ -1239,7 +1239,7 @@
           </a:bodyPr>
           <a:p>
             <a:pPr algn="ctr"/>
-            <a:endParaRPr b="0" lang="fr-FR" sz="4400" spc="-1" strike="noStrike">
+            <a:endParaRPr b="0" lang="en-US" sz="4400" spc="-1" strike="noStrike">
               <a:latin typeface="Arial"/>
             </a:endParaRPr>
           </a:p>
@@ -1269,7 +1269,7 @@
             <a:normAutofit/>
           </a:bodyPr>
           <a:p>
-            <a:endParaRPr b="0" lang="fr-FR" sz="3200" spc="-1" strike="noStrike">
+            <a:endParaRPr b="0" lang="en-US" sz="3200" spc="-1" strike="noStrike">
               <a:latin typeface="Arial"/>
             </a:endParaRPr>
           </a:p>
@@ -1299,7 +1299,7 @@
             <a:normAutofit/>
           </a:bodyPr>
           <a:p>
-            <a:endParaRPr b="0" lang="fr-FR" sz="3200" spc="-1" strike="noStrike">
+            <a:endParaRPr b="0" lang="en-US" sz="3200" spc="-1" strike="noStrike">
               <a:latin typeface="Arial"/>
             </a:endParaRPr>
           </a:p>
@@ -1329,7 +1329,7 @@
             <a:normAutofit/>
           </a:bodyPr>
           <a:p>
-            <a:endParaRPr b="0" lang="fr-FR" sz="3200" spc="-1" strike="noStrike">
+            <a:endParaRPr b="0" lang="en-US" sz="3200" spc="-1" strike="noStrike">
               <a:latin typeface="Arial"/>
             </a:endParaRPr>
           </a:p>
@@ -1382,7 +1382,7 @@
           </a:bodyPr>
           <a:p>
             <a:pPr algn="ctr"/>
-            <a:endParaRPr b="0" lang="fr-FR" sz="4400" spc="-1" strike="noStrike">
+            <a:endParaRPr b="0" lang="en-US" sz="4400" spc="-1" strike="noStrike">
               <a:latin typeface="Arial"/>
             </a:endParaRPr>
           </a:p>
@@ -1412,7 +1412,7 @@
             <a:normAutofit/>
           </a:bodyPr>
           <a:p>
-            <a:endParaRPr b="0" lang="fr-FR" sz="3200" spc="-1" strike="noStrike">
+            <a:endParaRPr b="0" lang="en-US" sz="3200" spc="-1" strike="noStrike">
               <a:latin typeface="Arial"/>
             </a:endParaRPr>
           </a:p>
@@ -1442,7 +1442,7 @@
             <a:normAutofit/>
           </a:bodyPr>
           <a:p>
-            <a:endParaRPr b="0" lang="fr-FR" sz="3200" spc="-1" strike="noStrike">
+            <a:endParaRPr b="0" lang="en-US" sz="3200" spc="-1" strike="noStrike">
               <a:latin typeface="Arial"/>
             </a:endParaRPr>
           </a:p>
@@ -1472,7 +1472,7 @@
             <a:normAutofit/>
           </a:bodyPr>
           <a:p>
-            <a:endParaRPr b="0" lang="fr-FR" sz="3200" spc="-1" strike="noStrike">
+            <a:endParaRPr b="0" lang="en-US" sz="3200" spc="-1" strike="noStrike">
               <a:latin typeface="Arial"/>
             </a:endParaRPr>
           </a:p>
@@ -1525,7 +1525,7 @@
           </a:bodyPr>
           <a:p>
             <a:pPr algn="ctr"/>
-            <a:endParaRPr b="0" lang="fr-FR" sz="4400" spc="-1" strike="noStrike">
+            <a:endParaRPr b="0" lang="en-US" sz="4400" spc="-1" strike="noStrike">
               <a:latin typeface="Arial"/>
             </a:endParaRPr>
           </a:p>
@@ -1555,7 +1555,7 @@
             <a:normAutofit/>
           </a:bodyPr>
           <a:p>
-            <a:endParaRPr b="0" lang="fr-FR" sz="3200" spc="-1" strike="noStrike">
+            <a:endParaRPr b="0" lang="en-US" sz="3200" spc="-1" strike="noStrike">
               <a:latin typeface="Arial"/>
             </a:endParaRPr>
           </a:p>
@@ -1585,7 +1585,7 @@
             <a:normAutofit/>
           </a:bodyPr>
           <a:p>
-            <a:endParaRPr b="0" lang="fr-FR" sz="3200" spc="-1" strike="noStrike">
+            <a:endParaRPr b="0" lang="en-US" sz="3200" spc="-1" strike="noStrike">
               <a:latin typeface="Arial"/>
             </a:endParaRPr>
           </a:p>
@@ -1638,7 +1638,7 @@
           </a:bodyPr>
           <a:p>
             <a:pPr algn="ctr"/>
-            <a:endParaRPr b="0" lang="fr-FR" sz="4400" spc="-1" strike="noStrike">
+            <a:endParaRPr b="0" lang="en-US" sz="4400" spc="-1" strike="noStrike">
               <a:latin typeface="Arial"/>
             </a:endParaRPr>
           </a:p>
@@ -1668,7 +1668,7 @@
             <a:normAutofit/>
           </a:bodyPr>
           <a:p>
-            <a:endParaRPr b="0" lang="fr-FR" sz="3200" spc="-1" strike="noStrike">
+            <a:endParaRPr b="0" lang="en-US" sz="3200" spc="-1" strike="noStrike">
               <a:latin typeface="Arial"/>
             </a:endParaRPr>
           </a:p>
@@ -1698,7 +1698,7 @@
             <a:normAutofit/>
           </a:bodyPr>
           <a:p>
-            <a:endParaRPr b="0" lang="fr-FR" sz="3200" spc="-1" strike="noStrike">
+            <a:endParaRPr b="0" lang="en-US" sz="3200" spc="-1" strike="noStrike">
               <a:latin typeface="Arial"/>
             </a:endParaRPr>
           </a:p>
@@ -1728,7 +1728,7 @@
             <a:normAutofit/>
           </a:bodyPr>
           <a:p>
-            <a:endParaRPr b="0" lang="fr-FR" sz="3200" spc="-1" strike="noStrike">
+            <a:endParaRPr b="0" lang="en-US" sz="3200" spc="-1" strike="noStrike">
               <a:latin typeface="Arial"/>
             </a:endParaRPr>
           </a:p>
@@ -1758,7 +1758,7 @@
             <a:normAutofit/>
           </a:bodyPr>
           <a:p>
-            <a:endParaRPr b="0" lang="fr-FR" sz="3200" spc="-1" strike="noStrike">
+            <a:endParaRPr b="0" lang="en-US" sz="3200" spc="-1" strike="noStrike">
               <a:latin typeface="Arial"/>
             </a:endParaRPr>
           </a:p>
@@ -1811,7 +1811,7 @@
           </a:bodyPr>
           <a:p>
             <a:pPr algn="ctr"/>
-            <a:endParaRPr b="0" lang="fr-FR" sz="4400" spc="-1" strike="noStrike">
+            <a:endParaRPr b="0" lang="en-US" sz="4400" spc="-1" strike="noStrike">
               <a:latin typeface="Arial"/>
             </a:endParaRPr>
           </a:p>
@@ -1841,7 +1841,7 @@
             <a:normAutofit/>
           </a:bodyPr>
           <a:p>
-            <a:endParaRPr b="0" lang="fr-FR" sz="3200" spc="-1" strike="noStrike">
+            <a:endParaRPr b="0" lang="en-US" sz="3200" spc="-1" strike="noStrike">
               <a:latin typeface="Arial"/>
             </a:endParaRPr>
           </a:p>
@@ -1871,7 +1871,7 @@
             <a:normAutofit/>
           </a:bodyPr>
           <a:p>
-            <a:endParaRPr b="0" lang="fr-FR" sz="3200" spc="-1" strike="noStrike">
+            <a:endParaRPr b="0" lang="en-US" sz="3200" spc="-1" strike="noStrike">
               <a:latin typeface="Arial"/>
             </a:endParaRPr>
           </a:p>
@@ -1901,7 +1901,7 @@
             <a:normAutofit/>
           </a:bodyPr>
           <a:p>
-            <a:endParaRPr b="0" lang="fr-FR" sz="3200" spc="-1" strike="noStrike">
+            <a:endParaRPr b="0" lang="en-US" sz="3200" spc="-1" strike="noStrike">
               <a:latin typeface="Arial"/>
             </a:endParaRPr>
           </a:p>
@@ -1931,7 +1931,7 @@
             <a:normAutofit/>
           </a:bodyPr>
           <a:p>
-            <a:endParaRPr b="0" lang="fr-FR" sz="3200" spc="-1" strike="noStrike">
+            <a:endParaRPr b="0" lang="en-US" sz="3200" spc="-1" strike="noStrike">
               <a:latin typeface="Arial"/>
             </a:endParaRPr>
           </a:p>
@@ -1961,7 +1961,7 @@
             <a:normAutofit/>
           </a:bodyPr>
           <a:p>
-            <a:endParaRPr b="0" lang="fr-FR" sz="3200" spc="-1" strike="noStrike">
+            <a:endParaRPr b="0" lang="en-US" sz="3200" spc="-1" strike="noStrike">
               <a:latin typeface="Arial"/>
             </a:endParaRPr>
           </a:p>
@@ -1991,7 +1991,7 @@
             <a:normAutofit/>
           </a:bodyPr>
           <a:p>
-            <a:endParaRPr b="0" lang="fr-FR" sz="3200" spc="-1" strike="noStrike">
+            <a:endParaRPr b="0" lang="en-US" sz="3200" spc="-1" strike="noStrike">
               <a:latin typeface="Arial"/>
             </a:endParaRPr>
           </a:p>
@@ -2066,7 +2066,7 @@
           </a:bodyPr>
           <a:p>
             <a:pPr algn="ctr"/>
-            <a:endParaRPr b="0" lang="fr-FR" sz="4400" spc="-1" strike="noStrike">
+            <a:endParaRPr b="0" lang="en-US" sz="4400" spc="-1" strike="noStrike">
               <a:latin typeface="Arial"/>
             </a:endParaRPr>
           </a:p>
@@ -2097,7 +2097,7 @@
           </a:bodyPr>
           <a:p>
             <a:pPr algn="ctr"/>
-            <a:endParaRPr b="0" lang="fr-FR" sz="3200" spc="-1" strike="noStrike">
+            <a:endParaRPr b="0" lang="en-US" sz="3200" spc="-1" strike="noStrike">
               <a:latin typeface="Arial"/>
             </a:endParaRPr>
           </a:p>
@@ -2150,7 +2150,7 @@
           </a:bodyPr>
           <a:p>
             <a:pPr algn="ctr"/>
-            <a:endParaRPr b="0" lang="fr-FR" sz="4400" spc="-1" strike="noStrike">
+            <a:endParaRPr b="0" lang="en-US" sz="4400" spc="-1" strike="noStrike">
               <a:latin typeface="Arial"/>
             </a:endParaRPr>
           </a:p>
@@ -2180,7 +2180,7 @@
             <a:normAutofit/>
           </a:bodyPr>
           <a:p>
-            <a:endParaRPr b="0" lang="fr-FR" sz="3200" spc="-1" strike="noStrike">
+            <a:endParaRPr b="0" lang="en-US" sz="3200" spc="-1" strike="noStrike">
               <a:latin typeface="Arial"/>
             </a:endParaRPr>
           </a:p>
@@ -2233,7 +2233,7 @@
           </a:bodyPr>
           <a:p>
             <a:pPr algn="ctr"/>
-            <a:endParaRPr b="0" lang="fr-FR" sz="4400" spc="-1" strike="noStrike">
+            <a:endParaRPr b="0" lang="en-US" sz="4400" spc="-1" strike="noStrike">
               <a:latin typeface="Arial"/>
             </a:endParaRPr>
           </a:p>
@@ -2263,7 +2263,7 @@
             <a:normAutofit/>
           </a:bodyPr>
           <a:p>
-            <a:endParaRPr b="0" lang="fr-FR" sz="3200" spc="-1" strike="noStrike">
+            <a:endParaRPr b="0" lang="en-US" sz="3200" spc="-1" strike="noStrike">
               <a:latin typeface="Arial"/>
             </a:endParaRPr>
           </a:p>
@@ -2293,7 +2293,7 @@
             <a:normAutofit/>
           </a:bodyPr>
           <a:p>
-            <a:endParaRPr b="0" lang="fr-FR" sz="3200" spc="-1" strike="noStrike">
+            <a:endParaRPr b="0" lang="en-US" sz="3200" spc="-1" strike="noStrike">
               <a:latin typeface="Arial"/>
             </a:endParaRPr>
           </a:p>
@@ -2346,7 +2346,7 @@
           </a:bodyPr>
           <a:p>
             <a:pPr algn="ctr"/>
-            <a:endParaRPr b="0" lang="fr-FR" sz="4400" spc="-1" strike="noStrike">
+            <a:endParaRPr b="0" lang="en-US" sz="4400" spc="-1" strike="noStrike">
               <a:latin typeface="Arial"/>
             </a:endParaRPr>
           </a:p>
@@ -2399,7 +2399,7 @@
           </a:bodyPr>
           <a:p>
             <a:pPr algn="ctr"/>
-            <a:endParaRPr b="0" lang="fr-FR" sz="4400" spc="-1" strike="noStrike">
+            <a:endParaRPr b="0" lang="en-US" sz="4400" spc="-1" strike="noStrike">
               <a:latin typeface="Arial"/>
             </a:endParaRPr>
           </a:p>
@@ -2429,7 +2429,7 @@
             <a:normAutofit/>
           </a:bodyPr>
           <a:p>
-            <a:endParaRPr b="0" lang="fr-FR" sz="3200" spc="-1" strike="noStrike">
+            <a:endParaRPr b="0" lang="en-US" sz="3200" spc="-1" strike="noStrike">
               <a:latin typeface="Arial"/>
             </a:endParaRPr>
           </a:p>
@@ -2482,7 +2482,7 @@
           </a:bodyPr>
           <a:p>
             <a:pPr algn="ctr"/>
-            <a:endParaRPr b="0" lang="fr-FR" sz="3200" spc="-1" strike="noStrike">
+            <a:endParaRPr b="0" lang="en-US" sz="3200" spc="-1" strike="noStrike">
               <a:latin typeface="Arial"/>
             </a:endParaRPr>
           </a:p>
@@ -2535,7 +2535,7 @@
           </a:bodyPr>
           <a:p>
             <a:pPr algn="ctr"/>
-            <a:endParaRPr b="0" lang="fr-FR" sz="4400" spc="-1" strike="noStrike">
+            <a:endParaRPr b="0" lang="en-US" sz="4400" spc="-1" strike="noStrike">
               <a:latin typeface="Arial"/>
             </a:endParaRPr>
           </a:p>
@@ -2565,7 +2565,7 @@
             <a:normAutofit/>
           </a:bodyPr>
           <a:p>
-            <a:endParaRPr b="0" lang="fr-FR" sz="3200" spc="-1" strike="noStrike">
+            <a:endParaRPr b="0" lang="en-US" sz="3200" spc="-1" strike="noStrike">
               <a:latin typeface="Arial"/>
             </a:endParaRPr>
           </a:p>
@@ -2595,7 +2595,7 @@
             <a:normAutofit/>
           </a:bodyPr>
           <a:p>
-            <a:endParaRPr b="0" lang="fr-FR" sz="3200" spc="-1" strike="noStrike">
+            <a:endParaRPr b="0" lang="en-US" sz="3200" spc="-1" strike="noStrike">
               <a:latin typeface="Arial"/>
             </a:endParaRPr>
           </a:p>
@@ -2625,7 +2625,7 @@
             <a:normAutofit/>
           </a:bodyPr>
           <a:p>
-            <a:endParaRPr b="0" lang="fr-FR" sz="3200" spc="-1" strike="noStrike">
+            <a:endParaRPr b="0" lang="en-US" sz="3200" spc="-1" strike="noStrike">
               <a:latin typeface="Arial"/>
             </a:endParaRPr>
           </a:p>
@@ -2678,7 +2678,7 @@
           </a:bodyPr>
           <a:p>
             <a:pPr algn="ctr"/>
-            <a:endParaRPr b="0" lang="fr-FR" sz="4400" spc="-1" strike="noStrike">
+            <a:endParaRPr b="0" lang="en-US" sz="4400" spc="-1" strike="noStrike">
               <a:latin typeface="Arial"/>
             </a:endParaRPr>
           </a:p>
@@ -2708,7 +2708,7 @@
             <a:normAutofit/>
           </a:bodyPr>
           <a:p>
-            <a:endParaRPr b="0" lang="fr-FR" sz="3200" spc="-1" strike="noStrike">
+            <a:endParaRPr b="0" lang="en-US" sz="3200" spc="-1" strike="noStrike">
               <a:latin typeface="Arial"/>
             </a:endParaRPr>
           </a:p>
@@ -2738,7 +2738,7 @@
             <a:normAutofit/>
           </a:bodyPr>
           <a:p>
-            <a:endParaRPr b="0" lang="fr-FR" sz="3200" spc="-1" strike="noStrike">
+            <a:endParaRPr b="0" lang="en-US" sz="3200" spc="-1" strike="noStrike">
               <a:latin typeface="Arial"/>
             </a:endParaRPr>
           </a:p>
@@ -2768,7 +2768,7 @@
             <a:normAutofit/>
           </a:bodyPr>
           <a:p>
-            <a:endParaRPr b="0" lang="fr-FR" sz="3200" spc="-1" strike="noStrike">
+            <a:endParaRPr b="0" lang="en-US" sz="3200" spc="-1" strike="noStrike">
               <a:latin typeface="Arial"/>
             </a:endParaRPr>
           </a:p>
@@ -2821,7 +2821,7 @@
           </a:bodyPr>
           <a:p>
             <a:pPr algn="ctr"/>
-            <a:endParaRPr b="0" lang="fr-FR" sz="4400" spc="-1" strike="noStrike">
+            <a:endParaRPr b="0" lang="en-US" sz="4400" spc="-1" strike="noStrike">
               <a:latin typeface="Arial"/>
             </a:endParaRPr>
           </a:p>
@@ -2851,7 +2851,7 @@
             <a:normAutofit/>
           </a:bodyPr>
           <a:p>
-            <a:endParaRPr b="0" lang="fr-FR" sz="3200" spc="-1" strike="noStrike">
+            <a:endParaRPr b="0" lang="en-US" sz="3200" spc="-1" strike="noStrike">
               <a:latin typeface="Arial"/>
             </a:endParaRPr>
           </a:p>
@@ -2881,7 +2881,7 @@
             <a:normAutofit/>
           </a:bodyPr>
           <a:p>
-            <a:endParaRPr b="0" lang="fr-FR" sz="3200" spc="-1" strike="noStrike">
+            <a:endParaRPr b="0" lang="en-US" sz="3200" spc="-1" strike="noStrike">
               <a:latin typeface="Arial"/>
             </a:endParaRPr>
           </a:p>
@@ -2911,7 +2911,7 @@
             <a:normAutofit/>
           </a:bodyPr>
           <a:p>
-            <a:endParaRPr b="0" lang="fr-FR" sz="3200" spc="-1" strike="noStrike">
+            <a:endParaRPr b="0" lang="en-US" sz="3200" spc="-1" strike="noStrike">
               <a:latin typeface="Arial"/>
             </a:endParaRPr>
           </a:p>
@@ -2964,7 +2964,7 @@
           </a:bodyPr>
           <a:p>
             <a:pPr algn="ctr"/>
-            <a:endParaRPr b="0" lang="fr-FR" sz="4400" spc="-1" strike="noStrike">
+            <a:endParaRPr b="0" lang="en-US" sz="4400" spc="-1" strike="noStrike">
               <a:latin typeface="Arial"/>
             </a:endParaRPr>
           </a:p>
@@ -2994,7 +2994,7 @@
             <a:normAutofit/>
           </a:bodyPr>
           <a:p>
-            <a:endParaRPr b="0" lang="fr-FR" sz="3200" spc="-1" strike="noStrike">
+            <a:endParaRPr b="0" lang="en-US" sz="3200" spc="-1" strike="noStrike">
               <a:latin typeface="Arial"/>
             </a:endParaRPr>
           </a:p>
@@ -3024,7 +3024,7 @@
             <a:normAutofit/>
           </a:bodyPr>
           <a:p>
-            <a:endParaRPr b="0" lang="fr-FR" sz="3200" spc="-1" strike="noStrike">
+            <a:endParaRPr b="0" lang="en-US" sz="3200" spc="-1" strike="noStrike">
               <a:latin typeface="Arial"/>
             </a:endParaRPr>
           </a:p>
@@ -3077,7 +3077,7 @@
           </a:bodyPr>
           <a:p>
             <a:pPr algn="ctr"/>
-            <a:endParaRPr b="0" lang="fr-FR" sz="4400" spc="-1" strike="noStrike">
+            <a:endParaRPr b="0" lang="en-US" sz="4400" spc="-1" strike="noStrike">
               <a:latin typeface="Arial"/>
             </a:endParaRPr>
           </a:p>
@@ -3107,7 +3107,7 @@
             <a:normAutofit/>
           </a:bodyPr>
           <a:p>
-            <a:endParaRPr b="0" lang="fr-FR" sz="3200" spc="-1" strike="noStrike">
+            <a:endParaRPr b="0" lang="en-US" sz="3200" spc="-1" strike="noStrike">
               <a:latin typeface="Arial"/>
             </a:endParaRPr>
           </a:p>
@@ -3137,7 +3137,7 @@
             <a:normAutofit/>
           </a:bodyPr>
           <a:p>
-            <a:endParaRPr b="0" lang="fr-FR" sz="3200" spc="-1" strike="noStrike">
+            <a:endParaRPr b="0" lang="en-US" sz="3200" spc="-1" strike="noStrike">
               <a:latin typeface="Arial"/>
             </a:endParaRPr>
           </a:p>
@@ -3167,7 +3167,7 @@
             <a:normAutofit/>
           </a:bodyPr>
           <a:p>
-            <a:endParaRPr b="0" lang="fr-FR" sz="3200" spc="-1" strike="noStrike">
+            <a:endParaRPr b="0" lang="en-US" sz="3200" spc="-1" strike="noStrike">
               <a:latin typeface="Arial"/>
             </a:endParaRPr>
           </a:p>
@@ -3197,7 +3197,7 @@
             <a:normAutofit/>
           </a:bodyPr>
           <a:p>
-            <a:endParaRPr b="0" lang="fr-FR" sz="3200" spc="-1" strike="noStrike">
+            <a:endParaRPr b="0" lang="en-US" sz="3200" spc="-1" strike="noStrike">
               <a:latin typeface="Arial"/>
             </a:endParaRPr>
           </a:p>
@@ -3250,7 +3250,7 @@
           </a:bodyPr>
           <a:p>
             <a:pPr algn="ctr"/>
-            <a:endParaRPr b="0" lang="fr-FR" sz="4400" spc="-1" strike="noStrike">
+            <a:endParaRPr b="0" lang="en-US" sz="4400" spc="-1" strike="noStrike">
               <a:latin typeface="Arial"/>
             </a:endParaRPr>
           </a:p>
@@ -3280,7 +3280,7 @@
             <a:normAutofit/>
           </a:bodyPr>
           <a:p>
-            <a:endParaRPr b="0" lang="fr-FR" sz="3200" spc="-1" strike="noStrike">
+            <a:endParaRPr b="0" lang="en-US" sz="3200" spc="-1" strike="noStrike">
               <a:latin typeface="Arial"/>
             </a:endParaRPr>
           </a:p>
@@ -3310,7 +3310,7 @@
             <a:normAutofit/>
           </a:bodyPr>
           <a:p>
-            <a:endParaRPr b="0" lang="fr-FR" sz="3200" spc="-1" strike="noStrike">
+            <a:endParaRPr b="0" lang="en-US" sz="3200" spc="-1" strike="noStrike">
               <a:latin typeface="Arial"/>
             </a:endParaRPr>
           </a:p>
@@ -3340,7 +3340,7 @@
             <a:normAutofit/>
           </a:bodyPr>
           <a:p>
-            <a:endParaRPr b="0" lang="fr-FR" sz="3200" spc="-1" strike="noStrike">
+            <a:endParaRPr b="0" lang="en-US" sz="3200" spc="-1" strike="noStrike">
               <a:latin typeface="Arial"/>
             </a:endParaRPr>
           </a:p>
@@ -3370,7 +3370,7 @@
             <a:normAutofit/>
           </a:bodyPr>
           <a:p>
-            <a:endParaRPr b="0" lang="fr-FR" sz="3200" spc="-1" strike="noStrike">
+            <a:endParaRPr b="0" lang="en-US" sz="3200" spc="-1" strike="noStrike">
               <a:latin typeface="Arial"/>
             </a:endParaRPr>
           </a:p>
@@ -3400,7 +3400,7 @@
             <a:normAutofit/>
           </a:bodyPr>
           <a:p>
-            <a:endParaRPr b="0" lang="fr-FR" sz="3200" spc="-1" strike="noStrike">
+            <a:endParaRPr b="0" lang="en-US" sz="3200" spc="-1" strike="noStrike">
               <a:latin typeface="Arial"/>
             </a:endParaRPr>
           </a:p>
@@ -3430,7 +3430,7 @@
             <a:normAutofit/>
           </a:bodyPr>
           <a:p>
-            <a:endParaRPr b="0" lang="fr-FR" sz="3200" spc="-1" strike="noStrike">
+            <a:endParaRPr b="0" lang="en-US" sz="3200" spc="-1" strike="noStrike">
               <a:latin typeface="Arial"/>
             </a:endParaRPr>
           </a:p>
@@ -3483,7 +3483,7 @@
           </a:bodyPr>
           <a:p>
             <a:pPr algn="ctr"/>
-            <a:endParaRPr b="0" lang="fr-FR" sz="4400" spc="-1" strike="noStrike">
+            <a:endParaRPr b="0" lang="en-US" sz="4400" spc="-1" strike="noStrike">
               <a:latin typeface="Arial"/>
             </a:endParaRPr>
           </a:p>
@@ -3513,7 +3513,7 @@
             <a:normAutofit/>
           </a:bodyPr>
           <a:p>
-            <a:endParaRPr b="0" lang="fr-FR" sz="3200" spc="-1" strike="noStrike">
+            <a:endParaRPr b="0" lang="en-US" sz="3200" spc="-1" strike="noStrike">
               <a:latin typeface="Arial"/>
             </a:endParaRPr>
           </a:p>
@@ -3543,7 +3543,7 @@
             <a:normAutofit/>
           </a:bodyPr>
           <a:p>
-            <a:endParaRPr b="0" lang="fr-FR" sz="3200" spc="-1" strike="noStrike">
+            <a:endParaRPr b="0" lang="en-US" sz="3200" spc="-1" strike="noStrike">
               <a:latin typeface="Arial"/>
             </a:endParaRPr>
           </a:p>
@@ -3596,7 +3596,7 @@
           </a:bodyPr>
           <a:p>
             <a:pPr algn="ctr"/>
-            <a:endParaRPr b="0" lang="fr-FR" sz="4400" spc="-1" strike="noStrike">
+            <a:endParaRPr b="0" lang="en-US" sz="4400" spc="-1" strike="noStrike">
               <a:latin typeface="Arial"/>
             </a:endParaRPr>
           </a:p>
@@ -3649,7 +3649,7 @@
           </a:bodyPr>
           <a:p>
             <a:pPr algn="ctr"/>
-            <a:endParaRPr b="0" lang="fr-FR" sz="3200" spc="-1" strike="noStrike">
+            <a:endParaRPr b="0" lang="en-US" sz="3200" spc="-1" strike="noStrike">
               <a:latin typeface="Arial"/>
             </a:endParaRPr>
           </a:p>
@@ -3702,7 +3702,7 @@
           </a:bodyPr>
           <a:p>
             <a:pPr algn="ctr"/>
-            <a:endParaRPr b="0" lang="fr-FR" sz="4400" spc="-1" strike="noStrike">
+            <a:endParaRPr b="0" lang="en-US" sz="4400" spc="-1" strike="noStrike">
               <a:latin typeface="Arial"/>
             </a:endParaRPr>
           </a:p>
@@ -3732,7 +3732,7 @@
             <a:normAutofit/>
           </a:bodyPr>
           <a:p>
-            <a:endParaRPr b="0" lang="fr-FR" sz="3200" spc="-1" strike="noStrike">
+            <a:endParaRPr b="0" lang="en-US" sz="3200" spc="-1" strike="noStrike">
               <a:latin typeface="Arial"/>
             </a:endParaRPr>
           </a:p>
@@ -3762,7 +3762,7 @@
             <a:normAutofit/>
           </a:bodyPr>
           <a:p>
-            <a:endParaRPr b="0" lang="fr-FR" sz="3200" spc="-1" strike="noStrike">
+            <a:endParaRPr b="0" lang="en-US" sz="3200" spc="-1" strike="noStrike">
               <a:latin typeface="Arial"/>
             </a:endParaRPr>
           </a:p>
@@ -3792,7 +3792,7 @@
             <a:normAutofit/>
           </a:bodyPr>
           <a:p>
-            <a:endParaRPr b="0" lang="fr-FR" sz="3200" spc="-1" strike="noStrike">
+            <a:endParaRPr b="0" lang="en-US" sz="3200" spc="-1" strike="noStrike">
               <a:latin typeface="Arial"/>
             </a:endParaRPr>
           </a:p>
@@ -3845,7 +3845,7 @@
           </a:bodyPr>
           <a:p>
             <a:pPr algn="ctr"/>
-            <a:endParaRPr b="0" lang="fr-FR" sz="4400" spc="-1" strike="noStrike">
+            <a:endParaRPr b="0" lang="en-US" sz="4400" spc="-1" strike="noStrike">
               <a:latin typeface="Arial"/>
             </a:endParaRPr>
           </a:p>
@@ -3875,7 +3875,7 @@
             <a:normAutofit/>
           </a:bodyPr>
           <a:p>
-            <a:endParaRPr b="0" lang="fr-FR" sz="3200" spc="-1" strike="noStrike">
+            <a:endParaRPr b="0" lang="en-US" sz="3200" spc="-1" strike="noStrike">
               <a:latin typeface="Arial"/>
             </a:endParaRPr>
           </a:p>
@@ -3905,7 +3905,7 @@
             <a:normAutofit/>
           </a:bodyPr>
           <a:p>
-            <a:endParaRPr b="0" lang="fr-FR" sz="3200" spc="-1" strike="noStrike">
+            <a:endParaRPr b="0" lang="en-US" sz="3200" spc="-1" strike="noStrike">
               <a:latin typeface="Arial"/>
             </a:endParaRPr>
           </a:p>
@@ -3935,7 +3935,7 @@
             <a:normAutofit/>
           </a:bodyPr>
           <a:p>
-            <a:endParaRPr b="0" lang="fr-FR" sz="3200" spc="-1" strike="noStrike">
+            <a:endParaRPr b="0" lang="en-US" sz="3200" spc="-1" strike="noStrike">
               <a:latin typeface="Arial"/>
             </a:endParaRPr>
           </a:p>
@@ -3988,7 +3988,7 @@
           </a:bodyPr>
           <a:p>
             <a:pPr algn="ctr"/>
-            <a:endParaRPr b="0" lang="fr-FR" sz="4400" spc="-1" strike="noStrike">
+            <a:endParaRPr b="0" lang="en-US" sz="4400" spc="-1" strike="noStrike">
               <a:latin typeface="Arial"/>
             </a:endParaRPr>
           </a:p>
@@ -4018,7 +4018,7 @@
             <a:normAutofit/>
           </a:bodyPr>
           <a:p>
-            <a:endParaRPr b="0" lang="fr-FR" sz="3200" spc="-1" strike="noStrike">
+            <a:endParaRPr b="0" lang="en-US" sz="3200" spc="-1" strike="noStrike">
               <a:latin typeface="Arial"/>
             </a:endParaRPr>
           </a:p>
@@ -4048,7 +4048,7 @@
             <a:normAutofit/>
           </a:bodyPr>
           <a:p>
-            <a:endParaRPr b="0" lang="fr-FR" sz="3200" spc="-1" strike="noStrike">
+            <a:endParaRPr b="0" lang="en-US" sz="3200" spc="-1" strike="noStrike">
               <a:latin typeface="Arial"/>
             </a:endParaRPr>
           </a:p>
@@ -4078,7 +4078,7 @@
             <a:normAutofit/>
           </a:bodyPr>
           <a:p>
-            <a:endParaRPr b="0" lang="fr-FR" sz="3200" spc="-1" strike="noStrike">
+            <a:endParaRPr b="0" lang="en-US" sz="3200" spc="-1" strike="noStrike">
               <a:latin typeface="Arial"/>
             </a:endParaRPr>
           </a:p>
@@ -4139,24 +4139,18 @@
           <a:p>
             <a:pPr algn="ctr"/>
             <a:r>
-              <a:rPr b="0" lang="fr-FR" sz="4400" spc="-1" strike="noStrike">
+              <a:rPr b="0" lang="en-US" sz="4400" spc="-1" strike="noStrike">
                 <a:latin typeface="Arial"/>
               </a:rPr>
-              <a:t>Cliquez pour </a:t>
+              <a:t>Click to edit the </a:t>
             </a:r>
             <a:r>
-              <a:rPr b="0" lang="fr-FR" sz="4400" spc="-1" strike="noStrike">
+              <a:rPr b="0" lang="en-US" sz="4400" spc="-1" strike="noStrike">
                 <a:latin typeface="Arial"/>
               </a:rPr>
-              <a:t>éditer le format </a:t>
+              <a:t>title text format</a:t>
             </a:r>
-            <a:r>
-              <a:rPr b="0" lang="fr-FR" sz="4400" spc="-1" strike="noStrike">
-                <a:latin typeface="Arial"/>
-              </a:rPr>
-              <a:t>du texte-titre</a:t>
-            </a:r>
-            <a:endParaRPr b="0" lang="fr-FR" sz="4400" spc="-1" strike="noStrike">
+            <a:endParaRPr b="0" lang="en-US" sz="4400" spc="-1" strike="noStrike">
               <a:latin typeface="Arial"/>
             </a:endParaRPr>
           </a:p>
@@ -4198,12 +4192,12 @@
               <a:buChar char=""/>
             </a:pPr>
             <a:r>
-              <a:rPr b="0" lang="fr-FR" sz="3200" spc="-1" strike="noStrike">
+              <a:rPr b="0" lang="en-US" sz="3200" spc="-1" strike="noStrike">
                 <a:latin typeface="Arial"/>
               </a:rPr>
-              <a:t>Cliquez pour éditer le format du plan de texte</a:t>
+              <a:t>Click to edit the outline text format</a:t>
             </a:r>
-            <a:endParaRPr b="0" lang="fr-FR" sz="3200" spc="-1" strike="noStrike">
+            <a:endParaRPr b="0" lang="en-US" sz="3200" spc="-1" strike="noStrike">
               <a:latin typeface="Arial"/>
             </a:endParaRPr>
           </a:p>
@@ -4220,12 +4214,12 @@
               <a:buChar char=""/>
             </a:pPr>
             <a:r>
-              <a:rPr b="0" lang="fr-FR" sz="2800" spc="-1" strike="noStrike">
+              <a:rPr b="0" lang="en-US" sz="2800" spc="-1" strike="noStrike">
                 <a:latin typeface="Arial"/>
               </a:rPr>
-              <a:t>Second niveau de plan</a:t>
+              <a:t>Second Outline Level</a:t>
             </a:r>
-            <a:endParaRPr b="0" lang="fr-FR" sz="2800" spc="-1" strike="noStrike">
+            <a:endParaRPr b="0" lang="en-US" sz="2800" spc="-1" strike="noStrike">
               <a:latin typeface="Arial"/>
             </a:endParaRPr>
           </a:p>
@@ -4242,12 +4236,12 @@
               <a:buChar char=""/>
             </a:pPr>
             <a:r>
-              <a:rPr b="0" lang="fr-FR" sz="2400" spc="-1" strike="noStrike">
+              <a:rPr b="0" lang="en-US" sz="2400" spc="-1" strike="noStrike">
                 <a:latin typeface="Arial"/>
               </a:rPr>
-              <a:t>Troisième niveau de plan</a:t>
+              <a:t>Third Outline Level</a:t>
             </a:r>
-            <a:endParaRPr b="0" lang="fr-FR" sz="2400" spc="-1" strike="noStrike">
+            <a:endParaRPr b="0" lang="en-US" sz="2400" spc="-1" strike="noStrike">
               <a:latin typeface="Arial"/>
             </a:endParaRPr>
           </a:p>
@@ -4264,12 +4258,12 @@
               <a:buChar char=""/>
             </a:pPr>
             <a:r>
-              <a:rPr b="0" lang="fr-FR" sz="2000" spc="-1" strike="noStrike">
+              <a:rPr b="0" lang="en-US" sz="2000" spc="-1" strike="noStrike">
                 <a:latin typeface="Arial"/>
               </a:rPr>
-              <a:t>Quatrième niveau de plan</a:t>
+              <a:t>Fourth Outline Level</a:t>
             </a:r>
-            <a:endParaRPr b="0" lang="fr-FR" sz="2000" spc="-1" strike="noStrike">
+            <a:endParaRPr b="0" lang="en-US" sz="2000" spc="-1" strike="noStrike">
               <a:latin typeface="Arial"/>
             </a:endParaRPr>
           </a:p>
@@ -4286,12 +4280,12 @@
               <a:buChar char=""/>
             </a:pPr>
             <a:r>
-              <a:rPr b="0" lang="fr-FR" sz="2000" spc="-1" strike="noStrike">
+              <a:rPr b="0" lang="en-US" sz="2000" spc="-1" strike="noStrike">
                 <a:latin typeface="Arial"/>
               </a:rPr>
-              <a:t>Cinquième niveau de plan</a:t>
+              <a:t>Fifth Outline Level</a:t>
             </a:r>
-            <a:endParaRPr b="0" lang="fr-FR" sz="2000" spc="-1" strike="noStrike">
+            <a:endParaRPr b="0" lang="en-US" sz="2000" spc="-1" strike="noStrike">
               <a:latin typeface="Arial"/>
             </a:endParaRPr>
           </a:p>
@@ -4308,12 +4302,12 @@
               <a:buChar char=""/>
             </a:pPr>
             <a:r>
-              <a:rPr b="0" lang="fr-FR" sz="2000" spc="-1" strike="noStrike">
+              <a:rPr b="0" lang="en-US" sz="2000" spc="-1" strike="noStrike">
                 <a:latin typeface="Arial"/>
               </a:rPr>
-              <a:t>Sixième niveau de plan</a:t>
+              <a:t>Sixth Outline Level</a:t>
             </a:r>
-            <a:endParaRPr b="0" lang="fr-FR" sz="2000" spc="-1" strike="noStrike">
+            <a:endParaRPr b="0" lang="en-US" sz="2000" spc="-1" strike="noStrike">
               <a:latin typeface="Arial"/>
             </a:endParaRPr>
           </a:p>
@@ -4330,12 +4324,12 @@
               <a:buChar char=""/>
             </a:pPr>
             <a:r>
-              <a:rPr b="0" lang="fr-FR" sz="2000" spc="-1" strike="noStrike">
+              <a:rPr b="0" lang="en-US" sz="2000" spc="-1" strike="noStrike">
                 <a:latin typeface="Arial"/>
               </a:rPr>
-              <a:t>Septième niveau de plan</a:t>
+              <a:t>Seventh Outline Level</a:t>
             </a:r>
-            <a:endParaRPr b="0" lang="fr-FR" sz="2000" spc="-1" strike="noStrike">
+            <a:endParaRPr b="0" lang="en-US" sz="2000" spc="-1" strike="noStrike">
               <a:latin typeface="Arial"/>
             </a:endParaRPr>
           </a:p>
@@ -4411,12 +4405,12 @@
           <a:p>
             <a:pPr algn="ctr"/>
             <a:r>
-              <a:rPr b="0" lang="fr-FR" sz="4400" spc="-1" strike="noStrike">
+              <a:rPr b="0" lang="en-US" sz="4400" spc="-1" strike="noStrike">
                 <a:latin typeface="Arial"/>
               </a:rPr>
-              <a:t>Cliquez pour éditer le format du texte-titre</a:t>
+              <a:t>Click to edit the title text format</a:t>
             </a:r>
-            <a:endParaRPr b="0" lang="fr-FR" sz="4400" spc="-1" strike="noStrike">
+            <a:endParaRPr b="0" lang="en-US" sz="4400" spc="-1" strike="noStrike">
               <a:latin typeface="Arial"/>
             </a:endParaRPr>
           </a:p>
@@ -4458,12 +4452,12 @@
               <a:buChar char=""/>
             </a:pPr>
             <a:r>
-              <a:rPr b="0" lang="fr-FR" sz="3200" spc="-1" strike="noStrike">
+              <a:rPr b="0" lang="en-US" sz="3200" spc="-1" strike="noStrike">
                 <a:latin typeface="Arial"/>
               </a:rPr>
-              <a:t>Cliquez pour éditer le format du plan de texte</a:t>
+              <a:t>Click to edit the outline text format</a:t>
             </a:r>
-            <a:endParaRPr b="0" lang="fr-FR" sz="3200" spc="-1" strike="noStrike">
+            <a:endParaRPr b="0" lang="en-US" sz="3200" spc="-1" strike="noStrike">
               <a:latin typeface="Arial"/>
             </a:endParaRPr>
           </a:p>
@@ -4480,12 +4474,12 @@
               <a:buChar char=""/>
             </a:pPr>
             <a:r>
-              <a:rPr b="0" lang="fr-FR" sz="2800" spc="-1" strike="noStrike">
+              <a:rPr b="0" lang="en-US" sz="2800" spc="-1" strike="noStrike">
                 <a:latin typeface="Arial"/>
               </a:rPr>
-              <a:t>Second niveau de plan</a:t>
+              <a:t>Second Outline Level</a:t>
             </a:r>
-            <a:endParaRPr b="0" lang="fr-FR" sz="2800" spc="-1" strike="noStrike">
+            <a:endParaRPr b="0" lang="en-US" sz="2800" spc="-1" strike="noStrike">
               <a:latin typeface="Arial"/>
             </a:endParaRPr>
           </a:p>
@@ -4502,12 +4496,12 @@
               <a:buChar char=""/>
             </a:pPr>
             <a:r>
-              <a:rPr b="0" lang="fr-FR" sz="2400" spc="-1" strike="noStrike">
+              <a:rPr b="0" lang="en-US" sz="2400" spc="-1" strike="noStrike">
                 <a:latin typeface="Arial"/>
               </a:rPr>
-              <a:t>Troisième niveau de plan</a:t>
+              <a:t>Third Outline Level</a:t>
             </a:r>
-            <a:endParaRPr b="0" lang="fr-FR" sz="2400" spc="-1" strike="noStrike">
+            <a:endParaRPr b="0" lang="en-US" sz="2400" spc="-1" strike="noStrike">
               <a:latin typeface="Arial"/>
             </a:endParaRPr>
           </a:p>
@@ -4524,12 +4518,12 @@
               <a:buChar char=""/>
             </a:pPr>
             <a:r>
-              <a:rPr b="0" lang="fr-FR" sz="2000" spc="-1" strike="noStrike">
+              <a:rPr b="0" lang="en-US" sz="2000" spc="-1" strike="noStrike">
                 <a:latin typeface="Arial"/>
               </a:rPr>
-              <a:t>Quatrième niveau de plan</a:t>
+              <a:t>Fourth Outline Level</a:t>
             </a:r>
-            <a:endParaRPr b="0" lang="fr-FR" sz="2000" spc="-1" strike="noStrike">
+            <a:endParaRPr b="0" lang="en-US" sz="2000" spc="-1" strike="noStrike">
               <a:latin typeface="Arial"/>
             </a:endParaRPr>
           </a:p>
@@ -4546,12 +4540,12 @@
               <a:buChar char=""/>
             </a:pPr>
             <a:r>
-              <a:rPr b="0" lang="fr-FR" sz="2000" spc="-1" strike="noStrike">
+              <a:rPr b="0" lang="en-US" sz="2000" spc="-1" strike="noStrike">
                 <a:latin typeface="Arial"/>
               </a:rPr>
-              <a:t>Cinquième niveau de plan</a:t>
+              <a:t>Fifth Outline Level</a:t>
             </a:r>
-            <a:endParaRPr b="0" lang="fr-FR" sz="2000" spc="-1" strike="noStrike">
+            <a:endParaRPr b="0" lang="en-US" sz="2000" spc="-1" strike="noStrike">
               <a:latin typeface="Arial"/>
             </a:endParaRPr>
           </a:p>
@@ -4568,12 +4562,12 @@
               <a:buChar char=""/>
             </a:pPr>
             <a:r>
-              <a:rPr b="0" lang="fr-FR" sz="2000" spc="-1" strike="noStrike">
+              <a:rPr b="0" lang="en-US" sz="2000" spc="-1" strike="noStrike">
                 <a:latin typeface="Arial"/>
               </a:rPr>
-              <a:t>Sixième niveau de plan</a:t>
+              <a:t>Sixth Outline Level</a:t>
             </a:r>
-            <a:endParaRPr b="0" lang="fr-FR" sz="2000" spc="-1" strike="noStrike">
+            <a:endParaRPr b="0" lang="en-US" sz="2000" spc="-1" strike="noStrike">
               <a:latin typeface="Arial"/>
             </a:endParaRPr>
           </a:p>
@@ -4590,12 +4584,12 @@
               <a:buChar char=""/>
             </a:pPr>
             <a:r>
-              <a:rPr b="0" lang="fr-FR" sz="2000" spc="-1" strike="noStrike">
+              <a:rPr b="0" lang="en-US" sz="2000" spc="-1" strike="noStrike">
                 <a:latin typeface="Arial"/>
               </a:rPr>
-              <a:t>Septième niveau de plan</a:t>
+              <a:t>Seventh Outline Level</a:t>
             </a:r>
-            <a:endParaRPr b="0" lang="fr-FR" sz="2000" spc="-1" strike="noStrike">
+            <a:endParaRPr b="0" lang="en-US" sz="2000" spc="-1" strike="noStrike">
               <a:latin typeface="Arial"/>
             </a:endParaRPr>
           </a:p>
@@ -4671,12 +4665,12 @@
           <a:p>
             <a:pPr algn="ctr"/>
             <a:r>
-              <a:rPr b="0" lang="fr-FR" sz="4400" spc="-1" strike="noStrike">
+              <a:rPr b="0" lang="en-US" sz="4400" spc="-1" strike="noStrike">
                 <a:latin typeface="Arial"/>
               </a:rPr>
-              <a:t>Cliquez pour éditer le format du texte-titre</a:t>
+              <a:t>Click to edit the title text format</a:t>
             </a:r>
-            <a:endParaRPr b="0" lang="fr-FR" sz="4400" spc="-1" strike="noStrike">
+            <a:endParaRPr b="0" lang="en-US" sz="4400" spc="-1" strike="noStrike">
               <a:latin typeface="Arial"/>
             </a:endParaRPr>
           </a:p>
@@ -4718,12 +4712,12 @@
               <a:buChar char=""/>
             </a:pPr>
             <a:r>
-              <a:rPr b="0" lang="fr-FR" sz="3200" spc="-1" strike="noStrike">
+              <a:rPr b="0" lang="en-US" sz="3200" spc="-1" strike="noStrike">
                 <a:latin typeface="Arial"/>
               </a:rPr>
-              <a:t>Cliquez pour éditer le format du plan de texte</a:t>
+              <a:t>Click to edit the outline text format</a:t>
             </a:r>
-            <a:endParaRPr b="0" lang="fr-FR" sz="3200" spc="-1" strike="noStrike">
+            <a:endParaRPr b="0" lang="en-US" sz="3200" spc="-1" strike="noStrike">
               <a:latin typeface="Arial"/>
             </a:endParaRPr>
           </a:p>
@@ -4740,12 +4734,12 @@
               <a:buChar char=""/>
             </a:pPr>
             <a:r>
-              <a:rPr b="0" lang="fr-FR" sz="2800" spc="-1" strike="noStrike">
+              <a:rPr b="0" lang="en-US" sz="2800" spc="-1" strike="noStrike">
                 <a:latin typeface="Arial"/>
               </a:rPr>
-              <a:t>Second niveau de plan</a:t>
+              <a:t>Second Outline Level</a:t>
             </a:r>
-            <a:endParaRPr b="0" lang="fr-FR" sz="2800" spc="-1" strike="noStrike">
+            <a:endParaRPr b="0" lang="en-US" sz="2800" spc="-1" strike="noStrike">
               <a:latin typeface="Arial"/>
             </a:endParaRPr>
           </a:p>
@@ -4762,12 +4756,12 @@
               <a:buChar char=""/>
             </a:pPr>
             <a:r>
-              <a:rPr b="0" lang="fr-FR" sz="2400" spc="-1" strike="noStrike">
+              <a:rPr b="0" lang="en-US" sz="2400" spc="-1" strike="noStrike">
                 <a:latin typeface="Arial"/>
               </a:rPr>
-              <a:t>Troisième niveau de plan</a:t>
+              <a:t>Third Outline Level</a:t>
             </a:r>
-            <a:endParaRPr b="0" lang="fr-FR" sz="2400" spc="-1" strike="noStrike">
+            <a:endParaRPr b="0" lang="en-US" sz="2400" spc="-1" strike="noStrike">
               <a:latin typeface="Arial"/>
             </a:endParaRPr>
           </a:p>
@@ -4784,12 +4778,12 @@
               <a:buChar char=""/>
             </a:pPr>
             <a:r>
-              <a:rPr b="0" lang="fr-FR" sz="2000" spc="-1" strike="noStrike">
+              <a:rPr b="0" lang="en-US" sz="2000" spc="-1" strike="noStrike">
                 <a:latin typeface="Arial"/>
               </a:rPr>
-              <a:t>Quatrième niveau de plan</a:t>
+              <a:t>Fourth Outline Level</a:t>
             </a:r>
-            <a:endParaRPr b="0" lang="fr-FR" sz="2000" spc="-1" strike="noStrike">
+            <a:endParaRPr b="0" lang="en-US" sz="2000" spc="-1" strike="noStrike">
               <a:latin typeface="Arial"/>
             </a:endParaRPr>
           </a:p>
@@ -4806,12 +4800,12 @@
               <a:buChar char=""/>
             </a:pPr>
             <a:r>
-              <a:rPr b="0" lang="fr-FR" sz="2000" spc="-1" strike="noStrike">
+              <a:rPr b="0" lang="en-US" sz="2000" spc="-1" strike="noStrike">
                 <a:latin typeface="Arial"/>
               </a:rPr>
-              <a:t>Cinquième niveau de plan</a:t>
+              <a:t>Fifth Outline Level</a:t>
             </a:r>
-            <a:endParaRPr b="0" lang="fr-FR" sz="2000" spc="-1" strike="noStrike">
+            <a:endParaRPr b="0" lang="en-US" sz="2000" spc="-1" strike="noStrike">
               <a:latin typeface="Arial"/>
             </a:endParaRPr>
           </a:p>
@@ -4828,12 +4822,12 @@
               <a:buChar char=""/>
             </a:pPr>
             <a:r>
-              <a:rPr b="0" lang="fr-FR" sz="2000" spc="-1" strike="noStrike">
+              <a:rPr b="0" lang="en-US" sz="2000" spc="-1" strike="noStrike">
                 <a:latin typeface="Arial"/>
               </a:rPr>
-              <a:t>Sixième niveau de plan</a:t>
+              <a:t>Sixth Outline Level</a:t>
             </a:r>
-            <a:endParaRPr b="0" lang="fr-FR" sz="2000" spc="-1" strike="noStrike">
+            <a:endParaRPr b="0" lang="en-US" sz="2000" spc="-1" strike="noStrike">
               <a:latin typeface="Arial"/>
             </a:endParaRPr>
           </a:p>
@@ -4850,12 +4844,12 @@
               <a:buChar char=""/>
             </a:pPr>
             <a:r>
-              <a:rPr b="0" lang="fr-FR" sz="2000" spc="-1" strike="noStrike">
+              <a:rPr b="0" lang="en-US" sz="2000" spc="-1" strike="noStrike">
                 <a:latin typeface="Arial"/>
               </a:rPr>
-              <a:t>Septième niveau de plan</a:t>
+              <a:t>Seventh Outline Level</a:t>
             </a:r>
-            <a:endParaRPr b="0" lang="fr-FR" sz="2000" spc="-1" strike="noStrike">
+            <a:endParaRPr b="0" lang="en-US" sz="2000" spc="-1" strike="noStrike">
               <a:latin typeface="Arial"/>
             </a:endParaRPr>
           </a:p>
@@ -4914,7 +4908,7 @@
         <p:spPr>
           <a:xfrm>
             <a:off x="0" y="0"/>
-            <a:ext cx="12190320" cy="6856200"/>
+            <a:ext cx="12189960" cy="6855840"/>
           </a:xfrm>
           <a:prstGeom prst="rect">
             <a:avLst/>
@@ -4953,7 +4947,7 @@
         <p:spPr>
           <a:xfrm>
             <a:off x="6746760" y="1783800"/>
-            <a:ext cx="4643280" cy="2887200"/>
+            <a:ext cx="4642920" cy="2886840"/>
           </a:xfrm>
           <a:prstGeom prst="rect">
             <a:avLst/>
@@ -4980,7 +4974,7 @@
               </a:lnSpc>
             </a:pPr>
             <a:r>
-              <a:rPr b="0" lang="fr-FR" sz="6000" spc="-1" strike="noStrike">
+              <a:rPr b="0" lang="en-US" sz="6000" spc="-1" strike="noStrike">
                 <a:solidFill>
                   <a:srgbClr val="ffffff"/>
                 </a:solidFill>
@@ -4989,7 +4983,7 @@
               </a:rPr>
               <a:t>Le projet « Git-moi tout »</a:t>
             </a:r>
-            <a:endParaRPr b="0" lang="fr-FR" sz="6000" spc="-1" strike="noStrike">
+            <a:endParaRPr b="0" lang="en-US" sz="6000" spc="-1" strike="noStrike">
               <a:latin typeface="Arial"/>
             </a:endParaRPr>
           </a:p>
@@ -5004,7 +4998,7 @@
         <p:spPr>
           <a:xfrm>
             <a:off x="6746760" y="4750920"/>
-            <a:ext cx="4643280" cy="1146240"/>
+            <a:ext cx="4642920" cy="1145880"/>
           </a:xfrm>
           <a:prstGeom prst="rect">
             <a:avLst/>
@@ -5034,7 +5028,7 @@
               </a:spcBef>
             </a:pPr>
             <a:r>
-              <a:rPr b="0" lang="fr-FR" sz="2000" spc="-1" strike="noStrike">
+              <a:rPr b="0" lang="en-US" sz="2000" spc="-1" strike="noStrike">
                 <a:solidFill>
                   <a:srgbClr val="ffffff"/>
                 </a:solidFill>
@@ -5043,7 +5037,7 @@
               </a:rPr>
               <a:t>Le répertoire pour tout savoir sur GIT</a:t>
             </a:r>
-            <a:endParaRPr b="0" lang="fr-FR" sz="2000" spc="-1" strike="noStrike">
+            <a:endParaRPr b="0" lang="en-US" sz="2000" spc="-1" strike="noStrike">
               <a:latin typeface="Arial"/>
             </a:endParaRPr>
           </a:p>
@@ -5057,8 +5051,8 @@
         </p:nvSpPr>
         <p:spPr>
           <a:xfrm flipH="1">
-            <a:off x="-1440" y="0"/>
-            <a:ext cx="6171120" cy="6856200"/>
+            <a:off x="-2160" y="0"/>
+            <a:ext cx="6170760" cy="6855840"/>
           </a:xfrm>
           <a:custGeom>
             <a:avLst/>
@@ -5129,7 +5123,7 @@
         <p:spPr>
           <a:xfrm>
             <a:off x="0" y="0"/>
-            <a:ext cx="6022440" cy="6856200"/>
+            <a:ext cx="6022080" cy="6855840"/>
           </a:xfrm>
           <a:custGeom>
             <a:avLst/>
@@ -5202,7 +5196,7 @@
         <p:spPr>
           <a:xfrm>
             <a:off x="419400" y="721080"/>
-            <a:ext cx="4046040" cy="4046040"/>
+            <a:ext cx="4045680" cy="4045680"/>
           </a:xfrm>
           <a:prstGeom prst="rect">
             <a:avLst/>
@@ -5258,7 +5252,7 @@
         <p:spPr>
           <a:xfrm>
             <a:off x="0" y="0"/>
-            <a:ext cx="4652640" cy="6856200"/>
+            <a:ext cx="4652280" cy="6855840"/>
           </a:xfrm>
           <a:prstGeom prst="rect">
             <a:avLst/>
@@ -5289,7 +5283,7 @@
         <p:spPr>
           <a:xfrm>
             <a:off x="643320" y="643320"/>
-            <a:ext cx="3362040" cy="1595520"/>
+            <a:ext cx="3361680" cy="1595160"/>
           </a:xfrm>
           <a:prstGeom prst="rect">
             <a:avLst/>
@@ -5319,7 +5313,7 @@
               </a:lnSpc>
             </a:pPr>
             <a:r>
-              <a:rPr b="0" lang="fr-FR" sz="2800" spc="-1" strike="noStrike">
+              <a:rPr b="0" lang="en-US" sz="2800" spc="-1" strike="noStrike">
                 <a:solidFill>
                   <a:srgbClr val="ffffff"/>
                 </a:solidFill>
@@ -5328,7 +5322,7 @@
               </a:rPr>
               <a:t>Le but du projet « GIT-moi-tout »</a:t>
             </a:r>
-            <a:endParaRPr b="0" lang="fr-FR" sz="2800" spc="-1" strike="noStrike">
+            <a:endParaRPr b="0" lang="en-US" sz="2800" spc="-1" strike="noStrike">
               <a:latin typeface="Arial"/>
             </a:endParaRPr>
           </a:p>
@@ -5343,7 +5337,7 @@
         <p:spPr>
           <a:xfrm>
             <a:off x="643320" y="2638080"/>
-            <a:ext cx="3362040" cy="3413880"/>
+            <a:ext cx="3361680" cy="3413520"/>
           </a:xfrm>
           <a:prstGeom prst="rect">
             <a:avLst/>
@@ -5373,7 +5367,7 @@
               </a:spcBef>
             </a:pPr>
             <a:r>
-              <a:rPr b="0" lang="fr-FR" sz="1700" spc="-1" strike="noStrike">
+              <a:rPr b="0" lang="en-US" sz="1700" spc="-1" strike="noStrike">
                 <a:solidFill>
                   <a:srgbClr val="ffffff"/>
                 </a:solidFill>
@@ -5382,12 +5376,12 @@
               </a:rPr>
               <a:t>Permettre aux novices et au moins novices de comprendre :</a:t>
             </a:r>
-            <a:endParaRPr b="0" lang="fr-FR" sz="1700" spc="-1" strike="noStrike">
-              <a:latin typeface="Arial"/>
-            </a:endParaRPr>
-          </a:p>
-          <a:p>
-            <a:pPr lvl="1" marL="685800" indent="-226800">
+            <a:endParaRPr b="0" lang="en-US" sz="1700" spc="-1" strike="noStrike">
+              <a:latin typeface="Arial"/>
+            </a:endParaRPr>
+          </a:p>
+          <a:p>
+            <a:pPr lvl="1" marL="685800" indent="-226440">
               <a:lnSpc>
                 <a:spcPct val="90000"/>
               </a:lnSpc>
@@ -5401,7 +5395,7 @@
               <a:buChar char="•"/>
             </a:pPr>
             <a:r>
-              <a:rPr b="0" lang="fr-FR" sz="1700" spc="-1" strike="noStrike">
+              <a:rPr b="0" lang="en-US" sz="1700" spc="-1" strike="noStrike">
                 <a:solidFill>
                   <a:srgbClr val="ffffff"/>
                 </a:solidFill>
@@ -5410,12 +5404,12 @@
               </a:rPr>
               <a:t>C’est quoi GIT et pour quel usage ?</a:t>
             </a:r>
-            <a:endParaRPr b="0" lang="fr-FR" sz="1700" spc="-1" strike="noStrike">
-              <a:latin typeface="Arial"/>
-            </a:endParaRPr>
-          </a:p>
-          <a:p>
-            <a:pPr lvl="1" marL="685800" indent="-226800">
+            <a:endParaRPr b="0" lang="en-US" sz="1700" spc="-1" strike="noStrike">
+              <a:latin typeface="Arial"/>
+            </a:endParaRPr>
+          </a:p>
+          <a:p>
+            <a:pPr lvl="1" marL="685800" indent="-226440">
               <a:lnSpc>
                 <a:spcPct val="90000"/>
               </a:lnSpc>
@@ -5429,7 +5423,7 @@
               <a:buChar char="•"/>
             </a:pPr>
             <a:r>
-              <a:rPr b="0" lang="fr-FR" sz="1700" spc="-1" strike="noStrike">
+              <a:rPr b="0" lang="en-US" sz="1700" spc="-1" strike="noStrike">
                 <a:solidFill>
                   <a:srgbClr val="ffffff"/>
                 </a:solidFill>
@@ -5438,12 +5432,12 @@
               </a:rPr>
               <a:t>Comment fonctionne-t-il?</a:t>
             </a:r>
-            <a:endParaRPr b="0" lang="fr-FR" sz="1700" spc="-1" strike="noStrike">
-              <a:latin typeface="Arial"/>
-            </a:endParaRPr>
-          </a:p>
-          <a:p>
-            <a:pPr lvl="1" marL="685800" indent="-226800">
+            <a:endParaRPr b="0" lang="en-US" sz="1700" spc="-1" strike="noStrike">
+              <a:latin typeface="Arial"/>
+            </a:endParaRPr>
+          </a:p>
+          <a:p>
+            <a:pPr lvl="1" marL="685800" indent="-226440">
               <a:lnSpc>
                 <a:spcPct val="90000"/>
               </a:lnSpc>
@@ -5457,7 +5451,7 @@
               <a:buChar char="•"/>
             </a:pPr>
             <a:r>
-              <a:rPr b="0" lang="fr-FR" sz="1700" spc="-1" strike="noStrike">
+              <a:rPr b="0" lang="en-US" sz="1700" spc="-1" strike="noStrike">
                 <a:solidFill>
                   <a:srgbClr val="ffffff"/>
                 </a:solidFill>
@@ -5466,12 +5460,12 @@
               </a:rPr>
               <a:t>Comment bien démarrer avec GIT</a:t>
             </a:r>
-            <a:endParaRPr b="0" lang="fr-FR" sz="1700" spc="-1" strike="noStrike">
-              <a:latin typeface="Arial"/>
-            </a:endParaRPr>
-          </a:p>
-          <a:p>
-            <a:pPr lvl="1" marL="685800" indent="-226800">
+            <a:endParaRPr b="0" lang="en-US" sz="1700" spc="-1" strike="noStrike">
+              <a:latin typeface="Arial"/>
+            </a:endParaRPr>
+          </a:p>
+          <a:p>
+            <a:pPr lvl="1" marL="685800" indent="-226440">
               <a:lnSpc>
                 <a:spcPct val="90000"/>
               </a:lnSpc>
@@ -5485,7 +5479,7 @@
               <a:buChar char="•"/>
             </a:pPr>
             <a:r>
-              <a:rPr b="0" lang="fr-FR" sz="1700" spc="-1" strike="noStrike">
+              <a:rPr b="0" lang="en-US" sz="1700" spc="-1" strike="noStrike">
                 <a:solidFill>
                   <a:srgbClr val="ffffff"/>
                 </a:solidFill>
@@ -5494,7 +5488,7 @@
               </a:rPr>
               <a:t>Répondre aux questions et au problèmes que l’ont se poser en utilisant GIT</a:t>
             </a:r>
-            <a:endParaRPr b="0" lang="fr-FR" sz="1700" spc="-1" strike="noStrike">
+            <a:endParaRPr b="0" lang="en-US" sz="1700" spc="-1" strike="noStrike">
               <a:latin typeface="Arial"/>
             </a:endParaRPr>
           </a:p>
@@ -5507,7 +5501,7 @@
                 <a:spcPts val="1001"/>
               </a:spcBef>
             </a:pPr>
-            <a:endParaRPr b="0" lang="fr-FR" sz="1700" spc="-1" strike="noStrike">
+            <a:endParaRPr b="0" lang="en-US" sz="1700" spc="-1" strike="noStrike">
               <a:latin typeface="Arial"/>
             </a:endParaRPr>
           </a:p>
@@ -5517,7 +5511,7 @@
                 <a:spcPct val="100000"/>
               </a:lnSpc>
             </a:pPr>
-            <a:endParaRPr b="0" lang="fr-FR" sz="1700" spc="-1" strike="noStrike">
+            <a:endParaRPr b="0" lang="en-US" sz="1700" spc="-1" strike="noStrike">
               <a:latin typeface="Arial"/>
             </a:endParaRPr>
           </a:p>
@@ -5536,7 +5530,7 @@
         <p:spPr>
           <a:xfrm>
             <a:off x="5198760" y="1295640"/>
-            <a:ext cx="6248880" cy="4686120"/>
+            <a:ext cx="6248520" cy="4685760"/>
           </a:xfrm>
           <a:prstGeom prst="rect">
             <a:avLst/>
@@ -5559,7 +5553,7 @@
         <p:spPr>
           <a:xfrm>
             <a:off x="11174040" y="137520"/>
-            <a:ext cx="1016280" cy="1010160"/>
+            <a:ext cx="1015920" cy="1009800"/>
           </a:xfrm>
           <a:prstGeom prst="rect">
             <a:avLst/>
@@ -5608,7 +5602,7 @@
         <p:spPr>
           <a:xfrm>
             <a:off x="838080" y="1825560"/>
-            <a:ext cx="10513800" cy="4349520"/>
+            <a:ext cx="10513440" cy="4349160"/>
           </a:xfrm>
           <a:prstGeom prst="rect">
             <a:avLst/>
@@ -5634,7 +5628,7 @@
         <p:spPr>
           <a:xfrm>
             <a:off x="8352000" y="2664000"/>
-            <a:ext cx="3238560" cy="3017160"/>
+            <a:ext cx="3238200" cy="3017160"/>
           </a:xfrm>
           <a:prstGeom prst="rect">
             <a:avLst/>
@@ -5661,7 +5655,7 @@
               </a:lnSpc>
             </a:pPr>
             <a:r>
-              <a:rPr b="1" lang="fr-FR" sz="1800" spc="-1" strike="noStrike" u="sng">
+              <a:rPr b="1" lang="en-US" sz="1800" spc="-1" strike="noStrike" u="sng">
                 <a:solidFill>
                   <a:srgbClr val="ffffff"/>
                 </a:solidFill>
@@ -5671,7 +5665,7 @@
               </a:rPr>
               <a:t>Home : Présentation de Git.</a:t>
             </a:r>
-            <a:endParaRPr b="0" lang="fr-FR" sz="1800" spc="-1" strike="noStrike">
+            <a:endParaRPr b="0" lang="en-US" sz="1800" spc="-1" strike="noStrike">
               <a:latin typeface="Arial"/>
             </a:endParaRPr>
           </a:p>
@@ -5681,7 +5675,7 @@
                 <a:spcPct val="100000"/>
               </a:lnSpc>
             </a:pPr>
-            <a:endParaRPr b="0" lang="fr-FR" sz="1800" spc="-1" strike="noStrike">
+            <a:endParaRPr b="0" lang="en-US" sz="1800" spc="-1" strike="noStrike">
               <a:latin typeface="Arial"/>
             </a:endParaRPr>
           </a:p>
@@ -5692,7 +5686,7 @@
               </a:lnSpc>
             </a:pPr>
             <a:r>
-              <a:rPr b="1" lang="fr-FR" sz="1800" spc="-1" strike="noStrike" u="sng">
+              <a:rPr b="1" lang="en-US" sz="1800" spc="-1" strike="noStrike" u="sng">
                 <a:solidFill>
                   <a:srgbClr val="ffffff"/>
                 </a:solidFill>
@@ -5702,7 +5696,7 @@
               </a:rPr>
               <a:t>Installation et Configuration.</a:t>
             </a:r>
-            <a:endParaRPr b="0" lang="fr-FR" sz="1800" spc="-1" strike="noStrike">
+            <a:endParaRPr b="0" lang="en-US" sz="1800" spc="-1" strike="noStrike">
               <a:latin typeface="Arial"/>
             </a:endParaRPr>
           </a:p>
@@ -5712,7 +5706,7 @@
                 <a:spcPct val="100000"/>
               </a:lnSpc>
             </a:pPr>
-            <a:endParaRPr b="0" lang="fr-FR" sz="1800" spc="-1" strike="noStrike">
+            <a:endParaRPr b="0" lang="en-US" sz="1800" spc="-1" strike="noStrike">
               <a:latin typeface="Arial"/>
             </a:endParaRPr>
           </a:p>
@@ -5723,7 +5717,7 @@
               </a:lnSpc>
             </a:pPr>
             <a:r>
-              <a:rPr b="1" lang="fr-FR" sz="1800" spc="-1" strike="noStrike" u="sng">
+              <a:rPr b="1" lang="en-US" sz="1800" spc="-1" strike="noStrike" u="sng">
                 <a:solidFill>
                   <a:srgbClr val="ffffff"/>
                 </a:solidFill>
@@ -5733,7 +5727,7 @@
               </a:rPr>
               <a:t>Les Fonctionnalités.</a:t>
             </a:r>
-            <a:endParaRPr b="0" lang="fr-FR" sz="1800" spc="-1" strike="noStrike">
+            <a:endParaRPr b="0" lang="en-US" sz="1800" spc="-1" strike="noStrike">
               <a:latin typeface="Arial"/>
             </a:endParaRPr>
           </a:p>
@@ -5743,7 +5737,7 @@
                 <a:spcPct val="100000"/>
               </a:lnSpc>
             </a:pPr>
-            <a:endParaRPr b="0" lang="fr-FR" sz="1800" spc="-1" strike="noStrike">
+            <a:endParaRPr b="0" lang="en-US" sz="1800" spc="-1" strike="noStrike">
               <a:latin typeface="Arial"/>
             </a:endParaRPr>
           </a:p>
@@ -5754,7 +5748,7 @@
               </a:lnSpc>
             </a:pPr>
             <a:r>
-              <a:rPr b="1" lang="fr-FR" sz="1800" spc="-1" strike="noStrike" u="sng">
+              <a:rPr b="1" lang="en-US" sz="1800" spc="-1" strike="noStrike" u="sng">
                 <a:solidFill>
                   <a:srgbClr val="ffffff"/>
                 </a:solidFill>
@@ -5764,7 +5758,7 @@
               </a:rPr>
               <a:t>1 Erreur / 1 Solution</a:t>
             </a:r>
-            <a:endParaRPr b="0" lang="fr-FR" sz="1800" spc="-1" strike="noStrike">
+            <a:endParaRPr b="0" lang="en-US" sz="1800" spc="-1" strike="noStrike">
               <a:latin typeface="Arial"/>
             </a:endParaRPr>
           </a:p>
@@ -5774,7 +5768,7 @@
                 <a:spcPct val="100000"/>
               </a:lnSpc>
             </a:pPr>
-            <a:endParaRPr b="0" lang="fr-FR" sz="1800" spc="-1" strike="noStrike">
+            <a:endParaRPr b="0" lang="en-US" sz="1800" spc="-1" strike="noStrike">
               <a:latin typeface="Arial"/>
             </a:endParaRPr>
           </a:p>
@@ -5785,7 +5779,7 @@
               </a:lnSpc>
             </a:pPr>
             <a:r>
-              <a:rPr b="1" lang="fr-FR" sz="1800" spc="-1" strike="noStrike" u="sng">
+              <a:rPr b="1" lang="en-US" sz="1800" spc="-1" strike="noStrike" u="sng">
                 <a:solidFill>
                   <a:srgbClr val="ffffff"/>
                 </a:solidFill>
@@ -5795,7 +5789,7 @@
               </a:rPr>
               <a:t>Alimentation du Twitter</a:t>
             </a:r>
-            <a:endParaRPr b="0" lang="fr-FR" sz="1800" spc="-1" strike="noStrike">
+            <a:endParaRPr b="0" lang="en-US" sz="1800" spc="-1" strike="noStrike">
               <a:latin typeface="Arial"/>
             </a:endParaRPr>
           </a:p>
@@ -5805,7 +5799,7 @@
                 <a:spcPct val="100000"/>
               </a:lnSpc>
             </a:pPr>
-            <a:endParaRPr b="0" lang="fr-FR" sz="1800" spc="-1" strike="noStrike">
+            <a:endParaRPr b="0" lang="en-US" sz="1800" spc="-1" strike="noStrike">
               <a:latin typeface="Arial"/>
             </a:endParaRPr>
           </a:p>
@@ -5816,7 +5810,7 @@
               </a:lnSpc>
             </a:pPr>
             <a:r>
-              <a:rPr b="1" lang="fr-FR" sz="1800" spc="-1" strike="noStrike" u="sng">
+              <a:rPr b="1" lang="en-US" sz="1800" spc="-1" strike="noStrike" u="sng">
                 <a:solidFill>
                   <a:srgbClr val="ffffff"/>
                 </a:solidFill>
@@ -5826,7 +5820,7 @@
               </a:rPr>
               <a:t>FAQ</a:t>
             </a:r>
-            <a:endParaRPr b="0" lang="fr-FR" sz="1800" spc="-1" strike="noStrike">
+            <a:endParaRPr b="0" lang="en-US" sz="1800" spc="-1" strike="noStrike">
               <a:latin typeface="Arial"/>
             </a:endParaRPr>
           </a:p>
@@ -5845,7 +5839,7 @@
         <p:spPr>
           <a:xfrm>
             <a:off x="0" y="-4680"/>
-            <a:ext cx="12191400" cy="6861960"/>
+            <a:ext cx="12191040" cy="6861600"/>
           </a:xfrm>
           <a:prstGeom prst="rect">
             <a:avLst/>
@@ -5894,7 +5888,7 @@
         <p:spPr>
           <a:xfrm>
             <a:off x="838080" y="365040"/>
-            <a:ext cx="10513800" cy="1323720"/>
+            <a:ext cx="10513440" cy="1323360"/>
           </a:xfrm>
           <a:prstGeom prst="rect">
             <a:avLst/>
@@ -5921,7 +5915,7 @@
               </a:lnSpc>
             </a:pPr>
             <a:r>
-              <a:rPr b="0" lang="fr-FR" sz="4400" spc="-1" strike="noStrike">
+              <a:rPr b="0" lang="en-US" sz="4400" spc="-1" strike="noStrike">
                 <a:solidFill>
                   <a:srgbClr val="000000"/>
                 </a:solidFill>
@@ -5930,7 +5924,7 @@
               </a:rPr>
               <a:t>Création de contenus  « Installation/Configuration »</a:t>
             </a:r>
-            <a:endParaRPr b="0" lang="fr-FR" sz="4400" spc="-1" strike="noStrike">
+            <a:endParaRPr b="0" lang="en-US" sz="4400" spc="-1" strike="noStrike">
               <a:latin typeface="Arial"/>
             </a:endParaRPr>
           </a:p>
@@ -5945,7 +5939,7 @@
         <p:spPr>
           <a:xfrm>
             <a:off x="838080" y="1825560"/>
-            <a:ext cx="10513800" cy="4349520"/>
+            <a:ext cx="10513440" cy="4349160"/>
           </a:xfrm>
           <a:prstGeom prst="rect">
             <a:avLst/>
@@ -5975,7 +5969,7 @@
         <p:spPr>
           <a:xfrm>
             <a:off x="10999080" y="174960"/>
-            <a:ext cx="1016280" cy="1010160"/>
+            <a:ext cx="1015920" cy="1009800"/>
           </a:xfrm>
           <a:prstGeom prst="rect">
             <a:avLst/>
@@ -6024,7 +6018,7 @@
         <p:spPr>
           <a:xfrm>
             <a:off x="838080" y="365040"/>
-            <a:ext cx="10513800" cy="1323720"/>
+            <a:ext cx="10513440" cy="1323360"/>
           </a:xfrm>
           <a:prstGeom prst="rect">
             <a:avLst/>
@@ -6051,7 +6045,7 @@
               </a:lnSpc>
             </a:pPr>
             <a:r>
-              <a:rPr b="0" lang="fr-FR" sz="4400" spc="-1" strike="noStrike">
+              <a:rPr b="0" lang="en-US" sz="4400" spc="-1" strike="noStrike">
                 <a:solidFill>
                   <a:srgbClr val="000000"/>
                 </a:solidFill>
@@ -6060,7 +6054,7 @@
               </a:rPr>
               <a:t>Création de contenus « Les fonctionnalités »</a:t>
             </a:r>
-            <a:endParaRPr b="0" lang="fr-FR" sz="4400" spc="-1" strike="noStrike">
+            <a:endParaRPr b="0" lang="en-US" sz="4400" spc="-1" strike="noStrike">
               <a:latin typeface="Arial"/>
             </a:endParaRPr>
           </a:p>
@@ -6075,7 +6069,7 @@
         <p:spPr>
           <a:xfrm>
             <a:off x="838080" y="1825560"/>
-            <a:ext cx="10513800" cy="4349520"/>
+            <a:ext cx="10513440" cy="4349160"/>
           </a:xfrm>
           <a:prstGeom prst="rect">
             <a:avLst/>
@@ -6105,7 +6099,7 @@
         <p:spPr>
           <a:xfrm>
             <a:off x="10999080" y="174960"/>
-            <a:ext cx="1016280" cy="1010160"/>
+            <a:ext cx="1015920" cy="1009800"/>
           </a:xfrm>
           <a:prstGeom prst="rect">
             <a:avLst/>
@@ -6154,7 +6148,7 @@
         <p:spPr>
           <a:xfrm>
             <a:off x="838080" y="365040"/>
-            <a:ext cx="10513800" cy="1323720"/>
+            <a:ext cx="10513440" cy="1323360"/>
           </a:xfrm>
           <a:prstGeom prst="rect">
             <a:avLst/>
@@ -6181,7 +6175,7 @@
               </a:lnSpc>
             </a:pPr>
             <a:r>
-              <a:rPr b="0" lang="fr-FR" sz="4400" spc="-1" strike="noStrike">
+              <a:rPr b="0" lang="en-US" sz="4400" spc="-1" strike="noStrike">
                 <a:solidFill>
                   <a:srgbClr val="000000"/>
                 </a:solidFill>
@@ -6190,7 +6184,7 @@
               </a:rPr>
               <a:t>Création de contenus pour « Alimentation Twitter »</a:t>
             </a:r>
-            <a:endParaRPr b="0" lang="fr-FR" sz="4400" spc="-1" strike="noStrike">
+            <a:endParaRPr b="0" lang="en-US" sz="4400" spc="-1" strike="noStrike">
               <a:latin typeface="Arial"/>
             </a:endParaRPr>
           </a:p>
@@ -6205,7 +6199,7 @@
         <p:spPr>
           <a:xfrm>
             <a:off x="838080" y="1825560"/>
-            <a:ext cx="10513800" cy="4349520"/>
+            <a:ext cx="10513440" cy="4349160"/>
           </a:xfrm>
           <a:prstGeom prst="rect">
             <a:avLst/>
@@ -6235,7 +6229,7 @@
         <p:spPr>
           <a:xfrm>
             <a:off x="11011680" y="15840"/>
-            <a:ext cx="1016280" cy="1010160"/>
+            <a:ext cx="1015920" cy="1009800"/>
           </a:xfrm>
           <a:prstGeom prst="rect">
             <a:avLst/>
@@ -6258,7 +6252,7 @@
         <p:spPr>
           <a:xfrm>
             <a:off x="360" y="1682640"/>
-            <a:ext cx="7593840" cy="5174640"/>
+            <a:ext cx="7593480" cy="5174280"/>
           </a:xfrm>
           <a:prstGeom prst="rect">
             <a:avLst/>
@@ -6276,8 +6270,8 @@
         </p:nvSpPr>
         <p:spPr>
           <a:xfrm rot="10800">
-            <a:off x="7485120" y="2324160"/>
-            <a:ext cx="4703400" cy="3899520"/>
+            <a:off x="7484760" y="2324160"/>
+            <a:ext cx="4703040" cy="3899160"/>
           </a:xfrm>
           <a:prstGeom prst="rect">
             <a:avLst/>
@@ -6304,7 +6298,7 @@
               </a:lnSpc>
             </a:pPr>
             <a:r>
-              <a:rPr b="0" lang="fr-FR" sz="3200" spc="-1" strike="noStrike">
+              <a:rPr b="0" lang="en-US" sz="3200" spc="-1" strike="noStrike">
                 <a:solidFill>
                   <a:srgbClr val="000000"/>
                 </a:solidFill>
@@ -6313,7 +6307,7 @@
               </a:rPr>
               <a:t>Alors voilà on à eu l’idée (enfin on a piqué l’idée sur le compte twitter de la photo de gauche), de faire des petits sondage, poser des questions, tweeter des liens du futur blog.</a:t>
             </a:r>
-            <a:endParaRPr b="0" lang="fr-FR" sz="3200" spc="-1" strike="noStrike">
+            <a:endParaRPr b="0" lang="en-US" sz="3200" spc="-1" strike="noStrike">
               <a:latin typeface="Arial"/>
             </a:endParaRPr>
           </a:p>
@@ -6358,7 +6352,7 @@
         <p:spPr>
           <a:xfrm>
             <a:off x="838080" y="365040"/>
-            <a:ext cx="10513800" cy="1323720"/>
+            <a:ext cx="10513440" cy="1323360"/>
           </a:xfrm>
           <a:prstGeom prst="rect">
             <a:avLst/>
@@ -6385,7 +6379,7 @@
               </a:lnSpc>
             </a:pPr>
             <a:r>
-              <a:rPr b="0" lang="fr-FR" sz="4400" spc="-1" strike="noStrike">
+              <a:rPr b="0" lang="en-US" sz="4400" spc="-1" strike="noStrike">
                 <a:solidFill>
                   <a:srgbClr val="000000"/>
                 </a:solidFill>
@@ -6394,7 +6388,7 @@
               </a:rPr>
               <a:t>Création de contenus « 1 Erreur / 1 Solution »</a:t>
             </a:r>
-            <a:endParaRPr b="0" lang="fr-FR" sz="4400" spc="-1" strike="noStrike">
+            <a:endParaRPr b="0" lang="en-US" sz="4400" spc="-1" strike="noStrike">
               <a:latin typeface="Arial"/>
             </a:endParaRPr>
           </a:p>
@@ -6409,7 +6403,7 @@
         <p:spPr>
           <a:xfrm>
             <a:off x="838080" y="1825560"/>
-            <a:ext cx="10513800" cy="4349520"/>
+            <a:ext cx="10513440" cy="4349160"/>
           </a:xfrm>
           <a:prstGeom prst="rect">
             <a:avLst/>
@@ -6439,7 +6433,30 @@
         <p:spPr>
           <a:xfrm>
             <a:off x="11075040" y="15840"/>
-            <a:ext cx="1016280" cy="1010160"/>
+            <a:ext cx="1015920" cy="1009800"/>
+          </a:xfrm>
+          <a:prstGeom prst="rect">
+            <a:avLst/>
+          </a:prstGeom>
+          <a:ln>
+            <a:noFill/>
+          </a:ln>
+        </p:spPr>
+      </p:pic>
+      <p:pic>
+        <p:nvPicPr>
+          <p:cNvPr id="142" name="" descr=""/>
+          <p:cNvPicPr/>
+          <p:nvPr/>
+        </p:nvPicPr>
+        <p:blipFill>
+          <a:blip r:embed="rId2"/>
+          <a:stretch/>
+        </p:blipFill>
+        <p:spPr>
+          <a:xfrm>
+            <a:off x="2800440" y="1653480"/>
+            <a:ext cx="6800400" cy="5133600"/>
           </a:xfrm>
           <a:prstGeom prst="rect">
             <a:avLst/>
@@ -6481,14 +6498,14 @@
       </p:grpSpPr>
       <p:sp>
         <p:nvSpPr>
-          <p:cNvPr id="142" name="CustomShape 1"/>
+          <p:cNvPr id="143" name="CustomShape 1"/>
           <p:cNvSpPr/>
           <p:nvPr/>
         </p:nvSpPr>
         <p:spPr>
           <a:xfrm>
             <a:off x="838080" y="365040"/>
-            <a:ext cx="10513800" cy="1323720"/>
+            <a:ext cx="10513440" cy="1323360"/>
           </a:xfrm>
           <a:prstGeom prst="rect">
             <a:avLst/>
@@ -6515,7 +6532,7 @@
               </a:lnSpc>
             </a:pPr>
             <a:r>
-              <a:rPr b="0" lang="fr-FR" sz="4400" spc="-1" strike="noStrike">
+              <a:rPr b="0" lang="en-US" sz="4400" spc="-1" strike="noStrike">
                 <a:solidFill>
                   <a:srgbClr val="000000"/>
                 </a:solidFill>
@@ -6524,22 +6541,22 @@
               </a:rPr>
               <a:t>Création d’un contenue « FAQ »</a:t>
             </a:r>
-            <a:endParaRPr b="0" lang="fr-FR" sz="4400" spc="-1" strike="noStrike">
-              <a:latin typeface="Arial"/>
-            </a:endParaRPr>
-          </a:p>
-        </p:txBody>
-      </p:sp>
-      <p:sp>
-        <p:nvSpPr>
-          <p:cNvPr id="143" name="CustomShape 2"/>
+            <a:endParaRPr b="0" lang="en-US" sz="4400" spc="-1" strike="noStrike">
+              <a:latin typeface="Arial"/>
+            </a:endParaRPr>
+          </a:p>
+        </p:txBody>
+      </p:sp>
+      <p:sp>
+        <p:nvSpPr>
+          <p:cNvPr id="144" name="CustomShape 2"/>
           <p:cNvSpPr/>
           <p:nvPr/>
         </p:nvSpPr>
         <p:spPr>
           <a:xfrm>
             <a:off x="838080" y="1825560"/>
-            <a:ext cx="10513800" cy="4349520"/>
+            <a:ext cx="10513440" cy="4349160"/>
           </a:xfrm>
           <a:prstGeom prst="rect">
             <a:avLst/>
@@ -6558,7 +6575,7 @@
       </p:sp>
       <p:pic>
         <p:nvPicPr>
-          <p:cNvPr id="144" name="Image 4" descr=""/>
+          <p:cNvPr id="145" name="Image 4" descr=""/>
           <p:cNvPicPr/>
           <p:nvPr/>
         </p:nvPicPr>
@@ -6569,7 +6586,7 @@
         <p:spPr>
           <a:xfrm>
             <a:off x="11075040" y="15840"/>
-            <a:ext cx="1016280" cy="1010160"/>
+            <a:ext cx="1015920" cy="1009800"/>
           </a:xfrm>
           <a:prstGeom prst="rect">
             <a:avLst/>
@@ -6581,7 +6598,7 @@
       </p:pic>
       <p:pic>
         <p:nvPicPr>
-          <p:cNvPr id="145" name="" descr=""/>
+          <p:cNvPr id="146" name="" descr=""/>
           <p:cNvPicPr/>
           <p:nvPr/>
         </p:nvPicPr>
@@ -6592,7 +6609,7 @@
         <p:spPr>
           <a:xfrm>
             <a:off x="1512000" y="1465200"/>
-            <a:ext cx="7953120" cy="5086800"/>
+            <a:ext cx="7952760" cy="5086440"/>
           </a:xfrm>
           <a:prstGeom prst="rect">
             <a:avLst/>

</xml_diff>

<commit_message>
add screenshot install config
</commit_message>
<xml_diff>
--- a/GIT-moi-tout.pptx
+++ b/GIT-moi-tout.pptx
@@ -85,7 +85,7 @@
           </a:bodyPr>
           <a:p>
             <a:pPr algn="ctr"/>
-            <a:endParaRPr b="0" lang="fr-FR" sz="4400" spc="-1" strike="noStrike">
+            <a:endParaRPr b="0" lang="en-US" sz="4400" spc="-1" strike="noStrike">
               <a:latin typeface="Arial"/>
             </a:endParaRPr>
           </a:p>
@@ -115,7 +115,7 @@
             <a:normAutofit/>
           </a:bodyPr>
           <a:p>
-            <a:endParaRPr b="0" lang="fr-FR" sz="3200" spc="-1" strike="noStrike">
+            <a:endParaRPr b="0" lang="en-US" sz="3200" spc="-1" strike="noStrike">
               <a:latin typeface="Arial"/>
             </a:endParaRPr>
           </a:p>
@@ -145,7 +145,7 @@
             <a:normAutofit/>
           </a:bodyPr>
           <a:p>
-            <a:endParaRPr b="0" lang="fr-FR" sz="3200" spc="-1" strike="noStrike">
+            <a:endParaRPr b="0" lang="en-US" sz="3200" spc="-1" strike="noStrike">
               <a:latin typeface="Arial"/>
             </a:endParaRPr>
           </a:p>
@@ -198,7 +198,7 @@
           </a:bodyPr>
           <a:p>
             <a:pPr algn="ctr"/>
-            <a:endParaRPr b="0" lang="fr-FR" sz="4400" spc="-1" strike="noStrike">
+            <a:endParaRPr b="0" lang="en-US" sz="4400" spc="-1" strike="noStrike">
               <a:latin typeface="Arial"/>
             </a:endParaRPr>
           </a:p>
@@ -228,7 +228,7 @@
             <a:normAutofit/>
           </a:bodyPr>
           <a:p>
-            <a:endParaRPr b="0" lang="fr-FR" sz="3200" spc="-1" strike="noStrike">
+            <a:endParaRPr b="0" lang="en-US" sz="3200" spc="-1" strike="noStrike">
               <a:latin typeface="Arial"/>
             </a:endParaRPr>
           </a:p>
@@ -258,7 +258,7 @@
             <a:normAutofit/>
           </a:bodyPr>
           <a:p>
-            <a:endParaRPr b="0" lang="fr-FR" sz="3200" spc="-1" strike="noStrike">
+            <a:endParaRPr b="0" lang="en-US" sz="3200" spc="-1" strike="noStrike">
               <a:latin typeface="Arial"/>
             </a:endParaRPr>
           </a:p>
@@ -288,7 +288,7 @@
             <a:normAutofit/>
           </a:bodyPr>
           <a:p>
-            <a:endParaRPr b="0" lang="fr-FR" sz="3200" spc="-1" strike="noStrike">
+            <a:endParaRPr b="0" lang="en-US" sz="3200" spc="-1" strike="noStrike">
               <a:latin typeface="Arial"/>
             </a:endParaRPr>
           </a:p>
@@ -318,7 +318,7 @@
             <a:normAutofit/>
           </a:bodyPr>
           <a:p>
-            <a:endParaRPr b="0" lang="fr-FR" sz="3200" spc="-1" strike="noStrike">
+            <a:endParaRPr b="0" lang="en-US" sz="3200" spc="-1" strike="noStrike">
               <a:latin typeface="Arial"/>
             </a:endParaRPr>
           </a:p>
@@ -371,7 +371,7 @@
           </a:bodyPr>
           <a:p>
             <a:pPr algn="ctr"/>
-            <a:endParaRPr b="0" lang="fr-FR" sz="4400" spc="-1" strike="noStrike">
+            <a:endParaRPr b="0" lang="en-US" sz="4400" spc="-1" strike="noStrike">
               <a:latin typeface="Arial"/>
             </a:endParaRPr>
           </a:p>
@@ -401,7 +401,7 @@
             <a:normAutofit/>
           </a:bodyPr>
           <a:p>
-            <a:endParaRPr b="0" lang="fr-FR" sz="3200" spc="-1" strike="noStrike">
+            <a:endParaRPr b="0" lang="en-US" sz="3200" spc="-1" strike="noStrike">
               <a:latin typeface="Arial"/>
             </a:endParaRPr>
           </a:p>
@@ -431,7 +431,7 @@
             <a:normAutofit/>
           </a:bodyPr>
           <a:p>
-            <a:endParaRPr b="0" lang="fr-FR" sz="3200" spc="-1" strike="noStrike">
+            <a:endParaRPr b="0" lang="en-US" sz="3200" spc="-1" strike="noStrike">
               <a:latin typeface="Arial"/>
             </a:endParaRPr>
           </a:p>
@@ -461,7 +461,7 @@
             <a:normAutofit/>
           </a:bodyPr>
           <a:p>
-            <a:endParaRPr b="0" lang="fr-FR" sz="3200" spc="-1" strike="noStrike">
+            <a:endParaRPr b="0" lang="en-US" sz="3200" spc="-1" strike="noStrike">
               <a:latin typeface="Arial"/>
             </a:endParaRPr>
           </a:p>
@@ -491,7 +491,7 @@
             <a:normAutofit/>
           </a:bodyPr>
           <a:p>
-            <a:endParaRPr b="0" lang="fr-FR" sz="3200" spc="-1" strike="noStrike">
+            <a:endParaRPr b="0" lang="en-US" sz="3200" spc="-1" strike="noStrike">
               <a:latin typeface="Arial"/>
             </a:endParaRPr>
           </a:p>
@@ -521,7 +521,7 @@
             <a:normAutofit/>
           </a:bodyPr>
           <a:p>
-            <a:endParaRPr b="0" lang="fr-FR" sz="3200" spc="-1" strike="noStrike">
+            <a:endParaRPr b="0" lang="en-US" sz="3200" spc="-1" strike="noStrike">
               <a:latin typeface="Arial"/>
             </a:endParaRPr>
           </a:p>
@@ -551,7 +551,7 @@
             <a:normAutofit/>
           </a:bodyPr>
           <a:p>
-            <a:endParaRPr b="0" lang="fr-FR" sz="3200" spc="-1" strike="noStrike">
+            <a:endParaRPr b="0" lang="en-US" sz="3200" spc="-1" strike="noStrike">
               <a:latin typeface="Arial"/>
             </a:endParaRPr>
           </a:p>
@@ -626,7 +626,7 @@
           </a:bodyPr>
           <a:p>
             <a:pPr algn="ctr"/>
-            <a:endParaRPr b="0" lang="fr-FR" sz="4400" spc="-1" strike="noStrike">
+            <a:endParaRPr b="0" lang="en-US" sz="4400" spc="-1" strike="noStrike">
               <a:latin typeface="Arial"/>
             </a:endParaRPr>
           </a:p>
@@ -657,7 +657,7 @@
           </a:bodyPr>
           <a:p>
             <a:pPr algn="ctr"/>
-            <a:endParaRPr b="0" lang="fr-FR" sz="3200" spc="-1" strike="noStrike">
+            <a:endParaRPr b="0" lang="en-US" sz="3200" spc="-1" strike="noStrike">
               <a:latin typeface="Arial"/>
             </a:endParaRPr>
           </a:p>
@@ -710,7 +710,7 @@
           </a:bodyPr>
           <a:p>
             <a:pPr algn="ctr"/>
-            <a:endParaRPr b="0" lang="fr-FR" sz="4400" spc="-1" strike="noStrike">
+            <a:endParaRPr b="0" lang="en-US" sz="4400" spc="-1" strike="noStrike">
               <a:latin typeface="Arial"/>
             </a:endParaRPr>
           </a:p>
@@ -740,7 +740,7 @@
             <a:normAutofit/>
           </a:bodyPr>
           <a:p>
-            <a:endParaRPr b="0" lang="fr-FR" sz="3200" spc="-1" strike="noStrike">
+            <a:endParaRPr b="0" lang="en-US" sz="3200" spc="-1" strike="noStrike">
               <a:latin typeface="Arial"/>
             </a:endParaRPr>
           </a:p>
@@ -793,7 +793,7 @@
           </a:bodyPr>
           <a:p>
             <a:pPr algn="ctr"/>
-            <a:endParaRPr b="0" lang="fr-FR" sz="4400" spc="-1" strike="noStrike">
+            <a:endParaRPr b="0" lang="en-US" sz="4400" spc="-1" strike="noStrike">
               <a:latin typeface="Arial"/>
             </a:endParaRPr>
           </a:p>
@@ -823,7 +823,7 @@
             <a:normAutofit/>
           </a:bodyPr>
           <a:p>
-            <a:endParaRPr b="0" lang="fr-FR" sz="3200" spc="-1" strike="noStrike">
+            <a:endParaRPr b="0" lang="en-US" sz="3200" spc="-1" strike="noStrike">
               <a:latin typeface="Arial"/>
             </a:endParaRPr>
           </a:p>
@@ -853,7 +853,7 @@
             <a:normAutofit/>
           </a:bodyPr>
           <a:p>
-            <a:endParaRPr b="0" lang="fr-FR" sz="3200" spc="-1" strike="noStrike">
+            <a:endParaRPr b="0" lang="en-US" sz="3200" spc="-1" strike="noStrike">
               <a:latin typeface="Arial"/>
             </a:endParaRPr>
           </a:p>
@@ -906,7 +906,7 @@
           </a:bodyPr>
           <a:p>
             <a:pPr algn="ctr"/>
-            <a:endParaRPr b="0" lang="fr-FR" sz="4400" spc="-1" strike="noStrike">
+            <a:endParaRPr b="0" lang="en-US" sz="4400" spc="-1" strike="noStrike">
               <a:latin typeface="Arial"/>
             </a:endParaRPr>
           </a:p>
@@ -959,7 +959,7 @@
           </a:bodyPr>
           <a:p>
             <a:pPr algn="ctr"/>
-            <a:endParaRPr b="0" lang="fr-FR" sz="3200" spc="-1" strike="noStrike">
+            <a:endParaRPr b="0" lang="en-US" sz="3200" spc="-1" strike="noStrike">
               <a:latin typeface="Arial"/>
             </a:endParaRPr>
           </a:p>
@@ -1012,7 +1012,7 @@
           </a:bodyPr>
           <a:p>
             <a:pPr algn="ctr"/>
-            <a:endParaRPr b="0" lang="fr-FR" sz="4400" spc="-1" strike="noStrike">
+            <a:endParaRPr b="0" lang="en-US" sz="4400" spc="-1" strike="noStrike">
               <a:latin typeface="Arial"/>
             </a:endParaRPr>
           </a:p>
@@ -1042,7 +1042,7 @@
             <a:normAutofit/>
           </a:bodyPr>
           <a:p>
-            <a:endParaRPr b="0" lang="fr-FR" sz="3200" spc="-1" strike="noStrike">
+            <a:endParaRPr b="0" lang="en-US" sz="3200" spc="-1" strike="noStrike">
               <a:latin typeface="Arial"/>
             </a:endParaRPr>
           </a:p>
@@ -1072,7 +1072,7 @@
             <a:normAutofit/>
           </a:bodyPr>
           <a:p>
-            <a:endParaRPr b="0" lang="fr-FR" sz="3200" spc="-1" strike="noStrike">
+            <a:endParaRPr b="0" lang="en-US" sz="3200" spc="-1" strike="noStrike">
               <a:latin typeface="Arial"/>
             </a:endParaRPr>
           </a:p>
@@ -1102,7 +1102,7 @@
             <a:normAutofit/>
           </a:bodyPr>
           <a:p>
-            <a:endParaRPr b="0" lang="fr-FR" sz="3200" spc="-1" strike="noStrike">
+            <a:endParaRPr b="0" lang="en-US" sz="3200" spc="-1" strike="noStrike">
               <a:latin typeface="Arial"/>
             </a:endParaRPr>
           </a:p>
@@ -1155,7 +1155,7 @@
           </a:bodyPr>
           <a:p>
             <a:pPr algn="ctr"/>
-            <a:endParaRPr b="0" lang="fr-FR" sz="4400" spc="-1" strike="noStrike">
+            <a:endParaRPr b="0" lang="en-US" sz="4400" spc="-1" strike="noStrike">
               <a:latin typeface="Arial"/>
             </a:endParaRPr>
           </a:p>
@@ -1186,7 +1186,7 @@
           </a:bodyPr>
           <a:p>
             <a:pPr algn="ctr"/>
-            <a:endParaRPr b="0" lang="fr-FR" sz="3200" spc="-1" strike="noStrike">
+            <a:endParaRPr b="0" lang="en-US" sz="3200" spc="-1" strike="noStrike">
               <a:latin typeface="Arial"/>
             </a:endParaRPr>
           </a:p>
@@ -1239,7 +1239,7 @@
           </a:bodyPr>
           <a:p>
             <a:pPr algn="ctr"/>
-            <a:endParaRPr b="0" lang="fr-FR" sz="4400" spc="-1" strike="noStrike">
+            <a:endParaRPr b="0" lang="en-US" sz="4400" spc="-1" strike="noStrike">
               <a:latin typeface="Arial"/>
             </a:endParaRPr>
           </a:p>
@@ -1269,7 +1269,7 @@
             <a:normAutofit/>
           </a:bodyPr>
           <a:p>
-            <a:endParaRPr b="0" lang="fr-FR" sz="3200" spc="-1" strike="noStrike">
+            <a:endParaRPr b="0" lang="en-US" sz="3200" spc="-1" strike="noStrike">
               <a:latin typeface="Arial"/>
             </a:endParaRPr>
           </a:p>
@@ -1299,7 +1299,7 @@
             <a:normAutofit/>
           </a:bodyPr>
           <a:p>
-            <a:endParaRPr b="0" lang="fr-FR" sz="3200" spc="-1" strike="noStrike">
+            <a:endParaRPr b="0" lang="en-US" sz="3200" spc="-1" strike="noStrike">
               <a:latin typeface="Arial"/>
             </a:endParaRPr>
           </a:p>
@@ -1329,7 +1329,7 @@
             <a:normAutofit/>
           </a:bodyPr>
           <a:p>
-            <a:endParaRPr b="0" lang="fr-FR" sz="3200" spc="-1" strike="noStrike">
+            <a:endParaRPr b="0" lang="en-US" sz="3200" spc="-1" strike="noStrike">
               <a:latin typeface="Arial"/>
             </a:endParaRPr>
           </a:p>
@@ -1382,7 +1382,7 @@
           </a:bodyPr>
           <a:p>
             <a:pPr algn="ctr"/>
-            <a:endParaRPr b="0" lang="fr-FR" sz="4400" spc="-1" strike="noStrike">
+            <a:endParaRPr b="0" lang="en-US" sz="4400" spc="-1" strike="noStrike">
               <a:latin typeface="Arial"/>
             </a:endParaRPr>
           </a:p>
@@ -1412,7 +1412,7 @@
             <a:normAutofit/>
           </a:bodyPr>
           <a:p>
-            <a:endParaRPr b="0" lang="fr-FR" sz="3200" spc="-1" strike="noStrike">
+            <a:endParaRPr b="0" lang="en-US" sz="3200" spc="-1" strike="noStrike">
               <a:latin typeface="Arial"/>
             </a:endParaRPr>
           </a:p>
@@ -1442,7 +1442,7 @@
             <a:normAutofit/>
           </a:bodyPr>
           <a:p>
-            <a:endParaRPr b="0" lang="fr-FR" sz="3200" spc="-1" strike="noStrike">
+            <a:endParaRPr b="0" lang="en-US" sz="3200" spc="-1" strike="noStrike">
               <a:latin typeface="Arial"/>
             </a:endParaRPr>
           </a:p>
@@ -1472,7 +1472,7 @@
             <a:normAutofit/>
           </a:bodyPr>
           <a:p>
-            <a:endParaRPr b="0" lang="fr-FR" sz="3200" spc="-1" strike="noStrike">
+            <a:endParaRPr b="0" lang="en-US" sz="3200" spc="-1" strike="noStrike">
               <a:latin typeface="Arial"/>
             </a:endParaRPr>
           </a:p>
@@ -1525,7 +1525,7 @@
           </a:bodyPr>
           <a:p>
             <a:pPr algn="ctr"/>
-            <a:endParaRPr b="0" lang="fr-FR" sz="4400" spc="-1" strike="noStrike">
+            <a:endParaRPr b="0" lang="en-US" sz="4400" spc="-1" strike="noStrike">
               <a:latin typeface="Arial"/>
             </a:endParaRPr>
           </a:p>
@@ -1555,7 +1555,7 @@
             <a:normAutofit/>
           </a:bodyPr>
           <a:p>
-            <a:endParaRPr b="0" lang="fr-FR" sz="3200" spc="-1" strike="noStrike">
+            <a:endParaRPr b="0" lang="en-US" sz="3200" spc="-1" strike="noStrike">
               <a:latin typeface="Arial"/>
             </a:endParaRPr>
           </a:p>
@@ -1585,7 +1585,7 @@
             <a:normAutofit/>
           </a:bodyPr>
           <a:p>
-            <a:endParaRPr b="0" lang="fr-FR" sz="3200" spc="-1" strike="noStrike">
+            <a:endParaRPr b="0" lang="en-US" sz="3200" spc="-1" strike="noStrike">
               <a:latin typeface="Arial"/>
             </a:endParaRPr>
           </a:p>
@@ -1638,7 +1638,7 @@
           </a:bodyPr>
           <a:p>
             <a:pPr algn="ctr"/>
-            <a:endParaRPr b="0" lang="fr-FR" sz="4400" spc="-1" strike="noStrike">
+            <a:endParaRPr b="0" lang="en-US" sz="4400" spc="-1" strike="noStrike">
               <a:latin typeface="Arial"/>
             </a:endParaRPr>
           </a:p>
@@ -1668,7 +1668,7 @@
             <a:normAutofit/>
           </a:bodyPr>
           <a:p>
-            <a:endParaRPr b="0" lang="fr-FR" sz="3200" spc="-1" strike="noStrike">
+            <a:endParaRPr b="0" lang="en-US" sz="3200" spc="-1" strike="noStrike">
               <a:latin typeface="Arial"/>
             </a:endParaRPr>
           </a:p>
@@ -1698,7 +1698,7 @@
             <a:normAutofit/>
           </a:bodyPr>
           <a:p>
-            <a:endParaRPr b="0" lang="fr-FR" sz="3200" spc="-1" strike="noStrike">
+            <a:endParaRPr b="0" lang="en-US" sz="3200" spc="-1" strike="noStrike">
               <a:latin typeface="Arial"/>
             </a:endParaRPr>
           </a:p>
@@ -1728,7 +1728,7 @@
             <a:normAutofit/>
           </a:bodyPr>
           <a:p>
-            <a:endParaRPr b="0" lang="fr-FR" sz="3200" spc="-1" strike="noStrike">
+            <a:endParaRPr b="0" lang="en-US" sz="3200" spc="-1" strike="noStrike">
               <a:latin typeface="Arial"/>
             </a:endParaRPr>
           </a:p>
@@ -1758,7 +1758,7 @@
             <a:normAutofit/>
           </a:bodyPr>
           <a:p>
-            <a:endParaRPr b="0" lang="fr-FR" sz="3200" spc="-1" strike="noStrike">
+            <a:endParaRPr b="0" lang="en-US" sz="3200" spc="-1" strike="noStrike">
               <a:latin typeface="Arial"/>
             </a:endParaRPr>
           </a:p>
@@ -1811,7 +1811,7 @@
           </a:bodyPr>
           <a:p>
             <a:pPr algn="ctr"/>
-            <a:endParaRPr b="0" lang="fr-FR" sz="4400" spc="-1" strike="noStrike">
+            <a:endParaRPr b="0" lang="en-US" sz="4400" spc="-1" strike="noStrike">
               <a:latin typeface="Arial"/>
             </a:endParaRPr>
           </a:p>
@@ -1841,7 +1841,7 @@
             <a:normAutofit/>
           </a:bodyPr>
           <a:p>
-            <a:endParaRPr b="0" lang="fr-FR" sz="3200" spc="-1" strike="noStrike">
+            <a:endParaRPr b="0" lang="en-US" sz="3200" spc="-1" strike="noStrike">
               <a:latin typeface="Arial"/>
             </a:endParaRPr>
           </a:p>
@@ -1871,7 +1871,7 @@
             <a:normAutofit/>
           </a:bodyPr>
           <a:p>
-            <a:endParaRPr b="0" lang="fr-FR" sz="3200" spc="-1" strike="noStrike">
+            <a:endParaRPr b="0" lang="en-US" sz="3200" spc="-1" strike="noStrike">
               <a:latin typeface="Arial"/>
             </a:endParaRPr>
           </a:p>
@@ -1901,7 +1901,7 @@
             <a:normAutofit/>
           </a:bodyPr>
           <a:p>
-            <a:endParaRPr b="0" lang="fr-FR" sz="3200" spc="-1" strike="noStrike">
+            <a:endParaRPr b="0" lang="en-US" sz="3200" spc="-1" strike="noStrike">
               <a:latin typeface="Arial"/>
             </a:endParaRPr>
           </a:p>
@@ -1931,7 +1931,7 @@
             <a:normAutofit/>
           </a:bodyPr>
           <a:p>
-            <a:endParaRPr b="0" lang="fr-FR" sz="3200" spc="-1" strike="noStrike">
+            <a:endParaRPr b="0" lang="en-US" sz="3200" spc="-1" strike="noStrike">
               <a:latin typeface="Arial"/>
             </a:endParaRPr>
           </a:p>
@@ -1961,7 +1961,7 @@
             <a:normAutofit/>
           </a:bodyPr>
           <a:p>
-            <a:endParaRPr b="0" lang="fr-FR" sz="3200" spc="-1" strike="noStrike">
+            <a:endParaRPr b="0" lang="en-US" sz="3200" spc="-1" strike="noStrike">
               <a:latin typeface="Arial"/>
             </a:endParaRPr>
           </a:p>
@@ -1991,7 +1991,7 @@
             <a:normAutofit/>
           </a:bodyPr>
           <a:p>
-            <a:endParaRPr b="0" lang="fr-FR" sz="3200" spc="-1" strike="noStrike">
+            <a:endParaRPr b="0" lang="en-US" sz="3200" spc="-1" strike="noStrike">
               <a:latin typeface="Arial"/>
             </a:endParaRPr>
           </a:p>
@@ -2066,7 +2066,7 @@
           </a:bodyPr>
           <a:p>
             <a:pPr algn="ctr"/>
-            <a:endParaRPr b="0" lang="fr-FR" sz="4400" spc="-1" strike="noStrike">
+            <a:endParaRPr b="0" lang="en-US" sz="4400" spc="-1" strike="noStrike">
               <a:latin typeface="Arial"/>
             </a:endParaRPr>
           </a:p>
@@ -2097,7 +2097,7 @@
           </a:bodyPr>
           <a:p>
             <a:pPr algn="ctr"/>
-            <a:endParaRPr b="0" lang="fr-FR" sz="3200" spc="-1" strike="noStrike">
+            <a:endParaRPr b="0" lang="en-US" sz="3200" spc="-1" strike="noStrike">
               <a:latin typeface="Arial"/>
             </a:endParaRPr>
           </a:p>
@@ -2150,7 +2150,7 @@
           </a:bodyPr>
           <a:p>
             <a:pPr algn="ctr"/>
-            <a:endParaRPr b="0" lang="fr-FR" sz="4400" spc="-1" strike="noStrike">
+            <a:endParaRPr b="0" lang="en-US" sz="4400" spc="-1" strike="noStrike">
               <a:latin typeface="Arial"/>
             </a:endParaRPr>
           </a:p>
@@ -2180,7 +2180,7 @@
             <a:normAutofit/>
           </a:bodyPr>
           <a:p>
-            <a:endParaRPr b="0" lang="fr-FR" sz="3200" spc="-1" strike="noStrike">
+            <a:endParaRPr b="0" lang="en-US" sz="3200" spc="-1" strike="noStrike">
               <a:latin typeface="Arial"/>
             </a:endParaRPr>
           </a:p>
@@ -2233,7 +2233,7 @@
           </a:bodyPr>
           <a:p>
             <a:pPr algn="ctr"/>
-            <a:endParaRPr b="0" lang="fr-FR" sz="4400" spc="-1" strike="noStrike">
+            <a:endParaRPr b="0" lang="en-US" sz="4400" spc="-1" strike="noStrike">
               <a:latin typeface="Arial"/>
             </a:endParaRPr>
           </a:p>
@@ -2263,7 +2263,7 @@
             <a:normAutofit/>
           </a:bodyPr>
           <a:p>
-            <a:endParaRPr b="0" lang="fr-FR" sz="3200" spc="-1" strike="noStrike">
+            <a:endParaRPr b="0" lang="en-US" sz="3200" spc="-1" strike="noStrike">
               <a:latin typeface="Arial"/>
             </a:endParaRPr>
           </a:p>
@@ -2293,7 +2293,7 @@
             <a:normAutofit/>
           </a:bodyPr>
           <a:p>
-            <a:endParaRPr b="0" lang="fr-FR" sz="3200" spc="-1" strike="noStrike">
+            <a:endParaRPr b="0" lang="en-US" sz="3200" spc="-1" strike="noStrike">
               <a:latin typeface="Arial"/>
             </a:endParaRPr>
           </a:p>
@@ -2346,7 +2346,7 @@
           </a:bodyPr>
           <a:p>
             <a:pPr algn="ctr"/>
-            <a:endParaRPr b="0" lang="fr-FR" sz="4400" spc="-1" strike="noStrike">
+            <a:endParaRPr b="0" lang="en-US" sz="4400" spc="-1" strike="noStrike">
               <a:latin typeface="Arial"/>
             </a:endParaRPr>
           </a:p>
@@ -2399,7 +2399,7 @@
           </a:bodyPr>
           <a:p>
             <a:pPr algn="ctr"/>
-            <a:endParaRPr b="0" lang="fr-FR" sz="4400" spc="-1" strike="noStrike">
+            <a:endParaRPr b="0" lang="en-US" sz="4400" spc="-1" strike="noStrike">
               <a:latin typeface="Arial"/>
             </a:endParaRPr>
           </a:p>
@@ -2429,7 +2429,7 @@
             <a:normAutofit/>
           </a:bodyPr>
           <a:p>
-            <a:endParaRPr b="0" lang="fr-FR" sz="3200" spc="-1" strike="noStrike">
+            <a:endParaRPr b="0" lang="en-US" sz="3200" spc="-1" strike="noStrike">
               <a:latin typeface="Arial"/>
             </a:endParaRPr>
           </a:p>
@@ -2482,7 +2482,7 @@
           </a:bodyPr>
           <a:p>
             <a:pPr algn="ctr"/>
-            <a:endParaRPr b="0" lang="fr-FR" sz="3200" spc="-1" strike="noStrike">
+            <a:endParaRPr b="0" lang="en-US" sz="3200" spc="-1" strike="noStrike">
               <a:latin typeface="Arial"/>
             </a:endParaRPr>
           </a:p>
@@ -2535,7 +2535,7 @@
           </a:bodyPr>
           <a:p>
             <a:pPr algn="ctr"/>
-            <a:endParaRPr b="0" lang="fr-FR" sz="4400" spc="-1" strike="noStrike">
+            <a:endParaRPr b="0" lang="en-US" sz="4400" spc="-1" strike="noStrike">
               <a:latin typeface="Arial"/>
             </a:endParaRPr>
           </a:p>
@@ -2565,7 +2565,7 @@
             <a:normAutofit/>
           </a:bodyPr>
           <a:p>
-            <a:endParaRPr b="0" lang="fr-FR" sz="3200" spc="-1" strike="noStrike">
+            <a:endParaRPr b="0" lang="en-US" sz="3200" spc="-1" strike="noStrike">
               <a:latin typeface="Arial"/>
             </a:endParaRPr>
           </a:p>
@@ -2595,7 +2595,7 @@
             <a:normAutofit/>
           </a:bodyPr>
           <a:p>
-            <a:endParaRPr b="0" lang="fr-FR" sz="3200" spc="-1" strike="noStrike">
+            <a:endParaRPr b="0" lang="en-US" sz="3200" spc="-1" strike="noStrike">
               <a:latin typeface="Arial"/>
             </a:endParaRPr>
           </a:p>
@@ -2625,7 +2625,7 @@
             <a:normAutofit/>
           </a:bodyPr>
           <a:p>
-            <a:endParaRPr b="0" lang="fr-FR" sz="3200" spc="-1" strike="noStrike">
+            <a:endParaRPr b="0" lang="en-US" sz="3200" spc="-1" strike="noStrike">
               <a:latin typeface="Arial"/>
             </a:endParaRPr>
           </a:p>
@@ -2678,7 +2678,7 @@
           </a:bodyPr>
           <a:p>
             <a:pPr algn="ctr"/>
-            <a:endParaRPr b="0" lang="fr-FR" sz="4400" spc="-1" strike="noStrike">
+            <a:endParaRPr b="0" lang="en-US" sz="4400" spc="-1" strike="noStrike">
               <a:latin typeface="Arial"/>
             </a:endParaRPr>
           </a:p>
@@ -2708,7 +2708,7 @@
             <a:normAutofit/>
           </a:bodyPr>
           <a:p>
-            <a:endParaRPr b="0" lang="fr-FR" sz="3200" spc="-1" strike="noStrike">
+            <a:endParaRPr b="0" lang="en-US" sz="3200" spc="-1" strike="noStrike">
               <a:latin typeface="Arial"/>
             </a:endParaRPr>
           </a:p>
@@ -2738,7 +2738,7 @@
             <a:normAutofit/>
           </a:bodyPr>
           <a:p>
-            <a:endParaRPr b="0" lang="fr-FR" sz="3200" spc="-1" strike="noStrike">
+            <a:endParaRPr b="0" lang="en-US" sz="3200" spc="-1" strike="noStrike">
               <a:latin typeface="Arial"/>
             </a:endParaRPr>
           </a:p>
@@ -2768,7 +2768,7 @@
             <a:normAutofit/>
           </a:bodyPr>
           <a:p>
-            <a:endParaRPr b="0" lang="fr-FR" sz="3200" spc="-1" strike="noStrike">
+            <a:endParaRPr b="0" lang="en-US" sz="3200" spc="-1" strike="noStrike">
               <a:latin typeface="Arial"/>
             </a:endParaRPr>
           </a:p>
@@ -2821,7 +2821,7 @@
           </a:bodyPr>
           <a:p>
             <a:pPr algn="ctr"/>
-            <a:endParaRPr b="0" lang="fr-FR" sz="4400" spc="-1" strike="noStrike">
+            <a:endParaRPr b="0" lang="en-US" sz="4400" spc="-1" strike="noStrike">
               <a:latin typeface="Arial"/>
             </a:endParaRPr>
           </a:p>
@@ -2851,7 +2851,7 @@
             <a:normAutofit/>
           </a:bodyPr>
           <a:p>
-            <a:endParaRPr b="0" lang="fr-FR" sz="3200" spc="-1" strike="noStrike">
+            <a:endParaRPr b="0" lang="en-US" sz="3200" spc="-1" strike="noStrike">
               <a:latin typeface="Arial"/>
             </a:endParaRPr>
           </a:p>
@@ -2881,7 +2881,7 @@
             <a:normAutofit/>
           </a:bodyPr>
           <a:p>
-            <a:endParaRPr b="0" lang="fr-FR" sz="3200" spc="-1" strike="noStrike">
+            <a:endParaRPr b="0" lang="en-US" sz="3200" spc="-1" strike="noStrike">
               <a:latin typeface="Arial"/>
             </a:endParaRPr>
           </a:p>
@@ -2911,7 +2911,7 @@
             <a:normAutofit/>
           </a:bodyPr>
           <a:p>
-            <a:endParaRPr b="0" lang="fr-FR" sz="3200" spc="-1" strike="noStrike">
+            <a:endParaRPr b="0" lang="en-US" sz="3200" spc="-1" strike="noStrike">
               <a:latin typeface="Arial"/>
             </a:endParaRPr>
           </a:p>
@@ -2964,7 +2964,7 @@
           </a:bodyPr>
           <a:p>
             <a:pPr algn="ctr"/>
-            <a:endParaRPr b="0" lang="fr-FR" sz="4400" spc="-1" strike="noStrike">
+            <a:endParaRPr b="0" lang="en-US" sz="4400" spc="-1" strike="noStrike">
               <a:latin typeface="Arial"/>
             </a:endParaRPr>
           </a:p>
@@ -2994,7 +2994,7 @@
             <a:normAutofit/>
           </a:bodyPr>
           <a:p>
-            <a:endParaRPr b="0" lang="fr-FR" sz="3200" spc="-1" strike="noStrike">
+            <a:endParaRPr b="0" lang="en-US" sz="3200" spc="-1" strike="noStrike">
               <a:latin typeface="Arial"/>
             </a:endParaRPr>
           </a:p>
@@ -3024,7 +3024,7 @@
             <a:normAutofit/>
           </a:bodyPr>
           <a:p>
-            <a:endParaRPr b="0" lang="fr-FR" sz="3200" spc="-1" strike="noStrike">
+            <a:endParaRPr b="0" lang="en-US" sz="3200" spc="-1" strike="noStrike">
               <a:latin typeface="Arial"/>
             </a:endParaRPr>
           </a:p>
@@ -3077,7 +3077,7 @@
           </a:bodyPr>
           <a:p>
             <a:pPr algn="ctr"/>
-            <a:endParaRPr b="0" lang="fr-FR" sz="4400" spc="-1" strike="noStrike">
+            <a:endParaRPr b="0" lang="en-US" sz="4400" spc="-1" strike="noStrike">
               <a:latin typeface="Arial"/>
             </a:endParaRPr>
           </a:p>
@@ -3107,7 +3107,7 @@
             <a:normAutofit/>
           </a:bodyPr>
           <a:p>
-            <a:endParaRPr b="0" lang="fr-FR" sz="3200" spc="-1" strike="noStrike">
+            <a:endParaRPr b="0" lang="en-US" sz="3200" spc="-1" strike="noStrike">
               <a:latin typeface="Arial"/>
             </a:endParaRPr>
           </a:p>
@@ -3137,7 +3137,7 @@
             <a:normAutofit/>
           </a:bodyPr>
           <a:p>
-            <a:endParaRPr b="0" lang="fr-FR" sz="3200" spc="-1" strike="noStrike">
+            <a:endParaRPr b="0" lang="en-US" sz="3200" spc="-1" strike="noStrike">
               <a:latin typeface="Arial"/>
             </a:endParaRPr>
           </a:p>
@@ -3167,7 +3167,7 @@
             <a:normAutofit/>
           </a:bodyPr>
           <a:p>
-            <a:endParaRPr b="0" lang="fr-FR" sz="3200" spc="-1" strike="noStrike">
+            <a:endParaRPr b="0" lang="en-US" sz="3200" spc="-1" strike="noStrike">
               <a:latin typeface="Arial"/>
             </a:endParaRPr>
           </a:p>
@@ -3197,7 +3197,7 @@
             <a:normAutofit/>
           </a:bodyPr>
           <a:p>
-            <a:endParaRPr b="0" lang="fr-FR" sz="3200" spc="-1" strike="noStrike">
+            <a:endParaRPr b="0" lang="en-US" sz="3200" spc="-1" strike="noStrike">
               <a:latin typeface="Arial"/>
             </a:endParaRPr>
           </a:p>
@@ -3250,7 +3250,7 @@
           </a:bodyPr>
           <a:p>
             <a:pPr algn="ctr"/>
-            <a:endParaRPr b="0" lang="fr-FR" sz="4400" spc="-1" strike="noStrike">
+            <a:endParaRPr b="0" lang="en-US" sz="4400" spc="-1" strike="noStrike">
               <a:latin typeface="Arial"/>
             </a:endParaRPr>
           </a:p>
@@ -3280,7 +3280,7 @@
             <a:normAutofit/>
           </a:bodyPr>
           <a:p>
-            <a:endParaRPr b="0" lang="fr-FR" sz="3200" spc="-1" strike="noStrike">
+            <a:endParaRPr b="0" lang="en-US" sz="3200" spc="-1" strike="noStrike">
               <a:latin typeface="Arial"/>
             </a:endParaRPr>
           </a:p>
@@ -3310,7 +3310,7 @@
             <a:normAutofit/>
           </a:bodyPr>
           <a:p>
-            <a:endParaRPr b="0" lang="fr-FR" sz="3200" spc="-1" strike="noStrike">
+            <a:endParaRPr b="0" lang="en-US" sz="3200" spc="-1" strike="noStrike">
               <a:latin typeface="Arial"/>
             </a:endParaRPr>
           </a:p>
@@ -3340,7 +3340,7 @@
             <a:normAutofit/>
           </a:bodyPr>
           <a:p>
-            <a:endParaRPr b="0" lang="fr-FR" sz="3200" spc="-1" strike="noStrike">
+            <a:endParaRPr b="0" lang="en-US" sz="3200" spc="-1" strike="noStrike">
               <a:latin typeface="Arial"/>
             </a:endParaRPr>
           </a:p>
@@ -3370,7 +3370,7 @@
             <a:normAutofit/>
           </a:bodyPr>
           <a:p>
-            <a:endParaRPr b="0" lang="fr-FR" sz="3200" spc="-1" strike="noStrike">
+            <a:endParaRPr b="0" lang="en-US" sz="3200" spc="-1" strike="noStrike">
               <a:latin typeface="Arial"/>
             </a:endParaRPr>
           </a:p>
@@ -3400,7 +3400,7 @@
             <a:normAutofit/>
           </a:bodyPr>
           <a:p>
-            <a:endParaRPr b="0" lang="fr-FR" sz="3200" spc="-1" strike="noStrike">
+            <a:endParaRPr b="0" lang="en-US" sz="3200" spc="-1" strike="noStrike">
               <a:latin typeface="Arial"/>
             </a:endParaRPr>
           </a:p>
@@ -3430,7 +3430,7 @@
             <a:normAutofit/>
           </a:bodyPr>
           <a:p>
-            <a:endParaRPr b="0" lang="fr-FR" sz="3200" spc="-1" strike="noStrike">
+            <a:endParaRPr b="0" lang="en-US" sz="3200" spc="-1" strike="noStrike">
               <a:latin typeface="Arial"/>
             </a:endParaRPr>
           </a:p>
@@ -3483,7 +3483,7 @@
           </a:bodyPr>
           <a:p>
             <a:pPr algn="ctr"/>
-            <a:endParaRPr b="0" lang="fr-FR" sz="4400" spc="-1" strike="noStrike">
+            <a:endParaRPr b="0" lang="en-US" sz="4400" spc="-1" strike="noStrike">
               <a:latin typeface="Arial"/>
             </a:endParaRPr>
           </a:p>
@@ -3513,7 +3513,7 @@
             <a:normAutofit/>
           </a:bodyPr>
           <a:p>
-            <a:endParaRPr b="0" lang="fr-FR" sz="3200" spc="-1" strike="noStrike">
+            <a:endParaRPr b="0" lang="en-US" sz="3200" spc="-1" strike="noStrike">
               <a:latin typeface="Arial"/>
             </a:endParaRPr>
           </a:p>
@@ -3543,7 +3543,7 @@
             <a:normAutofit/>
           </a:bodyPr>
           <a:p>
-            <a:endParaRPr b="0" lang="fr-FR" sz="3200" spc="-1" strike="noStrike">
+            <a:endParaRPr b="0" lang="en-US" sz="3200" spc="-1" strike="noStrike">
               <a:latin typeface="Arial"/>
             </a:endParaRPr>
           </a:p>
@@ -3596,7 +3596,7 @@
           </a:bodyPr>
           <a:p>
             <a:pPr algn="ctr"/>
-            <a:endParaRPr b="0" lang="fr-FR" sz="4400" spc="-1" strike="noStrike">
+            <a:endParaRPr b="0" lang="en-US" sz="4400" spc="-1" strike="noStrike">
               <a:latin typeface="Arial"/>
             </a:endParaRPr>
           </a:p>
@@ -3649,7 +3649,7 @@
           </a:bodyPr>
           <a:p>
             <a:pPr algn="ctr"/>
-            <a:endParaRPr b="0" lang="fr-FR" sz="3200" spc="-1" strike="noStrike">
+            <a:endParaRPr b="0" lang="en-US" sz="3200" spc="-1" strike="noStrike">
               <a:latin typeface="Arial"/>
             </a:endParaRPr>
           </a:p>
@@ -3702,7 +3702,7 @@
           </a:bodyPr>
           <a:p>
             <a:pPr algn="ctr"/>
-            <a:endParaRPr b="0" lang="fr-FR" sz="4400" spc="-1" strike="noStrike">
+            <a:endParaRPr b="0" lang="en-US" sz="4400" spc="-1" strike="noStrike">
               <a:latin typeface="Arial"/>
             </a:endParaRPr>
           </a:p>
@@ -3732,7 +3732,7 @@
             <a:normAutofit/>
           </a:bodyPr>
           <a:p>
-            <a:endParaRPr b="0" lang="fr-FR" sz="3200" spc="-1" strike="noStrike">
+            <a:endParaRPr b="0" lang="en-US" sz="3200" spc="-1" strike="noStrike">
               <a:latin typeface="Arial"/>
             </a:endParaRPr>
           </a:p>
@@ -3762,7 +3762,7 @@
             <a:normAutofit/>
           </a:bodyPr>
           <a:p>
-            <a:endParaRPr b="0" lang="fr-FR" sz="3200" spc="-1" strike="noStrike">
+            <a:endParaRPr b="0" lang="en-US" sz="3200" spc="-1" strike="noStrike">
               <a:latin typeface="Arial"/>
             </a:endParaRPr>
           </a:p>
@@ -3792,7 +3792,7 @@
             <a:normAutofit/>
           </a:bodyPr>
           <a:p>
-            <a:endParaRPr b="0" lang="fr-FR" sz="3200" spc="-1" strike="noStrike">
+            <a:endParaRPr b="0" lang="en-US" sz="3200" spc="-1" strike="noStrike">
               <a:latin typeface="Arial"/>
             </a:endParaRPr>
           </a:p>
@@ -3845,7 +3845,7 @@
           </a:bodyPr>
           <a:p>
             <a:pPr algn="ctr"/>
-            <a:endParaRPr b="0" lang="fr-FR" sz="4400" spc="-1" strike="noStrike">
+            <a:endParaRPr b="0" lang="en-US" sz="4400" spc="-1" strike="noStrike">
               <a:latin typeface="Arial"/>
             </a:endParaRPr>
           </a:p>
@@ -3875,7 +3875,7 @@
             <a:normAutofit/>
           </a:bodyPr>
           <a:p>
-            <a:endParaRPr b="0" lang="fr-FR" sz="3200" spc="-1" strike="noStrike">
+            <a:endParaRPr b="0" lang="en-US" sz="3200" spc="-1" strike="noStrike">
               <a:latin typeface="Arial"/>
             </a:endParaRPr>
           </a:p>
@@ -3905,7 +3905,7 @@
             <a:normAutofit/>
           </a:bodyPr>
           <a:p>
-            <a:endParaRPr b="0" lang="fr-FR" sz="3200" spc="-1" strike="noStrike">
+            <a:endParaRPr b="0" lang="en-US" sz="3200" spc="-1" strike="noStrike">
               <a:latin typeface="Arial"/>
             </a:endParaRPr>
           </a:p>
@@ -3935,7 +3935,7 @@
             <a:normAutofit/>
           </a:bodyPr>
           <a:p>
-            <a:endParaRPr b="0" lang="fr-FR" sz="3200" spc="-1" strike="noStrike">
+            <a:endParaRPr b="0" lang="en-US" sz="3200" spc="-1" strike="noStrike">
               <a:latin typeface="Arial"/>
             </a:endParaRPr>
           </a:p>
@@ -3988,7 +3988,7 @@
           </a:bodyPr>
           <a:p>
             <a:pPr algn="ctr"/>
-            <a:endParaRPr b="0" lang="fr-FR" sz="4400" spc="-1" strike="noStrike">
+            <a:endParaRPr b="0" lang="en-US" sz="4400" spc="-1" strike="noStrike">
               <a:latin typeface="Arial"/>
             </a:endParaRPr>
           </a:p>
@@ -4018,7 +4018,7 @@
             <a:normAutofit/>
           </a:bodyPr>
           <a:p>
-            <a:endParaRPr b="0" lang="fr-FR" sz="3200" spc="-1" strike="noStrike">
+            <a:endParaRPr b="0" lang="en-US" sz="3200" spc="-1" strike="noStrike">
               <a:latin typeface="Arial"/>
             </a:endParaRPr>
           </a:p>
@@ -4048,7 +4048,7 @@
             <a:normAutofit/>
           </a:bodyPr>
           <a:p>
-            <a:endParaRPr b="0" lang="fr-FR" sz="3200" spc="-1" strike="noStrike">
+            <a:endParaRPr b="0" lang="en-US" sz="3200" spc="-1" strike="noStrike">
               <a:latin typeface="Arial"/>
             </a:endParaRPr>
           </a:p>
@@ -4078,7 +4078,7 @@
             <a:normAutofit/>
           </a:bodyPr>
           <a:p>
-            <a:endParaRPr b="0" lang="fr-FR" sz="3200" spc="-1" strike="noStrike">
+            <a:endParaRPr b="0" lang="en-US" sz="3200" spc="-1" strike="noStrike">
               <a:latin typeface="Arial"/>
             </a:endParaRPr>
           </a:p>
@@ -4139,12 +4139,12 @@
           <a:p>
             <a:pPr algn="ctr"/>
             <a:r>
-              <a:rPr b="0" lang="fr-FR" sz="4400" spc="-1" strike="noStrike">
+              <a:rPr b="0" lang="en-US" sz="4400" spc="-1" strike="noStrike">
                 <a:latin typeface="Arial"/>
               </a:rPr>
-              <a:t>Cliquez pour éditer le format du texte-titre</a:t>
+              <a:t>Click to edit the title text format</a:t>
             </a:r>
-            <a:endParaRPr b="0" lang="fr-FR" sz="4400" spc="-1" strike="noStrike">
+            <a:endParaRPr b="0" lang="en-US" sz="4400" spc="-1" strike="noStrike">
               <a:latin typeface="Arial"/>
             </a:endParaRPr>
           </a:p>
@@ -4186,12 +4186,12 @@
               <a:buChar char=""/>
             </a:pPr>
             <a:r>
-              <a:rPr b="0" lang="fr-FR" sz="3200" spc="-1" strike="noStrike">
+              <a:rPr b="0" lang="en-US" sz="3200" spc="-1" strike="noStrike">
                 <a:latin typeface="Arial"/>
               </a:rPr>
-              <a:t>Cliquez pour éditer le format du plan de texte</a:t>
+              <a:t>Click to edit the outline text format</a:t>
             </a:r>
-            <a:endParaRPr b="0" lang="fr-FR" sz="3200" spc="-1" strike="noStrike">
+            <a:endParaRPr b="0" lang="en-US" sz="3200" spc="-1" strike="noStrike">
               <a:latin typeface="Arial"/>
             </a:endParaRPr>
           </a:p>
@@ -4208,12 +4208,12 @@
               <a:buChar char=""/>
             </a:pPr>
             <a:r>
-              <a:rPr b="0" lang="fr-FR" sz="2800" spc="-1" strike="noStrike">
+              <a:rPr b="0" lang="en-US" sz="2800" spc="-1" strike="noStrike">
                 <a:latin typeface="Arial"/>
               </a:rPr>
-              <a:t>Second niveau de plan</a:t>
+              <a:t>Second Outline Level</a:t>
             </a:r>
-            <a:endParaRPr b="0" lang="fr-FR" sz="2800" spc="-1" strike="noStrike">
+            <a:endParaRPr b="0" lang="en-US" sz="2800" spc="-1" strike="noStrike">
               <a:latin typeface="Arial"/>
             </a:endParaRPr>
           </a:p>
@@ -4230,12 +4230,12 @@
               <a:buChar char=""/>
             </a:pPr>
             <a:r>
-              <a:rPr b="0" lang="fr-FR" sz="2400" spc="-1" strike="noStrike">
+              <a:rPr b="0" lang="en-US" sz="2400" spc="-1" strike="noStrike">
                 <a:latin typeface="Arial"/>
               </a:rPr>
-              <a:t>Troisième niveau de plan</a:t>
+              <a:t>Third Outline Level</a:t>
             </a:r>
-            <a:endParaRPr b="0" lang="fr-FR" sz="2400" spc="-1" strike="noStrike">
+            <a:endParaRPr b="0" lang="en-US" sz="2400" spc="-1" strike="noStrike">
               <a:latin typeface="Arial"/>
             </a:endParaRPr>
           </a:p>
@@ -4252,12 +4252,12 @@
               <a:buChar char=""/>
             </a:pPr>
             <a:r>
-              <a:rPr b="0" lang="fr-FR" sz="2000" spc="-1" strike="noStrike">
+              <a:rPr b="0" lang="en-US" sz="2000" spc="-1" strike="noStrike">
                 <a:latin typeface="Arial"/>
               </a:rPr>
-              <a:t>Quatrième niveau de plan</a:t>
+              <a:t>Fourth Outline Level</a:t>
             </a:r>
-            <a:endParaRPr b="0" lang="fr-FR" sz="2000" spc="-1" strike="noStrike">
+            <a:endParaRPr b="0" lang="en-US" sz="2000" spc="-1" strike="noStrike">
               <a:latin typeface="Arial"/>
             </a:endParaRPr>
           </a:p>
@@ -4274,12 +4274,12 @@
               <a:buChar char=""/>
             </a:pPr>
             <a:r>
-              <a:rPr b="0" lang="fr-FR" sz="2000" spc="-1" strike="noStrike">
+              <a:rPr b="0" lang="en-US" sz="2000" spc="-1" strike="noStrike">
                 <a:latin typeface="Arial"/>
               </a:rPr>
-              <a:t>Cinquième niveau de plan</a:t>
+              <a:t>Fifth Outline Level</a:t>
             </a:r>
-            <a:endParaRPr b="0" lang="fr-FR" sz="2000" spc="-1" strike="noStrike">
+            <a:endParaRPr b="0" lang="en-US" sz="2000" spc="-1" strike="noStrike">
               <a:latin typeface="Arial"/>
             </a:endParaRPr>
           </a:p>
@@ -4296,12 +4296,12 @@
               <a:buChar char=""/>
             </a:pPr>
             <a:r>
-              <a:rPr b="0" lang="fr-FR" sz="2000" spc="-1" strike="noStrike">
+              <a:rPr b="0" lang="en-US" sz="2000" spc="-1" strike="noStrike">
                 <a:latin typeface="Arial"/>
               </a:rPr>
-              <a:t>Sixième niveau de plan</a:t>
+              <a:t>Sixth Outline Level</a:t>
             </a:r>
-            <a:endParaRPr b="0" lang="fr-FR" sz="2000" spc="-1" strike="noStrike">
+            <a:endParaRPr b="0" lang="en-US" sz="2000" spc="-1" strike="noStrike">
               <a:latin typeface="Arial"/>
             </a:endParaRPr>
           </a:p>
@@ -4318,12 +4318,12 @@
               <a:buChar char=""/>
             </a:pPr>
             <a:r>
-              <a:rPr b="0" lang="fr-FR" sz="2000" spc="-1" strike="noStrike">
+              <a:rPr b="0" lang="en-US" sz="2000" spc="-1" strike="noStrike">
                 <a:latin typeface="Arial"/>
               </a:rPr>
-              <a:t>Septième niveau de plan</a:t>
+              <a:t>Seventh Outline Level</a:t>
             </a:r>
-            <a:endParaRPr b="0" lang="fr-FR" sz="2000" spc="-1" strike="noStrike">
+            <a:endParaRPr b="0" lang="en-US" sz="2000" spc="-1" strike="noStrike">
               <a:latin typeface="Arial"/>
             </a:endParaRPr>
           </a:p>
@@ -4399,12 +4399,12 @@
           <a:p>
             <a:pPr algn="ctr"/>
             <a:r>
-              <a:rPr b="0" lang="fr-FR" sz="4400" spc="-1" strike="noStrike">
+              <a:rPr b="0" lang="en-US" sz="4400" spc="-1" strike="noStrike">
                 <a:latin typeface="Arial"/>
               </a:rPr>
-              <a:t>Cliquez pour éditer le format du texte-titre</a:t>
+              <a:t>Click to edit the title text format</a:t>
             </a:r>
-            <a:endParaRPr b="0" lang="fr-FR" sz="4400" spc="-1" strike="noStrike">
+            <a:endParaRPr b="0" lang="en-US" sz="4400" spc="-1" strike="noStrike">
               <a:latin typeface="Arial"/>
             </a:endParaRPr>
           </a:p>
@@ -4446,12 +4446,12 @@
               <a:buChar char=""/>
             </a:pPr>
             <a:r>
-              <a:rPr b="0" lang="fr-FR" sz="3200" spc="-1" strike="noStrike">
+              <a:rPr b="0" lang="en-US" sz="3200" spc="-1" strike="noStrike">
                 <a:latin typeface="Arial"/>
               </a:rPr>
-              <a:t>Cliquez pour éditer le format du plan de texte</a:t>
+              <a:t>Click to edit the outline text format</a:t>
             </a:r>
-            <a:endParaRPr b="0" lang="fr-FR" sz="3200" spc="-1" strike="noStrike">
+            <a:endParaRPr b="0" lang="en-US" sz="3200" spc="-1" strike="noStrike">
               <a:latin typeface="Arial"/>
             </a:endParaRPr>
           </a:p>
@@ -4468,12 +4468,12 @@
               <a:buChar char=""/>
             </a:pPr>
             <a:r>
-              <a:rPr b="0" lang="fr-FR" sz="2800" spc="-1" strike="noStrike">
+              <a:rPr b="0" lang="en-US" sz="2800" spc="-1" strike="noStrike">
                 <a:latin typeface="Arial"/>
               </a:rPr>
-              <a:t>Second niveau de plan</a:t>
+              <a:t>Second Outline Level</a:t>
             </a:r>
-            <a:endParaRPr b="0" lang="fr-FR" sz="2800" spc="-1" strike="noStrike">
+            <a:endParaRPr b="0" lang="en-US" sz="2800" spc="-1" strike="noStrike">
               <a:latin typeface="Arial"/>
             </a:endParaRPr>
           </a:p>
@@ -4490,12 +4490,12 @@
               <a:buChar char=""/>
             </a:pPr>
             <a:r>
-              <a:rPr b="0" lang="fr-FR" sz="2400" spc="-1" strike="noStrike">
+              <a:rPr b="0" lang="en-US" sz="2400" spc="-1" strike="noStrike">
                 <a:latin typeface="Arial"/>
               </a:rPr>
-              <a:t>Troisième niveau de plan</a:t>
+              <a:t>Third Outline Level</a:t>
             </a:r>
-            <a:endParaRPr b="0" lang="fr-FR" sz="2400" spc="-1" strike="noStrike">
+            <a:endParaRPr b="0" lang="en-US" sz="2400" spc="-1" strike="noStrike">
               <a:latin typeface="Arial"/>
             </a:endParaRPr>
           </a:p>
@@ -4512,12 +4512,12 @@
               <a:buChar char=""/>
             </a:pPr>
             <a:r>
-              <a:rPr b="0" lang="fr-FR" sz="2000" spc="-1" strike="noStrike">
+              <a:rPr b="0" lang="en-US" sz="2000" spc="-1" strike="noStrike">
                 <a:latin typeface="Arial"/>
               </a:rPr>
-              <a:t>Quatrième niveau de plan</a:t>
+              <a:t>Fourth Outline Level</a:t>
             </a:r>
-            <a:endParaRPr b="0" lang="fr-FR" sz="2000" spc="-1" strike="noStrike">
+            <a:endParaRPr b="0" lang="en-US" sz="2000" spc="-1" strike="noStrike">
               <a:latin typeface="Arial"/>
             </a:endParaRPr>
           </a:p>
@@ -4534,12 +4534,12 @@
               <a:buChar char=""/>
             </a:pPr>
             <a:r>
-              <a:rPr b="0" lang="fr-FR" sz="2000" spc="-1" strike="noStrike">
+              <a:rPr b="0" lang="en-US" sz="2000" spc="-1" strike="noStrike">
                 <a:latin typeface="Arial"/>
               </a:rPr>
-              <a:t>Cinquième niveau de plan</a:t>
+              <a:t>Fifth Outline Level</a:t>
             </a:r>
-            <a:endParaRPr b="0" lang="fr-FR" sz="2000" spc="-1" strike="noStrike">
+            <a:endParaRPr b="0" lang="en-US" sz="2000" spc="-1" strike="noStrike">
               <a:latin typeface="Arial"/>
             </a:endParaRPr>
           </a:p>
@@ -4556,12 +4556,12 @@
               <a:buChar char=""/>
             </a:pPr>
             <a:r>
-              <a:rPr b="0" lang="fr-FR" sz="2000" spc="-1" strike="noStrike">
+              <a:rPr b="0" lang="en-US" sz="2000" spc="-1" strike="noStrike">
                 <a:latin typeface="Arial"/>
               </a:rPr>
-              <a:t>Sixième niveau de plan</a:t>
+              <a:t>Sixth Outline Level</a:t>
             </a:r>
-            <a:endParaRPr b="0" lang="fr-FR" sz="2000" spc="-1" strike="noStrike">
+            <a:endParaRPr b="0" lang="en-US" sz="2000" spc="-1" strike="noStrike">
               <a:latin typeface="Arial"/>
             </a:endParaRPr>
           </a:p>
@@ -4578,12 +4578,12 @@
               <a:buChar char=""/>
             </a:pPr>
             <a:r>
-              <a:rPr b="0" lang="fr-FR" sz="2000" spc="-1" strike="noStrike">
+              <a:rPr b="0" lang="en-US" sz="2000" spc="-1" strike="noStrike">
                 <a:latin typeface="Arial"/>
               </a:rPr>
-              <a:t>Septième niveau de plan</a:t>
+              <a:t>Seventh Outline Level</a:t>
             </a:r>
-            <a:endParaRPr b="0" lang="fr-FR" sz="2000" spc="-1" strike="noStrike">
+            <a:endParaRPr b="0" lang="en-US" sz="2000" spc="-1" strike="noStrike">
               <a:latin typeface="Arial"/>
             </a:endParaRPr>
           </a:p>
@@ -4659,12 +4659,12 @@
           <a:p>
             <a:pPr algn="ctr"/>
             <a:r>
-              <a:rPr b="0" lang="fr-FR" sz="4400" spc="-1" strike="noStrike">
+              <a:rPr b="0" lang="en-US" sz="4400" spc="-1" strike="noStrike">
                 <a:latin typeface="Arial"/>
               </a:rPr>
-              <a:t>Cliquez pour éditer le format du texte-titre</a:t>
+              <a:t>Click to edit the title text format</a:t>
             </a:r>
-            <a:endParaRPr b="0" lang="fr-FR" sz="4400" spc="-1" strike="noStrike">
+            <a:endParaRPr b="0" lang="en-US" sz="4400" spc="-1" strike="noStrike">
               <a:latin typeface="Arial"/>
             </a:endParaRPr>
           </a:p>
@@ -4706,12 +4706,12 @@
               <a:buChar char=""/>
             </a:pPr>
             <a:r>
-              <a:rPr b="0" lang="fr-FR" sz="3200" spc="-1" strike="noStrike">
+              <a:rPr b="0" lang="en-US" sz="3200" spc="-1" strike="noStrike">
                 <a:latin typeface="Arial"/>
               </a:rPr>
-              <a:t>Cliquez pour éditer le format du plan de texte</a:t>
+              <a:t>Click to edit the outline text format</a:t>
             </a:r>
-            <a:endParaRPr b="0" lang="fr-FR" sz="3200" spc="-1" strike="noStrike">
+            <a:endParaRPr b="0" lang="en-US" sz="3200" spc="-1" strike="noStrike">
               <a:latin typeface="Arial"/>
             </a:endParaRPr>
           </a:p>
@@ -4728,12 +4728,12 @@
               <a:buChar char=""/>
             </a:pPr>
             <a:r>
-              <a:rPr b="0" lang="fr-FR" sz="2800" spc="-1" strike="noStrike">
+              <a:rPr b="0" lang="en-US" sz="2800" spc="-1" strike="noStrike">
                 <a:latin typeface="Arial"/>
               </a:rPr>
-              <a:t>Second niveau de plan</a:t>
+              <a:t>Second Outline Level</a:t>
             </a:r>
-            <a:endParaRPr b="0" lang="fr-FR" sz="2800" spc="-1" strike="noStrike">
+            <a:endParaRPr b="0" lang="en-US" sz="2800" spc="-1" strike="noStrike">
               <a:latin typeface="Arial"/>
             </a:endParaRPr>
           </a:p>
@@ -4750,12 +4750,12 @@
               <a:buChar char=""/>
             </a:pPr>
             <a:r>
-              <a:rPr b="0" lang="fr-FR" sz="2400" spc="-1" strike="noStrike">
+              <a:rPr b="0" lang="en-US" sz="2400" spc="-1" strike="noStrike">
                 <a:latin typeface="Arial"/>
               </a:rPr>
-              <a:t>Troisième niveau de plan</a:t>
+              <a:t>Third Outline Level</a:t>
             </a:r>
-            <a:endParaRPr b="0" lang="fr-FR" sz="2400" spc="-1" strike="noStrike">
+            <a:endParaRPr b="0" lang="en-US" sz="2400" spc="-1" strike="noStrike">
               <a:latin typeface="Arial"/>
             </a:endParaRPr>
           </a:p>
@@ -4772,12 +4772,12 @@
               <a:buChar char=""/>
             </a:pPr>
             <a:r>
-              <a:rPr b="0" lang="fr-FR" sz="2000" spc="-1" strike="noStrike">
+              <a:rPr b="0" lang="en-US" sz="2000" spc="-1" strike="noStrike">
                 <a:latin typeface="Arial"/>
               </a:rPr>
-              <a:t>Quatrième niveau de plan</a:t>
+              <a:t>Fourth Outline Level</a:t>
             </a:r>
-            <a:endParaRPr b="0" lang="fr-FR" sz="2000" spc="-1" strike="noStrike">
+            <a:endParaRPr b="0" lang="en-US" sz="2000" spc="-1" strike="noStrike">
               <a:latin typeface="Arial"/>
             </a:endParaRPr>
           </a:p>
@@ -4794,12 +4794,12 @@
               <a:buChar char=""/>
             </a:pPr>
             <a:r>
-              <a:rPr b="0" lang="fr-FR" sz="2000" spc="-1" strike="noStrike">
+              <a:rPr b="0" lang="en-US" sz="2000" spc="-1" strike="noStrike">
                 <a:latin typeface="Arial"/>
               </a:rPr>
-              <a:t>Cinquième niveau de plan</a:t>
+              <a:t>Fifth Outline Level</a:t>
             </a:r>
-            <a:endParaRPr b="0" lang="fr-FR" sz="2000" spc="-1" strike="noStrike">
+            <a:endParaRPr b="0" lang="en-US" sz="2000" spc="-1" strike="noStrike">
               <a:latin typeface="Arial"/>
             </a:endParaRPr>
           </a:p>
@@ -4816,12 +4816,12 @@
               <a:buChar char=""/>
             </a:pPr>
             <a:r>
-              <a:rPr b="0" lang="fr-FR" sz="2000" spc="-1" strike="noStrike">
+              <a:rPr b="0" lang="en-US" sz="2000" spc="-1" strike="noStrike">
                 <a:latin typeface="Arial"/>
               </a:rPr>
-              <a:t>Sixième niveau de plan</a:t>
+              <a:t>Sixth Outline Level</a:t>
             </a:r>
-            <a:endParaRPr b="0" lang="fr-FR" sz="2000" spc="-1" strike="noStrike">
+            <a:endParaRPr b="0" lang="en-US" sz="2000" spc="-1" strike="noStrike">
               <a:latin typeface="Arial"/>
             </a:endParaRPr>
           </a:p>
@@ -4838,12 +4838,12 @@
               <a:buChar char=""/>
             </a:pPr>
             <a:r>
-              <a:rPr b="0" lang="fr-FR" sz="2000" spc="-1" strike="noStrike">
+              <a:rPr b="0" lang="en-US" sz="2000" spc="-1" strike="noStrike">
                 <a:latin typeface="Arial"/>
               </a:rPr>
-              <a:t>Septième niveau de plan</a:t>
+              <a:t>Seventh Outline Level</a:t>
             </a:r>
-            <a:endParaRPr b="0" lang="fr-FR" sz="2000" spc="-1" strike="noStrike">
+            <a:endParaRPr b="0" lang="en-US" sz="2000" spc="-1" strike="noStrike">
               <a:latin typeface="Arial"/>
             </a:endParaRPr>
           </a:p>
@@ -4902,7 +4902,7 @@
         <p:spPr>
           <a:xfrm>
             <a:off x="0" y="0"/>
-            <a:ext cx="12189600" cy="6855480"/>
+            <a:ext cx="12189240" cy="6855120"/>
           </a:xfrm>
           <a:prstGeom prst="rect">
             <a:avLst/>
@@ -4941,7 +4941,7 @@
         <p:spPr>
           <a:xfrm>
             <a:off x="6746760" y="1783800"/>
-            <a:ext cx="4642560" cy="2886480"/>
+            <a:ext cx="4642200" cy="2886120"/>
           </a:xfrm>
           <a:prstGeom prst="rect">
             <a:avLst/>
@@ -4968,7 +4968,7 @@
               </a:lnSpc>
             </a:pPr>
             <a:r>
-              <a:rPr b="0" lang="fr-FR" sz="6000" spc="-1" strike="noStrike">
+              <a:rPr b="0" lang="en-US" sz="6000" spc="-1" strike="noStrike">
                 <a:solidFill>
                   <a:srgbClr val="ffffff"/>
                 </a:solidFill>
@@ -4977,7 +4977,7 @@
               </a:rPr>
               <a:t>Le projet « Git-moi tout »</a:t>
             </a:r>
-            <a:endParaRPr b="0" lang="fr-FR" sz="6000" spc="-1" strike="noStrike">
+            <a:endParaRPr b="0" lang="en-US" sz="6000" spc="-1" strike="noStrike">
               <a:latin typeface="Arial"/>
             </a:endParaRPr>
           </a:p>
@@ -4992,7 +4992,7 @@
         <p:spPr>
           <a:xfrm>
             <a:off x="6746760" y="4750920"/>
-            <a:ext cx="4642560" cy="1145520"/>
+            <a:ext cx="4642200" cy="1145160"/>
           </a:xfrm>
           <a:prstGeom prst="rect">
             <a:avLst/>
@@ -5022,7 +5022,7 @@
               </a:spcBef>
             </a:pPr>
             <a:r>
-              <a:rPr b="0" lang="fr-FR" sz="2000" spc="-1" strike="noStrike">
+              <a:rPr b="0" lang="en-US" sz="2000" spc="-1" strike="noStrike">
                 <a:solidFill>
                   <a:srgbClr val="ffffff"/>
                 </a:solidFill>
@@ -5031,7 +5031,7 @@
               </a:rPr>
               <a:t>Le répertoire pour tout savoir sur GIT</a:t>
             </a:r>
-            <a:endParaRPr b="0" lang="fr-FR" sz="2000" spc="-1" strike="noStrike">
+            <a:endParaRPr b="0" lang="en-US" sz="2000" spc="-1" strike="noStrike">
               <a:latin typeface="Arial"/>
             </a:endParaRPr>
           </a:p>
@@ -5045,8 +5045,8 @@
         </p:nvSpPr>
         <p:spPr>
           <a:xfrm flipH="1">
-            <a:off x="-2160" y="0"/>
-            <a:ext cx="6170400" cy="6855480"/>
+            <a:off x="-2880" y="0"/>
+            <a:ext cx="6170040" cy="6855120"/>
           </a:xfrm>
           <a:custGeom>
             <a:avLst/>
@@ -5117,7 +5117,7 @@
         <p:spPr>
           <a:xfrm>
             <a:off x="0" y="0"/>
-            <a:ext cx="6021720" cy="6855480"/>
+            <a:ext cx="6021360" cy="6855120"/>
           </a:xfrm>
           <a:custGeom>
             <a:avLst/>
@@ -5190,7 +5190,7 @@
         <p:spPr>
           <a:xfrm>
             <a:off x="419400" y="721080"/>
-            <a:ext cx="4045320" cy="4045320"/>
+            <a:ext cx="4044960" cy="4044960"/>
           </a:xfrm>
           <a:prstGeom prst="rect">
             <a:avLst/>
@@ -5246,7 +5246,7 @@
         <p:spPr>
           <a:xfrm>
             <a:off x="0" y="0"/>
-            <a:ext cx="4651920" cy="6855480"/>
+            <a:ext cx="4651560" cy="6855120"/>
           </a:xfrm>
           <a:prstGeom prst="rect">
             <a:avLst/>
@@ -5277,7 +5277,7 @@
         <p:spPr>
           <a:xfrm>
             <a:off x="643320" y="643320"/>
-            <a:ext cx="3361320" cy="1594800"/>
+            <a:ext cx="3360960" cy="1594440"/>
           </a:xfrm>
           <a:prstGeom prst="rect">
             <a:avLst/>
@@ -5307,7 +5307,7 @@
               </a:lnSpc>
             </a:pPr>
             <a:r>
-              <a:rPr b="0" lang="fr-FR" sz="2800" spc="-1" strike="noStrike">
+              <a:rPr b="0" lang="en-US" sz="2800" spc="-1" strike="noStrike">
                 <a:solidFill>
                   <a:srgbClr val="ffffff"/>
                 </a:solidFill>
@@ -5316,7 +5316,7 @@
               </a:rPr>
               <a:t>Le but du projet « GIT-moi-tout »</a:t>
             </a:r>
-            <a:endParaRPr b="0" lang="fr-FR" sz="2800" spc="-1" strike="noStrike">
+            <a:endParaRPr b="0" lang="en-US" sz="2800" spc="-1" strike="noStrike">
               <a:latin typeface="Arial"/>
             </a:endParaRPr>
           </a:p>
@@ -5331,7 +5331,7 @@
         <p:spPr>
           <a:xfrm>
             <a:off x="643320" y="2638080"/>
-            <a:ext cx="3361320" cy="3413160"/>
+            <a:ext cx="3360960" cy="3412800"/>
           </a:xfrm>
           <a:prstGeom prst="rect">
             <a:avLst/>
@@ -5361,7 +5361,7 @@
               </a:spcBef>
             </a:pPr>
             <a:r>
-              <a:rPr b="0" lang="fr-FR" sz="1700" spc="-1" strike="noStrike">
+              <a:rPr b="0" lang="en-US" sz="1700" spc="-1" strike="noStrike">
                 <a:solidFill>
                   <a:srgbClr val="ffffff"/>
                 </a:solidFill>
@@ -5370,12 +5370,12 @@
               </a:rPr>
               <a:t>Permettre aux novices et au moins novices de comprendre :</a:t>
             </a:r>
-            <a:endParaRPr b="0" lang="fr-FR" sz="1700" spc="-1" strike="noStrike">
-              <a:latin typeface="Arial"/>
-            </a:endParaRPr>
-          </a:p>
-          <a:p>
-            <a:pPr lvl="1" marL="685800" indent="-226080">
+            <a:endParaRPr b="0" lang="en-US" sz="1700" spc="-1" strike="noStrike">
+              <a:latin typeface="Arial"/>
+            </a:endParaRPr>
+          </a:p>
+          <a:p>
+            <a:pPr lvl="1" marL="685800" indent="-225720">
               <a:lnSpc>
                 <a:spcPct val="90000"/>
               </a:lnSpc>
@@ -5389,7 +5389,7 @@
               <a:buChar char="•"/>
             </a:pPr>
             <a:r>
-              <a:rPr b="0" lang="fr-FR" sz="1700" spc="-1" strike="noStrike">
+              <a:rPr b="0" lang="en-US" sz="1700" spc="-1" strike="noStrike">
                 <a:solidFill>
                   <a:srgbClr val="ffffff"/>
                 </a:solidFill>
@@ -5398,12 +5398,12 @@
               </a:rPr>
               <a:t>C’est quoi GIT et pour quel usage ?</a:t>
             </a:r>
-            <a:endParaRPr b="0" lang="fr-FR" sz="1700" spc="-1" strike="noStrike">
-              <a:latin typeface="Arial"/>
-            </a:endParaRPr>
-          </a:p>
-          <a:p>
-            <a:pPr lvl="1" marL="685800" indent="-226080">
+            <a:endParaRPr b="0" lang="en-US" sz="1700" spc="-1" strike="noStrike">
+              <a:latin typeface="Arial"/>
+            </a:endParaRPr>
+          </a:p>
+          <a:p>
+            <a:pPr lvl="1" marL="685800" indent="-225720">
               <a:lnSpc>
                 <a:spcPct val="90000"/>
               </a:lnSpc>
@@ -5417,7 +5417,7 @@
               <a:buChar char="•"/>
             </a:pPr>
             <a:r>
-              <a:rPr b="0" lang="fr-FR" sz="1700" spc="-1" strike="noStrike">
+              <a:rPr b="0" lang="en-US" sz="1700" spc="-1" strike="noStrike">
                 <a:solidFill>
                   <a:srgbClr val="ffffff"/>
                 </a:solidFill>
@@ -5426,12 +5426,12 @@
               </a:rPr>
               <a:t>Comment fonctionne-t-il?</a:t>
             </a:r>
-            <a:endParaRPr b="0" lang="fr-FR" sz="1700" spc="-1" strike="noStrike">
-              <a:latin typeface="Arial"/>
-            </a:endParaRPr>
-          </a:p>
-          <a:p>
-            <a:pPr lvl="1" marL="685800" indent="-226080">
+            <a:endParaRPr b="0" lang="en-US" sz="1700" spc="-1" strike="noStrike">
+              <a:latin typeface="Arial"/>
+            </a:endParaRPr>
+          </a:p>
+          <a:p>
+            <a:pPr lvl="1" marL="685800" indent="-225720">
               <a:lnSpc>
                 <a:spcPct val="90000"/>
               </a:lnSpc>
@@ -5445,7 +5445,7 @@
               <a:buChar char="•"/>
             </a:pPr>
             <a:r>
-              <a:rPr b="0" lang="fr-FR" sz="1700" spc="-1" strike="noStrike">
+              <a:rPr b="0" lang="en-US" sz="1700" spc="-1" strike="noStrike">
                 <a:solidFill>
                   <a:srgbClr val="ffffff"/>
                 </a:solidFill>
@@ -5454,12 +5454,12 @@
               </a:rPr>
               <a:t>Comment bien démarrer avec GIT</a:t>
             </a:r>
-            <a:endParaRPr b="0" lang="fr-FR" sz="1700" spc="-1" strike="noStrike">
-              <a:latin typeface="Arial"/>
-            </a:endParaRPr>
-          </a:p>
-          <a:p>
-            <a:pPr lvl="1" marL="685800" indent="-226080">
+            <a:endParaRPr b="0" lang="en-US" sz="1700" spc="-1" strike="noStrike">
+              <a:latin typeface="Arial"/>
+            </a:endParaRPr>
+          </a:p>
+          <a:p>
+            <a:pPr lvl="1" marL="685800" indent="-225720">
               <a:lnSpc>
                 <a:spcPct val="90000"/>
               </a:lnSpc>
@@ -5473,7 +5473,7 @@
               <a:buChar char="•"/>
             </a:pPr>
             <a:r>
-              <a:rPr b="0" lang="fr-FR" sz="1700" spc="-1" strike="noStrike">
+              <a:rPr b="0" lang="en-US" sz="1700" spc="-1" strike="noStrike">
                 <a:solidFill>
                   <a:srgbClr val="ffffff"/>
                 </a:solidFill>
@@ -5482,7 +5482,7 @@
               </a:rPr>
               <a:t>Répondre aux questions et au problèmes que l’ont se poser en utilisant GIT</a:t>
             </a:r>
-            <a:endParaRPr b="0" lang="fr-FR" sz="1700" spc="-1" strike="noStrike">
+            <a:endParaRPr b="0" lang="en-US" sz="1700" spc="-1" strike="noStrike">
               <a:latin typeface="Arial"/>
             </a:endParaRPr>
           </a:p>
@@ -5495,7 +5495,7 @@
                 <a:spcPts val="1001"/>
               </a:spcBef>
             </a:pPr>
-            <a:endParaRPr b="0" lang="fr-FR" sz="1700" spc="-1" strike="noStrike">
+            <a:endParaRPr b="0" lang="en-US" sz="1700" spc="-1" strike="noStrike">
               <a:latin typeface="Arial"/>
             </a:endParaRPr>
           </a:p>
@@ -5505,7 +5505,7 @@
                 <a:spcPct val="100000"/>
               </a:lnSpc>
             </a:pPr>
-            <a:endParaRPr b="0" lang="fr-FR" sz="1700" spc="-1" strike="noStrike">
+            <a:endParaRPr b="0" lang="en-US" sz="1700" spc="-1" strike="noStrike">
               <a:latin typeface="Arial"/>
             </a:endParaRPr>
           </a:p>
@@ -5524,7 +5524,7 @@
         <p:spPr>
           <a:xfrm>
             <a:off x="5198760" y="1295640"/>
-            <a:ext cx="6248160" cy="4685400"/>
+            <a:ext cx="6247800" cy="4685040"/>
           </a:xfrm>
           <a:prstGeom prst="rect">
             <a:avLst/>
@@ -5547,7 +5547,7 @@
         <p:spPr>
           <a:xfrm>
             <a:off x="11174040" y="137520"/>
-            <a:ext cx="1015560" cy="1009440"/>
+            <a:ext cx="1015200" cy="1009080"/>
           </a:xfrm>
           <a:prstGeom prst="rect">
             <a:avLst/>
@@ -5596,7 +5596,7 @@
         <p:spPr>
           <a:xfrm>
             <a:off x="838080" y="1825560"/>
-            <a:ext cx="10513080" cy="4348800"/>
+            <a:ext cx="10512720" cy="4348440"/>
           </a:xfrm>
           <a:prstGeom prst="rect">
             <a:avLst/>
@@ -5622,7 +5622,7 @@
         <p:spPr>
           <a:xfrm>
             <a:off x="8352000" y="2664000"/>
-            <a:ext cx="3237840" cy="3017160"/>
+            <a:ext cx="3237480" cy="3017160"/>
           </a:xfrm>
           <a:prstGeom prst="rect">
             <a:avLst/>
@@ -5649,7 +5649,7 @@
               </a:lnSpc>
             </a:pPr>
             <a:r>
-              <a:rPr b="1" lang="fr-FR" sz="1800" spc="-1" strike="noStrike" u="sng">
+              <a:rPr b="1" lang="en-US" sz="1800" spc="-1" strike="noStrike" u="sng">
                 <a:solidFill>
                   <a:srgbClr val="ffffff"/>
                 </a:solidFill>
@@ -5659,7 +5659,7 @@
               </a:rPr>
               <a:t>Home : Présentation de Git.</a:t>
             </a:r>
-            <a:endParaRPr b="0" lang="fr-FR" sz="1800" spc="-1" strike="noStrike">
+            <a:endParaRPr b="0" lang="en-US" sz="1800" spc="-1" strike="noStrike">
               <a:latin typeface="Arial"/>
             </a:endParaRPr>
           </a:p>
@@ -5669,7 +5669,7 @@
                 <a:spcPct val="100000"/>
               </a:lnSpc>
             </a:pPr>
-            <a:endParaRPr b="0" lang="fr-FR" sz="1800" spc="-1" strike="noStrike">
+            <a:endParaRPr b="0" lang="en-US" sz="1800" spc="-1" strike="noStrike">
               <a:latin typeface="Arial"/>
             </a:endParaRPr>
           </a:p>
@@ -5680,7 +5680,7 @@
               </a:lnSpc>
             </a:pPr>
             <a:r>
-              <a:rPr b="1" lang="fr-FR" sz="1800" spc="-1" strike="noStrike" u="sng">
+              <a:rPr b="1" lang="en-US" sz="1800" spc="-1" strike="noStrike" u="sng">
                 <a:solidFill>
                   <a:srgbClr val="ffffff"/>
                 </a:solidFill>
@@ -5690,7 +5690,7 @@
               </a:rPr>
               <a:t>Installation et Configuration.</a:t>
             </a:r>
-            <a:endParaRPr b="0" lang="fr-FR" sz="1800" spc="-1" strike="noStrike">
+            <a:endParaRPr b="0" lang="en-US" sz="1800" spc="-1" strike="noStrike">
               <a:latin typeface="Arial"/>
             </a:endParaRPr>
           </a:p>
@@ -5700,7 +5700,7 @@
                 <a:spcPct val="100000"/>
               </a:lnSpc>
             </a:pPr>
-            <a:endParaRPr b="0" lang="fr-FR" sz="1800" spc="-1" strike="noStrike">
+            <a:endParaRPr b="0" lang="en-US" sz="1800" spc="-1" strike="noStrike">
               <a:latin typeface="Arial"/>
             </a:endParaRPr>
           </a:p>
@@ -5711,7 +5711,7 @@
               </a:lnSpc>
             </a:pPr>
             <a:r>
-              <a:rPr b="1" lang="fr-FR" sz="1800" spc="-1" strike="noStrike" u="sng">
+              <a:rPr b="1" lang="en-US" sz="1800" spc="-1" strike="noStrike" u="sng">
                 <a:solidFill>
                   <a:srgbClr val="ffffff"/>
                 </a:solidFill>
@@ -5721,7 +5721,7 @@
               </a:rPr>
               <a:t>Les Fonctionnalités.</a:t>
             </a:r>
-            <a:endParaRPr b="0" lang="fr-FR" sz="1800" spc="-1" strike="noStrike">
+            <a:endParaRPr b="0" lang="en-US" sz="1800" spc="-1" strike="noStrike">
               <a:latin typeface="Arial"/>
             </a:endParaRPr>
           </a:p>
@@ -5731,7 +5731,7 @@
                 <a:spcPct val="100000"/>
               </a:lnSpc>
             </a:pPr>
-            <a:endParaRPr b="0" lang="fr-FR" sz="1800" spc="-1" strike="noStrike">
+            <a:endParaRPr b="0" lang="en-US" sz="1800" spc="-1" strike="noStrike">
               <a:latin typeface="Arial"/>
             </a:endParaRPr>
           </a:p>
@@ -5742,7 +5742,7 @@
               </a:lnSpc>
             </a:pPr>
             <a:r>
-              <a:rPr b="1" lang="fr-FR" sz="1800" spc="-1" strike="noStrike" u="sng">
+              <a:rPr b="1" lang="en-US" sz="1800" spc="-1" strike="noStrike" u="sng">
                 <a:solidFill>
                   <a:srgbClr val="ffffff"/>
                 </a:solidFill>
@@ -5752,7 +5752,7 @@
               </a:rPr>
               <a:t>1 Erreur / 1 Solution</a:t>
             </a:r>
-            <a:endParaRPr b="0" lang="fr-FR" sz="1800" spc="-1" strike="noStrike">
+            <a:endParaRPr b="0" lang="en-US" sz="1800" spc="-1" strike="noStrike">
               <a:latin typeface="Arial"/>
             </a:endParaRPr>
           </a:p>
@@ -5762,7 +5762,7 @@
                 <a:spcPct val="100000"/>
               </a:lnSpc>
             </a:pPr>
-            <a:endParaRPr b="0" lang="fr-FR" sz="1800" spc="-1" strike="noStrike">
+            <a:endParaRPr b="0" lang="en-US" sz="1800" spc="-1" strike="noStrike">
               <a:latin typeface="Arial"/>
             </a:endParaRPr>
           </a:p>
@@ -5773,7 +5773,7 @@
               </a:lnSpc>
             </a:pPr>
             <a:r>
-              <a:rPr b="1" lang="fr-FR" sz="1800" spc="-1" strike="noStrike" u="sng">
+              <a:rPr b="1" lang="en-US" sz="1800" spc="-1" strike="noStrike" u="sng">
                 <a:solidFill>
                   <a:srgbClr val="ffffff"/>
                 </a:solidFill>
@@ -5783,7 +5783,7 @@
               </a:rPr>
               <a:t>Alimentation du Twitter</a:t>
             </a:r>
-            <a:endParaRPr b="0" lang="fr-FR" sz="1800" spc="-1" strike="noStrike">
+            <a:endParaRPr b="0" lang="en-US" sz="1800" spc="-1" strike="noStrike">
               <a:latin typeface="Arial"/>
             </a:endParaRPr>
           </a:p>
@@ -5793,7 +5793,7 @@
                 <a:spcPct val="100000"/>
               </a:lnSpc>
             </a:pPr>
-            <a:endParaRPr b="0" lang="fr-FR" sz="1800" spc="-1" strike="noStrike">
+            <a:endParaRPr b="0" lang="en-US" sz="1800" spc="-1" strike="noStrike">
               <a:latin typeface="Arial"/>
             </a:endParaRPr>
           </a:p>
@@ -5804,7 +5804,7 @@
               </a:lnSpc>
             </a:pPr>
             <a:r>
-              <a:rPr b="1" lang="fr-FR" sz="1800" spc="-1" strike="noStrike" u="sng">
+              <a:rPr b="1" lang="en-US" sz="1800" spc="-1" strike="noStrike" u="sng">
                 <a:solidFill>
                   <a:srgbClr val="ffffff"/>
                 </a:solidFill>
@@ -5814,7 +5814,7 @@
               </a:rPr>
               <a:t>FAQ</a:t>
             </a:r>
-            <a:endParaRPr b="0" lang="fr-FR" sz="1800" spc="-1" strike="noStrike">
+            <a:endParaRPr b="0" lang="en-US" sz="1800" spc="-1" strike="noStrike">
               <a:latin typeface="Arial"/>
             </a:endParaRPr>
           </a:p>
@@ -5833,7 +5833,7 @@
         <p:spPr>
           <a:xfrm>
             <a:off x="0" y="-4680"/>
-            <a:ext cx="12190680" cy="6861240"/>
+            <a:ext cx="12190320" cy="6860880"/>
           </a:xfrm>
           <a:prstGeom prst="rect">
             <a:avLst/>
@@ -5882,7 +5882,7 @@
         <p:spPr>
           <a:xfrm>
             <a:off x="838080" y="365040"/>
-            <a:ext cx="10513080" cy="1323000"/>
+            <a:ext cx="10512720" cy="1322640"/>
           </a:xfrm>
           <a:prstGeom prst="rect">
             <a:avLst/>
@@ -5909,7 +5909,7 @@
               </a:lnSpc>
             </a:pPr>
             <a:r>
-              <a:rPr b="0" lang="fr-FR" sz="4400" spc="-1" strike="noStrike">
+              <a:rPr b="0" lang="en-US" sz="4400" spc="-1" strike="noStrike">
                 <a:solidFill>
                   <a:srgbClr val="000000"/>
                 </a:solidFill>
@@ -5918,7 +5918,7 @@
               </a:rPr>
               <a:t>Création de contenus  « Installation/Configuration »</a:t>
             </a:r>
-            <a:endParaRPr b="0" lang="fr-FR" sz="4400" spc="-1" strike="noStrike">
+            <a:endParaRPr b="0" lang="en-US" sz="4400" spc="-1" strike="noStrike">
               <a:latin typeface="Arial"/>
             </a:endParaRPr>
           </a:p>
@@ -5933,7 +5933,7 @@
         <p:spPr>
           <a:xfrm>
             <a:off x="838080" y="1825560"/>
-            <a:ext cx="10513080" cy="4348800"/>
+            <a:ext cx="10512720" cy="4348440"/>
           </a:xfrm>
           <a:prstGeom prst="rect">
             <a:avLst/>
@@ -5963,7 +5963,30 @@
         <p:spPr>
           <a:xfrm>
             <a:off x="10999080" y="174960"/>
-            <a:ext cx="1015560" cy="1009440"/>
+            <a:ext cx="1015200" cy="1009080"/>
+          </a:xfrm>
+          <a:prstGeom prst="rect">
+            <a:avLst/>
+          </a:prstGeom>
+          <a:ln>
+            <a:noFill/>
+          </a:ln>
+        </p:spPr>
+      </p:pic>
+      <p:pic>
+        <p:nvPicPr>
+          <p:cNvPr id="131" name="" descr=""/>
+          <p:cNvPicPr/>
+          <p:nvPr/>
+        </p:nvPicPr>
+        <p:blipFill>
+          <a:blip r:embed="rId2"/>
+          <a:stretch/>
+        </p:blipFill>
+        <p:spPr>
+          <a:xfrm>
+            <a:off x="1000440" y="1687680"/>
+            <a:ext cx="10063800" cy="4804560"/>
           </a:xfrm>
           <a:prstGeom prst="rect">
             <a:avLst/>
@@ -6005,14 +6028,14 @@
       </p:grpSpPr>
       <p:sp>
         <p:nvSpPr>
-          <p:cNvPr id="131" name="CustomShape 1"/>
+          <p:cNvPr id="132" name="CustomShape 1"/>
           <p:cNvSpPr/>
           <p:nvPr/>
         </p:nvSpPr>
         <p:spPr>
           <a:xfrm>
             <a:off x="838080" y="365040"/>
-            <a:ext cx="10513080" cy="1323000"/>
+            <a:ext cx="10512720" cy="1322640"/>
           </a:xfrm>
           <a:prstGeom prst="rect">
             <a:avLst/>
@@ -6039,7 +6062,7 @@
               </a:lnSpc>
             </a:pPr>
             <a:r>
-              <a:rPr b="0" lang="fr-FR" sz="4400" spc="-1" strike="noStrike">
+              <a:rPr b="0" lang="en-US" sz="4400" spc="-1" strike="noStrike">
                 <a:solidFill>
                   <a:srgbClr val="000000"/>
                 </a:solidFill>
@@ -6048,22 +6071,22 @@
               </a:rPr>
               <a:t>Création de contenus « Les fonctionnalités »</a:t>
             </a:r>
-            <a:endParaRPr b="0" lang="fr-FR" sz="4400" spc="-1" strike="noStrike">
-              <a:latin typeface="Arial"/>
-            </a:endParaRPr>
-          </a:p>
-        </p:txBody>
-      </p:sp>
-      <p:sp>
-        <p:nvSpPr>
-          <p:cNvPr id="132" name="CustomShape 2"/>
+            <a:endParaRPr b="0" lang="en-US" sz="4400" spc="-1" strike="noStrike">
+              <a:latin typeface="Arial"/>
+            </a:endParaRPr>
+          </a:p>
+        </p:txBody>
+      </p:sp>
+      <p:sp>
+        <p:nvSpPr>
+          <p:cNvPr id="133" name="CustomShape 2"/>
           <p:cNvSpPr/>
           <p:nvPr/>
         </p:nvSpPr>
         <p:spPr>
           <a:xfrm>
             <a:off x="838080" y="1825560"/>
-            <a:ext cx="10513080" cy="4348800"/>
+            <a:ext cx="10512720" cy="4348440"/>
           </a:xfrm>
           <a:prstGeom prst="rect">
             <a:avLst/>
@@ -6082,7 +6105,7 @@
       </p:sp>
       <p:pic>
         <p:nvPicPr>
-          <p:cNvPr id="133" name="Image 4" descr=""/>
+          <p:cNvPr id="134" name="Image 4" descr=""/>
           <p:cNvPicPr/>
           <p:nvPr/>
         </p:nvPicPr>
@@ -6093,7 +6116,7 @@
         <p:spPr>
           <a:xfrm>
             <a:off x="10999080" y="174960"/>
-            <a:ext cx="1015560" cy="1009440"/>
+            <a:ext cx="1015200" cy="1009080"/>
           </a:xfrm>
           <a:prstGeom prst="rect">
             <a:avLst/>
@@ -6105,7 +6128,7 @@
       </p:pic>
       <p:pic>
         <p:nvPicPr>
-          <p:cNvPr id="134" name="" descr=""/>
+          <p:cNvPr id="135" name="" descr=""/>
           <p:cNvPicPr/>
           <p:nvPr/>
         </p:nvPicPr>
@@ -6116,7 +6139,7 @@
         <p:spPr>
           <a:xfrm>
             <a:off x="1008000" y="2245680"/>
-            <a:ext cx="7895880" cy="3514320"/>
+            <a:ext cx="7895520" cy="3513960"/>
           </a:xfrm>
           <a:prstGeom prst="rect">
             <a:avLst/>
@@ -6158,14 +6181,14 @@
       </p:grpSpPr>
       <p:sp>
         <p:nvSpPr>
-          <p:cNvPr id="135" name="CustomShape 1"/>
+          <p:cNvPr id="136" name="CustomShape 1"/>
           <p:cNvSpPr/>
           <p:nvPr/>
         </p:nvSpPr>
         <p:spPr>
           <a:xfrm>
             <a:off x="838080" y="365040"/>
-            <a:ext cx="10513080" cy="1323000"/>
+            <a:ext cx="10512720" cy="1322640"/>
           </a:xfrm>
           <a:prstGeom prst="rect">
             <a:avLst/>
@@ -6192,7 +6215,7 @@
               </a:lnSpc>
             </a:pPr>
             <a:r>
-              <a:rPr b="0" lang="fr-FR" sz="4400" spc="-1" strike="noStrike">
+              <a:rPr b="0" lang="en-US" sz="4400" spc="-1" strike="noStrike">
                 <a:solidFill>
                   <a:srgbClr val="000000"/>
                 </a:solidFill>
@@ -6201,22 +6224,22 @@
               </a:rPr>
               <a:t>Création de contenus pour « Alimentation Twitter »</a:t>
             </a:r>
-            <a:endParaRPr b="0" lang="fr-FR" sz="4400" spc="-1" strike="noStrike">
-              <a:latin typeface="Arial"/>
-            </a:endParaRPr>
-          </a:p>
-        </p:txBody>
-      </p:sp>
-      <p:sp>
-        <p:nvSpPr>
-          <p:cNvPr id="136" name="CustomShape 2"/>
+            <a:endParaRPr b="0" lang="en-US" sz="4400" spc="-1" strike="noStrike">
+              <a:latin typeface="Arial"/>
+            </a:endParaRPr>
+          </a:p>
+        </p:txBody>
+      </p:sp>
+      <p:sp>
+        <p:nvSpPr>
+          <p:cNvPr id="137" name="CustomShape 2"/>
           <p:cNvSpPr/>
           <p:nvPr/>
         </p:nvSpPr>
         <p:spPr>
           <a:xfrm>
             <a:off x="838080" y="1825560"/>
-            <a:ext cx="10513080" cy="4348800"/>
+            <a:ext cx="10512720" cy="4348440"/>
           </a:xfrm>
           <a:prstGeom prst="rect">
             <a:avLst/>
@@ -6235,7 +6258,7 @@
       </p:sp>
       <p:pic>
         <p:nvPicPr>
-          <p:cNvPr id="137" name="Image 4" descr=""/>
+          <p:cNvPr id="138" name="Image 4" descr=""/>
           <p:cNvPicPr/>
           <p:nvPr/>
         </p:nvPicPr>
@@ -6246,7 +6269,7 @@
         <p:spPr>
           <a:xfrm>
             <a:off x="11011680" y="15840"/>
-            <a:ext cx="1015560" cy="1009440"/>
+            <a:ext cx="1015200" cy="1009080"/>
           </a:xfrm>
           <a:prstGeom prst="rect">
             <a:avLst/>
@@ -6258,7 +6281,7 @@
       </p:pic>
       <p:pic>
         <p:nvPicPr>
-          <p:cNvPr id="138" name="" descr=""/>
+          <p:cNvPr id="139" name="" descr=""/>
           <p:cNvPicPr/>
           <p:nvPr/>
         </p:nvPicPr>
@@ -6269,7 +6292,7 @@
         <p:spPr>
           <a:xfrm>
             <a:off x="360" y="1682640"/>
-            <a:ext cx="7593120" cy="5173920"/>
+            <a:ext cx="7592760" cy="5173560"/>
           </a:xfrm>
           <a:prstGeom prst="rect">
             <a:avLst/>
@@ -6281,14 +6304,14 @@
       </p:pic>
       <p:sp>
         <p:nvSpPr>
-          <p:cNvPr id="139" name="CustomShape 3"/>
+          <p:cNvPr id="140" name="CustomShape 3"/>
           <p:cNvSpPr/>
           <p:nvPr/>
         </p:nvSpPr>
         <p:spPr>
           <a:xfrm rot="10800">
-            <a:off x="7484400" y="2324160"/>
-            <a:ext cx="4702680" cy="3898800"/>
+            <a:off x="7484040" y="2324160"/>
+            <a:ext cx="4702320" cy="3898800"/>
           </a:xfrm>
           <a:prstGeom prst="rect">
             <a:avLst/>
@@ -6315,7 +6338,7 @@
               </a:lnSpc>
             </a:pPr>
             <a:r>
-              <a:rPr b="0" lang="fr-FR" sz="3200" spc="-1" strike="noStrike">
+              <a:rPr b="0" lang="en-US" sz="3200" spc="-1" strike="noStrike">
                 <a:solidFill>
                   <a:srgbClr val="000000"/>
                 </a:solidFill>
@@ -6324,7 +6347,7 @@
               </a:rPr>
               <a:t>Alors voilà on à eu l’idée (enfin on a piqué l’idée sur le compte twitter de la photo de gauche), de faire des petits sondage, poser des questions, tweeter des liens du futur blog.</a:t>
             </a:r>
-            <a:endParaRPr b="0" lang="fr-FR" sz="3200" spc="-1" strike="noStrike">
+            <a:endParaRPr b="0" lang="en-US" sz="3200" spc="-1" strike="noStrike">
               <a:latin typeface="Arial"/>
             </a:endParaRPr>
           </a:p>
@@ -6362,14 +6385,14 @@
       </p:grpSpPr>
       <p:sp>
         <p:nvSpPr>
-          <p:cNvPr id="140" name="CustomShape 1"/>
+          <p:cNvPr id="141" name="CustomShape 1"/>
           <p:cNvSpPr/>
           <p:nvPr/>
         </p:nvSpPr>
         <p:spPr>
           <a:xfrm>
             <a:off x="838080" y="365040"/>
-            <a:ext cx="10513080" cy="1323000"/>
+            <a:ext cx="10512720" cy="1322640"/>
           </a:xfrm>
           <a:prstGeom prst="rect">
             <a:avLst/>
@@ -6396,7 +6419,7 @@
               </a:lnSpc>
             </a:pPr>
             <a:r>
-              <a:rPr b="0" lang="fr-FR" sz="4400" spc="-1" strike="noStrike">
+              <a:rPr b="0" lang="en-US" sz="4400" spc="-1" strike="noStrike">
                 <a:solidFill>
                   <a:srgbClr val="000000"/>
                 </a:solidFill>
@@ -6405,22 +6428,22 @@
               </a:rPr>
               <a:t>Création de contenus « 1 Erreur / 1 Solution »</a:t>
             </a:r>
-            <a:endParaRPr b="0" lang="fr-FR" sz="4400" spc="-1" strike="noStrike">
-              <a:latin typeface="Arial"/>
-            </a:endParaRPr>
-          </a:p>
-        </p:txBody>
-      </p:sp>
-      <p:sp>
-        <p:nvSpPr>
-          <p:cNvPr id="141" name="CustomShape 2"/>
+            <a:endParaRPr b="0" lang="en-US" sz="4400" spc="-1" strike="noStrike">
+              <a:latin typeface="Arial"/>
+            </a:endParaRPr>
+          </a:p>
+        </p:txBody>
+      </p:sp>
+      <p:sp>
+        <p:nvSpPr>
+          <p:cNvPr id="142" name="CustomShape 2"/>
           <p:cNvSpPr/>
           <p:nvPr/>
         </p:nvSpPr>
         <p:spPr>
           <a:xfrm>
             <a:off x="838080" y="1825560"/>
-            <a:ext cx="10513080" cy="4348800"/>
+            <a:ext cx="10512720" cy="4348440"/>
           </a:xfrm>
           <a:prstGeom prst="rect">
             <a:avLst/>
@@ -6439,7 +6462,7 @@
       </p:sp>
       <p:pic>
         <p:nvPicPr>
-          <p:cNvPr id="142" name="Image 4" descr=""/>
+          <p:cNvPr id="143" name="Image 4" descr=""/>
           <p:cNvPicPr/>
           <p:nvPr/>
         </p:nvPicPr>
@@ -6450,7 +6473,7 @@
         <p:spPr>
           <a:xfrm>
             <a:off x="11075040" y="15840"/>
-            <a:ext cx="1015560" cy="1009440"/>
+            <a:ext cx="1015200" cy="1009080"/>
           </a:xfrm>
           <a:prstGeom prst="rect">
             <a:avLst/>
@@ -6462,7 +6485,7 @@
       </p:pic>
       <p:pic>
         <p:nvPicPr>
-          <p:cNvPr id="143" name="" descr=""/>
+          <p:cNvPr id="144" name="" descr=""/>
           <p:cNvPicPr/>
           <p:nvPr/>
         </p:nvPicPr>
@@ -6473,7 +6496,7 @@
         <p:spPr>
           <a:xfrm>
             <a:off x="2800440" y="1653480"/>
-            <a:ext cx="6800040" cy="5133240"/>
+            <a:ext cx="6799680" cy="5132880"/>
           </a:xfrm>
           <a:prstGeom prst="rect">
             <a:avLst/>
@@ -6515,14 +6538,14 @@
       </p:grpSpPr>
       <p:sp>
         <p:nvSpPr>
-          <p:cNvPr id="144" name="CustomShape 1"/>
+          <p:cNvPr id="145" name="CustomShape 1"/>
           <p:cNvSpPr/>
           <p:nvPr/>
         </p:nvSpPr>
         <p:spPr>
           <a:xfrm>
             <a:off x="838080" y="365040"/>
-            <a:ext cx="10513080" cy="1323000"/>
+            <a:ext cx="10512720" cy="1322640"/>
           </a:xfrm>
           <a:prstGeom prst="rect">
             <a:avLst/>
@@ -6549,7 +6572,7 @@
               </a:lnSpc>
             </a:pPr>
             <a:r>
-              <a:rPr b="0" lang="fr-FR" sz="4400" spc="-1" strike="noStrike">
+              <a:rPr b="0" lang="en-US" sz="4400" spc="-1" strike="noStrike">
                 <a:solidFill>
                   <a:srgbClr val="000000"/>
                 </a:solidFill>
@@ -6558,22 +6581,22 @@
               </a:rPr>
               <a:t>Création d’un contenue « FAQ »</a:t>
             </a:r>
-            <a:endParaRPr b="0" lang="fr-FR" sz="4400" spc="-1" strike="noStrike">
-              <a:latin typeface="Arial"/>
-            </a:endParaRPr>
-          </a:p>
-        </p:txBody>
-      </p:sp>
-      <p:sp>
-        <p:nvSpPr>
-          <p:cNvPr id="145" name="CustomShape 2"/>
+            <a:endParaRPr b="0" lang="en-US" sz="4400" spc="-1" strike="noStrike">
+              <a:latin typeface="Arial"/>
+            </a:endParaRPr>
+          </a:p>
+        </p:txBody>
+      </p:sp>
+      <p:sp>
+        <p:nvSpPr>
+          <p:cNvPr id="146" name="CustomShape 2"/>
           <p:cNvSpPr/>
           <p:nvPr/>
         </p:nvSpPr>
         <p:spPr>
           <a:xfrm>
             <a:off x="838080" y="1825560"/>
-            <a:ext cx="10513080" cy="4348800"/>
+            <a:ext cx="10512720" cy="4348440"/>
           </a:xfrm>
           <a:prstGeom prst="rect">
             <a:avLst/>
@@ -6592,7 +6615,7 @@
       </p:sp>
       <p:pic>
         <p:nvPicPr>
-          <p:cNvPr id="146" name="Image 4" descr=""/>
+          <p:cNvPr id="147" name="Image 4" descr=""/>
           <p:cNvPicPr/>
           <p:nvPr/>
         </p:nvPicPr>
@@ -6603,7 +6626,7 @@
         <p:spPr>
           <a:xfrm>
             <a:off x="11075040" y="15840"/>
-            <a:ext cx="1015560" cy="1009440"/>
+            <a:ext cx="1015200" cy="1009080"/>
           </a:xfrm>
           <a:prstGeom prst="rect">
             <a:avLst/>
@@ -6615,7 +6638,7 @@
       </p:pic>
       <p:pic>
         <p:nvPicPr>
-          <p:cNvPr id="147" name="" descr=""/>
+          <p:cNvPr id="148" name="" descr=""/>
           <p:cNvPicPr/>
           <p:nvPr/>
         </p:nvPicPr>
@@ -6626,7 +6649,7 @@
         <p:spPr>
           <a:xfrm>
             <a:off x="1512000" y="1465200"/>
-            <a:ext cx="7952400" cy="5086080"/>
+            <a:ext cx="7952040" cy="5085720"/>
           </a:xfrm>
           <a:prstGeom prst="rect">
             <a:avLst/>

</xml_diff>